<commit_message>
saving a copy of the PPTx file
</commit_message>
<xml_diff>
--- a/zzz-additional-documentation/Rest-Api-Design-Build-Run-Day-2.pptx
+++ b/zzz-additional-documentation/Rest-Api-Design-Build-Run-Day-2.pptx
@@ -5,7 +5,7 @@
     <p:sldMasterId id="2147483696" r:id="rId1"/>
   </p:sldMasterIdLst>
   <p:notesMasterIdLst>
-    <p:notesMasterId r:id="rId64"/>
+    <p:notesMasterId r:id="rId66"/>
   </p:notesMasterIdLst>
   <p:sldIdLst>
     <p:sldId id="256" r:id="rId2"/>
@@ -31,45 +31,47 @@
     <p:sldId id="311" r:id="rId22"/>
     <p:sldId id="312" r:id="rId23"/>
     <p:sldId id="313" r:id="rId24"/>
-    <p:sldId id="306" r:id="rId25"/>
-    <p:sldId id="314" r:id="rId26"/>
-    <p:sldId id="303" r:id="rId27"/>
-    <p:sldId id="304" r:id="rId28"/>
-    <p:sldId id="295" r:id="rId29"/>
-    <p:sldId id="260" r:id="rId30"/>
-    <p:sldId id="261" r:id="rId31"/>
-    <p:sldId id="262" r:id="rId32"/>
-    <p:sldId id="263" r:id="rId33"/>
-    <p:sldId id="264" r:id="rId34"/>
-    <p:sldId id="265" r:id="rId35"/>
-    <p:sldId id="266" r:id="rId36"/>
-    <p:sldId id="267" r:id="rId37"/>
-    <p:sldId id="272" r:id="rId38"/>
-    <p:sldId id="273" r:id="rId39"/>
-    <p:sldId id="274" r:id="rId40"/>
-    <p:sldId id="269" r:id="rId41"/>
-    <p:sldId id="275" r:id="rId42"/>
-    <p:sldId id="282" r:id="rId43"/>
-    <p:sldId id="294" r:id="rId44"/>
-    <p:sldId id="283" r:id="rId45"/>
-    <p:sldId id="276" r:id="rId46"/>
-    <p:sldId id="278" r:id="rId47"/>
-    <p:sldId id="277" r:id="rId48"/>
-    <p:sldId id="285" r:id="rId49"/>
-    <p:sldId id="279" r:id="rId50"/>
-    <p:sldId id="280" r:id="rId51"/>
-    <p:sldId id="281" r:id="rId52"/>
-    <p:sldId id="270" r:id="rId53"/>
-    <p:sldId id="271" r:id="rId54"/>
-    <p:sldId id="286" r:id="rId55"/>
-    <p:sldId id="287" r:id="rId56"/>
-    <p:sldId id="288" r:id="rId57"/>
-    <p:sldId id="289" r:id="rId58"/>
-    <p:sldId id="290" r:id="rId59"/>
-    <p:sldId id="268" r:id="rId60"/>
-    <p:sldId id="291" r:id="rId61"/>
-    <p:sldId id="292" r:id="rId62"/>
-    <p:sldId id="293" r:id="rId63"/>
+    <p:sldId id="321" r:id="rId25"/>
+    <p:sldId id="322" r:id="rId26"/>
+    <p:sldId id="306" r:id="rId27"/>
+    <p:sldId id="314" r:id="rId28"/>
+    <p:sldId id="303" r:id="rId29"/>
+    <p:sldId id="304" r:id="rId30"/>
+    <p:sldId id="295" r:id="rId31"/>
+    <p:sldId id="260" r:id="rId32"/>
+    <p:sldId id="261" r:id="rId33"/>
+    <p:sldId id="262" r:id="rId34"/>
+    <p:sldId id="263" r:id="rId35"/>
+    <p:sldId id="264" r:id="rId36"/>
+    <p:sldId id="265" r:id="rId37"/>
+    <p:sldId id="266" r:id="rId38"/>
+    <p:sldId id="267" r:id="rId39"/>
+    <p:sldId id="272" r:id="rId40"/>
+    <p:sldId id="273" r:id="rId41"/>
+    <p:sldId id="274" r:id="rId42"/>
+    <p:sldId id="269" r:id="rId43"/>
+    <p:sldId id="275" r:id="rId44"/>
+    <p:sldId id="282" r:id="rId45"/>
+    <p:sldId id="294" r:id="rId46"/>
+    <p:sldId id="283" r:id="rId47"/>
+    <p:sldId id="276" r:id="rId48"/>
+    <p:sldId id="278" r:id="rId49"/>
+    <p:sldId id="277" r:id="rId50"/>
+    <p:sldId id="285" r:id="rId51"/>
+    <p:sldId id="279" r:id="rId52"/>
+    <p:sldId id="280" r:id="rId53"/>
+    <p:sldId id="281" r:id="rId54"/>
+    <p:sldId id="270" r:id="rId55"/>
+    <p:sldId id="271" r:id="rId56"/>
+    <p:sldId id="286" r:id="rId57"/>
+    <p:sldId id="287" r:id="rId58"/>
+    <p:sldId id="288" r:id="rId59"/>
+    <p:sldId id="289" r:id="rId60"/>
+    <p:sldId id="290" r:id="rId61"/>
+    <p:sldId id="268" r:id="rId62"/>
+    <p:sldId id="291" r:id="rId63"/>
+    <p:sldId id="292" r:id="rId64"/>
+    <p:sldId id="293" r:id="rId65"/>
   </p:sldIdLst>
   <p:sldSz cx="12192000" cy="6858000"/>
   <p:notesSz cx="6858000" cy="9144000"/>
@@ -590,7 +592,7 @@
           <a:p>
             <a:fld id="{CABBF519-BB17-4C09-A473-025D7A25044D}" type="slidenum">
               <a:rPr lang="en-US" smtClean="0"/>
-              <a:t>34</a:t>
+              <a:t>36</a:t>
             </a:fld>
             <a:endParaRPr lang="en-US"/>
           </a:p>
@@ -674,7 +676,7 @@
           <a:p>
             <a:fld id="{CABBF519-BB17-4C09-A473-025D7A25044D}" type="slidenum">
               <a:rPr lang="en-US" smtClean="0"/>
-              <a:t>40</a:t>
+              <a:t>42</a:t>
             </a:fld>
             <a:endParaRPr lang="en-US"/>
           </a:p>
@@ -758,7 +760,7 @@
           <a:p>
             <a:fld id="{CABBF519-BB17-4C09-A473-025D7A25044D}" type="slidenum">
               <a:rPr lang="en-US" smtClean="0"/>
-              <a:t>46</a:t>
+              <a:t>48</a:t>
             </a:fld>
             <a:endParaRPr lang="en-US"/>
           </a:p>
@@ -866,7 +868,7 @@
           <a:p>
             <a:fld id="{CABBF519-BB17-4C09-A473-025D7A25044D}" type="slidenum">
               <a:rPr lang="en-US" smtClean="0"/>
-              <a:t>48</a:t>
+              <a:t>50</a:t>
             </a:fld>
             <a:endParaRPr lang="en-US"/>
           </a:p>
@@ -13668,6 +13670,334 @@
         <p:cNvPr id="1" name="">
           <a:extLst>
             <a:ext uri="{FF2B5EF4-FFF2-40B4-BE49-F238E27FC236}">
+              <a16:creationId xmlns:a16="http://schemas.microsoft.com/office/drawing/2014/main" id="{DA79F2B0-F3F5-6DD5-E8C9-02EF2D0E1E1C}"/>
+            </a:ext>
+          </a:extLst>
+        </p:cNvPr>
+        <p:cNvGrpSpPr/>
+        <p:nvPr/>
+      </p:nvGrpSpPr>
+      <p:grpSpPr>
+        <a:xfrm>
+          <a:off x="0" y="0"/>
+          <a:ext cx="0" cy="0"/>
+          <a:chOff x="0" y="0"/>
+          <a:chExt cx="0" cy="0"/>
+        </a:xfrm>
+      </p:grpSpPr>
+      <p:sp>
+        <p:nvSpPr>
+          <p:cNvPr id="2" name="Title 1">
+            <a:extLst>
+              <a:ext uri="{FF2B5EF4-FFF2-40B4-BE49-F238E27FC236}">
+                <a16:creationId xmlns:a16="http://schemas.microsoft.com/office/drawing/2014/main" id="{52CF3A55-C0A6-BDAF-97AE-32AB9A1C15CF}"/>
+              </a:ext>
+            </a:extLst>
+          </p:cNvPr>
+          <p:cNvSpPr>
+            <a:spLocks noGrp="1"/>
+          </p:cNvSpPr>
+          <p:nvPr>
+            <p:ph type="title"/>
+          </p:nvPr>
+        </p:nvSpPr>
+        <p:spPr>
+          <a:xfrm>
+            <a:off x="919119" y="79248"/>
+            <a:ext cx="10353762" cy="970450"/>
+          </a:xfrm>
+        </p:spPr>
+        <p:txBody>
+          <a:bodyPr/>
+          <a:lstStyle/>
+          <a:p>
+            <a:r>
+              <a:rPr lang="en-US" dirty="0"/>
+              <a:t>Sec-Basics | OAuth 2.0 m2m Flow</a:t>
+            </a:r>
+          </a:p>
+        </p:txBody>
+      </p:sp>
+      <p:pic>
+        <p:nvPicPr>
+          <p:cNvPr id="7" name="Picture 6">
+            <a:extLst>
+              <a:ext uri="{FF2B5EF4-FFF2-40B4-BE49-F238E27FC236}">
+                <a16:creationId xmlns:a16="http://schemas.microsoft.com/office/drawing/2014/main" id="{BC59C7B8-1962-CA16-0AC4-211B8EA9811F}"/>
+              </a:ext>
+            </a:extLst>
+          </p:cNvPr>
+          <p:cNvPicPr>
+            <a:picLocks noChangeAspect="1"/>
+          </p:cNvPicPr>
+          <p:nvPr/>
+        </p:nvPicPr>
+        <p:blipFill>
+          <a:blip r:embed="rId2"/>
+          <a:stretch>
+            <a:fillRect/>
+          </a:stretch>
+        </p:blipFill>
+        <p:spPr>
+          <a:xfrm>
+            <a:off x="2826216" y="1049698"/>
+            <a:ext cx="6539567" cy="5610216"/>
+          </a:xfrm>
+          <a:prstGeom prst="rect">
+            <a:avLst/>
+          </a:prstGeom>
+        </p:spPr>
+      </p:pic>
+    </p:spTree>
+    <p:extLst>
+      <p:ext uri="{BB962C8B-B14F-4D97-AF65-F5344CB8AC3E}">
+        <p14:creationId xmlns:p14="http://schemas.microsoft.com/office/powerpoint/2010/main" val="2371494528"/>
+      </p:ext>
+    </p:extLst>
+  </p:cSld>
+  <p:clrMapOvr>
+    <a:masterClrMapping/>
+  </p:clrMapOvr>
+</p:sld>
+</file>
+
+<file path=ppt/slides/slide25.xml><?xml version="1.0" encoding="utf-8"?>
+<p:sld xmlns:a="http://schemas.openxmlformats.org/drawingml/2006/main" xmlns:r="http://schemas.openxmlformats.org/officeDocument/2006/relationships" xmlns:p="http://schemas.openxmlformats.org/presentationml/2006/main">
+  <p:cSld>
+    <p:spTree>
+      <p:nvGrpSpPr>
+        <p:cNvPr id="1" name="">
+          <a:extLst>
+            <a:ext uri="{FF2B5EF4-FFF2-40B4-BE49-F238E27FC236}">
+              <a16:creationId xmlns:a16="http://schemas.microsoft.com/office/drawing/2014/main" id="{66070504-8948-A80E-EE30-0B494882D6A5}"/>
+            </a:ext>
+          </a:extLst>
+        </p:cNvPr>
+        <p:cNvGrpSpPr/>
+        <p:nvPr/>
+      </p:nvGrpSpPr>
+      <p:grpSpPr>
+        <a:xfrm>
+          <a:off x="0" y="0"/>
+          <a:ext cx="0" cy="0"/>
+          <a:chOff x="0" y="0"/>
+          <a:chExt cx="0" cy="0"/>
+        </a:xfrm>
+      </p:grpSpPr>
+      <p:sp>
+        <p:nvSpPr>
+          <p:cNvPr id="2" name="Title 1">
+            <a:extLst>
+              <a:ext uri="{FF2B5EF4-FFF2-40B4-BE49-F238E27FC236}">
+                <a16:creationId xmlns:a16="http://schemas.microsoft.com/office/drawing/2014/main" id="{2FBC2330-B0A3-B9DE-B823-06447E828ED4}"/>
+              </a:ext>
+            </a:extLst>
+          </p:cNvPr>
+          <p:cNvSpPr>
+            <a:spLocks noGrp="1"/>
+          </p:cNvSpPr>
+          <p:nvPr>
+            <p:ph type="title"/>
+          </p:nvPr>
+        </p:nvSpPr>
+        <p:spPr>
+          <a:xfrm>
+            <a:off x="919119" y="79248"/>
+            <a:ext cx="10353762" cy="970450"/>
+          </a:xfrm>
+        </p:spPr>
+        <p:txBody>
+          <a:bodyPr/>
+          <a:lstStyle/>
+          <a:p>
+            <a:r>
+              <a:rPr lang="en-US" dirty="0"/>
+              <a:t>Sec-Basics | OAuth 2.0 Prequel</a:t>
+            </a:r>
+          </a:p>
+        </p:txBody>
+      </p:sp>
+      <p:pic>
+        <p:nvPicPr>
+          <p:cNvPr id="4" name="Picture 3">
+            <a:extLst>
+              <a:ext uri="{FF2B5EF4-FFF2-40B4-BE49-F238E27FC236}">
+                <a16:creationId xmlns:a16="http://schemas.microsoft.com/office/drawing/2014/main" id="{031A843A-3EB2-EF69-03AE-6AD964723DC7}"/>
+              </a:ext>
+            </a:extLst>
+          </p:cNvPr>
+          <p:cNvPicPr>
+            <a:picLocks noChangeAspect="1"/>
+          </p:cNvPicPr>
+          <p:nvPr/>
+        </p:nvPicPr>
+        <p:blipFill>
+          <a:blip r:embed="rId2"/>
+          <a:stretch>
+            <a:fillRect/>
+          </a:stretch>
+        </p:blipFill>
+        <p:spPr>
+          <a:xfrm>
+            <a:off x="1780573" y="1357023"/>
+            <a:ext cx="8630854" cy="4143953"/>
+          </a:xfrm>
+          <a:prstGeom prst="rect">
+            <a:avLst/>
+          </a:prstGeom>
+        </p:spPr>
+      </p:pic>
+      <p:sp>
+        <p:nvSpPr>
+          <p:cNvPr id="5" name="Title 1">
+            <a:extLst>
+              <a:ext uri="{FF2B5EF4-FFF2-40B4-BE49-F238E27FC236}">
+                <a16:creationId xmlns:a16="http://schemas.microsoft.com/office/drawing/2014/main" id="{94F197FC-90E1-85D9-137C-E88A4C7813DA}"/>
+              </a:ext>
+            </a:extLst>
+          </p:cNvPr>
+          <p:cNvSpPr txBox="1">
+            <a:spLocks/>
+          </p:cNvSpPr>
+          <p:nvPr/>
+        </p:nvSpPr>
+        <p:spPr>
+          <a:xfrm>
+            <a:off x="919119" y="5208368"/>
+            <a:ext cx="3084576" cy="970450"/>
+          </a:xfrm>
+          <a:prstGeom prst="rect">
+            <a:avLst/>
+          </a:prstGeom>
+          <a:effectLst>
+            <a:outerShdw blurRad="25400" dir="17880000">
+              <a:srgbClr val="000000">
+                <a:alpha val="46000"/>
+              </a:srgbClr>
+            </a:outerShdw>
+          </a:effectLst>
+        </p:spPr>
+        <p:txBody>
+          <a:bodyPr vert="horz" lIns="91440" tIns="45720" rIns="91440" bIns="45720" rtlCol="0" anchor="ctr">
+            <a:normAutofit/>
+          </a:bodyPr>
+          <a:lstStyle>
+            <a:lvl1pPr algn="ctr" defTabSz="457200" rtl="0" eaLnBrk="1" latinLnBrk="0" hangingPunct="1">
+              <a:spcBef>
+                <a:spcPct val="0"/>
+              </a:spcBef>
+              <a:buNone/>
+              <a:defRPr sz="4000" kern="1200">
+                <a:ln>
+                  <a:solidFill>
+                    <a:schemeClr val="bg1">
+                      <a:lumMod val="75000"/>
+                      <a:lumOff val="25000"/>
+                      <a:alpha val="10000"/>
+                    </a:schemeClr>
+                  </a:solidFill>
+                </a:ln>
+                <a:solidFill>
+                  <a:schemeClr val="tx2"/>
+                </a:solidFill>
+                <a:effectLst>
+                  <a:outerShdw blurRad="9525" dist="25400" dir="14640000" algn="tl" rotWithShape="0">
+                    <a:schemeClr val="bg1">
+                      <a:alpha val="30000"/>
+                    </a:schemeClr>
+                  </a:outerShdw>
+                </a:effectLst>
+                <a:latin typeface="+mj-lt"/>
+                <a:ea typeface="+mj-ea"/>
+                <a:cs typeface="Trebuchet MS"/>
+              </a:defRPr>
+            </a:lvl1pPr>
+            <a:lvl2pPr eaLnBrk="1" hangingPunct="1">
+              <a:defRPr>
+                <a:solidFill>
+                  <a:schemeClr val="tx2"/>
+                </a:solidFill>
+              </a:defRPr>
+            </a:lvl2pPr>
+            <a:lvl3pPr eaLnBrk="1" hangingPunct="1">
+              <a:defRPr>
+                <a:solidFill>
+                  <a:schemeClr val="tx2"/>
+                </a:solidFill>
+              </a:defRPr>
+            </a:lvl3pPr>
+            <a:lvl4pPr eaLnBrk="1" hangingPunct="1">
+              <a:defRPr>
+                <a:solidFill>
+                  <a:schemeClr val="tx2"/>
+                </a:solidFill>
+              </a:defRPr>
+            </a:lvl4pPr>
+            <a:lvl5pPr eaLnBrk="1" hangingPunct="1">
+              <a:defRPr>
+                <a:solidFill>
+                  <a:schemeClr val="tx2"/>
+                </a:solidFill>
+              </a:defRPr>
+            </a:lvl5pPr>
+            <a:lvl6pPr eaLnBrk="1" hangingPunct="1">
+              <a:defRPr>
+                <a:solidFill>
+                  <a:schemeClr val="tx2"/>
+                </a:solidFill>
+              </a:defRPr>
+            </a:lvl6pPr>
+            <a:lvl7pPr eaLnBrk="1" hangingPunct="1">
+              <a:defRPr>
+                <a:solidFill>
+                  <a:schemeClr val="tx2"/>
+                </a:solidFill>
+              </a:defRPr>
+            </a:lvl7pPr>
+            <a:lvl8pPr eaLnBrk="1" hangingPunct="1">
+              <a:defRPr>
+                <a:solidFill>
+                  <a:schemeClr val="tx2"/>
+                </a:solidFill>
+              </a:defRPr>
+            </a:lvl8pPr>
+            <a:lvl9pPr eaLnBrk="1" hangingPunct="1">
+              <a:defRPr>
+                <a:solidFill>
+                  <a:schemeClr val="tx2"/>
+                </a:solidFill>
+              </a:defRPr>
+            </a:lvl9pPr>
+          </a:lstStyle>
+          <a:p>
+            <a:r>
+              <a:rPr lang="en-US" sz="2000" dirty="0"/>
+              <a:t>Do this first!</a:t>
+            </a:r>
+          </a:p>
+        </p:txBody>
+      </p:sp>
+    </p:spTree>
+    <p:extLst>
+      <p:ext uri="{BB962C8B-B14F-4D97-AF65-F5344CB8AC3E}">
+        <p14:creationId xmlns:p14="http://schemas.microsoft.com/office/powerpoint/2010/main" val="2926880346"/>
+      </p:ext>
+    </p:extLst>
+  </p:cSld>
+  <p:clrMapOvr>
+    <a:masterClrMapping/>
+  </p:clrMapOvr>
+</p:sld>
+</file>
+
+<file path=ppt/slides/slide26.xml><?xml version="1.0" encoding="utf-8"?>
+<p:sld xmlns:a="http://schemas.openxmlformats.org/drawingml/2006/main" xmlns:r="http://schemas.openxmlformats.org/officeDocument/2006/relationships" xmlns:p="http://schemas.openxmlformats.org/presentationml/2006/main">
+  <p:cSld>
+    <p:spTree>
+      <p:nvGrpSpPr>
+        <p:cNvPr id="1" name="">
+          <a:extLst>
+            <a:ext uri="{FF2B5EF4-FFF2-40B4-BE49-F238E27FC236}">
               <a16:creationId xmlns:a16="http://schemas.microsoft.com/office/drawing/2014/main" id="{82D83EAF-3BC4-966B-B516-505875CA357F}"/>
             </a:ext>
           </a:extLst>
@@ -13771,9 +14101,24 @@
             </a:r>
           </a:p>
           <a:p>
-            <a:r>
-              <a:rPr lang="en-US" dirty="0"/>
-              <a:t>Best-practices</a:t>
+            <a:pPr lvl="1"/>
+            <a:r>
+              <a:rPr lang="en-US" dirty="0"/>
+              <a:t>Spot shortcomings of the original design</a:t>
+            </a:r>
+          </a:p>
+          <a:p>
+            <a:pPr lvl="1"/>
+            <a:r>
+              <a:rPr lang="en-US" dirty="0"/>
+              <a:t>Address how to correct structural data issues</a:t>
+            </a:r>
+          </a:p>
+          <a:p>
+            <a:pPr lvl="1"/>
+            <a:r>
+              <a:rPr lang="en-US" dirty="0"/>
+              <a:t>Implement (and test) machine-2-machine OAuth 2.0 flow</a:t>
             </a:r>
           </a:p>
         </p:txBody>
@@ -13791,7 +14136,7 @@
 </p:sld>
 </file>
 
-<file path=ppt/slides/slide25.xml><?xml version="1.0" encoding="utf-8"?>
+<file path=ppt/slides/slide27.xml><?xml version="1.0" encoding="utf-8"?>
 <p:sld xmlns:a="http://schemas.openxmlformats.org/drawingml/2006/main" xmlns:r="http://schemas.openxmlformats.org/officeDocument/2006/relationships" xmlns:p="http://schemas.openxmlformats.org/presentationml/2006/main">
   <p:cSld>
     <p:spTree>
@@ -13977,7 +14322,7 @@
 </p:sld>
 </file>
 
-<file path=ppt/slides/slide26.xml><?xml version="1.0" encoding="utf-8"?>
+<file path=ppt/slides/slide28.xml><?xml version="1.0" encoding="utf-8"?>
 <p:sld xmlns:a="http://schemas.openxmlformats.org/drawingml/2006/main" xmlns:r="http://schemas.openxmlformats.org/officeDocument/2006/relationships" xmlns:p="http://schemas.openxmlformats.org/presentationml/2006/main">
   <p:cSld>
     <p:bg>
@@ -14261,7 +14606,7 @@
 </p:sld>
 </file>
 
-<file path=ppt/slides/slide27.xml><?xml version="1.0" encoding="utf-8"?>
+<file path=ppt/slides/slide29.xml><?xml version="1.0" encoding="utf-8"?>
 <p:sld xmlns:a="http://schemas.openxmlformats.org/drawingml/2006/main" xmlns:r="http://schemas.openxmlformats.org/officeDocument/2006/relationships" xmlns:p="http://schemas.openxmlformats.org/presentationml/2006/main">
   <p:cSld>
     <p:bg>
@@ -14558,247 +14903,6 @@
 </p:sld>
 </file>
 
-<file path=ppt/slides/slide28.xml><?xml version="1.0" encoding="utf-8"?>
-<p:sld xmlns:a="http://schemas.openxmlformats.org/drawingml/2006/main" xmlns:r="http://schemas.openxmlformats.org/officeDocument/2006/relationships" xmlns:p="http://schemas.openxmlformats.org/presentationml/2006/main">
-  <p:cSld>
-    <p:spTree>
-      <p:nvGrpSpPr>
-        <p:cNvPr id="1" name=""/>
-        <p:cNvGrpSpPr/>
-        <p:nvPr/>
-      </p:nvGrpSpPr>
-      <p:grpSpPr>
-        <a:xfrm>
-          <a:off x="0" y="0"/>
-          <a:ext cx="0" cy="0"/>
-          <a:chOff x="0" y="0"/>
-          <a:chExt cx="0" cy="0"/>
-        </a:xfrm>
-      </p:grpSpPr>
-      <p:sp>
-        <p:nvSpPr>
-          <p:cNvPr id="2" name="Title 1">
-            <a:extLst>
-              <a:ext uri="{FF2B5EF4-FFF2-40B4-BE49-F238E27FC236}">
-                <a16:creationId xmlns:a16="http://schemas.microsoft.com/office/drawing/2014/main" id="{58931C3D-83D1-B193-043A-79D0154942AE}"/>
-              </a:ext>
-            </a:extLst>
-          </p:cNvPr>
-          <p:cNvSpPr>
-            <a:spLocks noGrp="1"/>
-          </p:cNvSpPr>
-          <p:nvPr>
-            <p:ph type="title"/>
-          </p:nvPr>
-        </p:nvSpPr>
-        <p:spPr/>
-        <p:txBody>
-          <a:bodyPr/>
-          <a:lstStyle/>
-          <a:p>
-            <a:r>
-              <a:rPr lang="en-US" dirty="0"/>
-              <a:t>Discard Slides below and including this one</a:t>
-            </a:r>
-          </a:p>
-        </p:txBody>
-      </p:sp>
-      <p:sp>
-        <p:nvSpPr>
-          <p:cNvPr id="3" name="Content Placeholder 2">
-            <a:extLst>
-              <a:ext uri="{FF2B5EF4-FFF2-40B4-BE49-F238E27FC236}">
-                <a16:creationId xmlns:a16="http://schemas.microsoft.com/office/drawing/2014/main" id="{D3DD9EA5-7158-2341-0F8D-4935FEEC6E71}"/>
-              </a:ext>
-            </a:extLst>
-          </p:cNvPr>
-          <p:cNvSpPr>
-            <a:spLocks noGrp="1"/>
-          </p:cNvSpPr>
-          <p:nvPr>
-            <p:ph idx="1"/>
-          </p:nvPr>
-        </p:nvSpPr>
-        <p:spPr/>
-        <p:txBody>
-          <a:bodyPr/>
-          <a:lstStyle/>
-          <a:p>
-            <a:endParaRPr lang="en-US"/>
-          </a:p>
-        </p:txBody>
-      </p:sp>
-    </p:spTree>
-    <p:extLst>
-      <p:ext uri="{BB962C8B-B14F-4D97-AF65-F5344CB8AC3E}">
-        <p14:creationId xmlns:p14="http://schemas.microsoft.com/office/powerpoint/2010/main" val="1978438597"/>
-      </p:ext>
-    </p:extLst>
-  </p:cSld>
-  <p:clrMapOvr>
-    <a:masterClrMapping/>
-  </p:clrMapOvr>
-</p:sld>
-</file>
-
-<file path=ppt/slides/slide29.xml><?xml version="1.0" encoding="utf-8"?>
-<p:sld xmlns:a="http://schemas.openxmlformats.org/drawingml/2006/main" xmlns:r="http://schemas.openxmlformats.org/officeDocument/2006/relationships" xmlns:p="http://schemas.openxmlformats.org/presentationml/2006/main">
-  <p:cSld>
-    <p:spTree>
-      <p:nvGrpSpPr>
-        <p:cNvPr id="1" name=""/>
-        <p:cNvGrpSpPr/>
-        <p:nvPr/>
-      </p:nvGrpSpPr>
-      <p:grpSpPr>
-        <a:xfrm>
-          <a:off x="0" y="0"/>
-          <a:ext cx="0" cy="0"/>
-          <a:chOff x="0" y="0"/>
-          <a:chExt cx="0" cy="0"/>
-        </a:xfrm>
-      </p:grpSpPr>
-      <p:sp>
-        <p:nvSpPr>
-          <p:cNvPr id="2" name="Title 1">
-            <a:extLst>
-              <a:ext uri="{FF2B5EF4-FFF2-40B4-BE49-F238E27FC236}">
-                <a16:creationId xmlns:a16="http://schemas.microsoft.com/office/drawing/2014/main" id="{9EAA7BED-2000-DFD1-AB1B-93C2AA60FE03}"/>
-              </a:ext>
-            </a:extLst>
-          </p:cNvPr>
-          <p:cNvSpPr>
-            <a:spLocks noGrp="1"/>
-          </p:cNvSpPr>
-          <p:nvPr>
-            <p:ph type="title"/>
-          </p:nvPr>
-        </p:nvSpPr>
-        <p:spPr/>
-        <p:txBody>
-          <a:bodyPr/>
-          <a:lstStyle/>
-          <a:p>
-            <a:r>
-              <a:rPr lang="en-US" dirty="0"/>
-              <a:t>HTTP Protocol</a:t>
-            </a:r>
-          </a:p>
-        </p:txBody>
-      </p:sp>
-      <p:sp>
-        <p:nvSpPr>
-          <p:cNvPr id="3" name="Content Placeholder 2">
-            <a:extLst>
-              <a:ext uri="{FF2B5EF4-FFF2-40B4-BE49-F238E27FC236}">
-                <a16:creationId xmlns:a16="http://schemas.microsoft.com/office/drawing/2014/main" id="{734626A1-2AD8-24C4-7B02-78E2F63C514D}"/>
-              </a:ext>
-            </a:extLst>
-          </p:cNvPr>
-          <p:cNvSpPr>
-            <a:spLocks noGrp="1"/>
-          </p:cNvSpPr>
-          <p:nvPr>
-            <p:ph idx="1"/>
-          </p:nvPr>
-        </p:nvSpPr>
-        <p:spPr/>
-        <p:txBody>
-          <a:bodyPr>
-            <a:normAutofit lnSpcReduction="10000"/>
-          </a:bodyPr>
-          <a:lstStyle/>
-          <a:p>
-            <a:r>
-              <a:rPr lang="en-US" dirty="0"/>
-              <a:t>HTTP – Hyper-Text Transfer Protocol</a:t>
-            </a:r>
-          </a:p>
-          <a:p>
-            <a:pPr lvl="1"/>
-            <a:r>
-              <a:rPr lang="en-US" dirty="0"/>
-              <a:t>Invented circa 1980 by Tim Berners-Lee while working at CERN</a:t>
-            </a:r>
-          </a:p>
-          <a:p>
-            <a:pPr lvl="1"/>
-            <a:r>
-              <a:rPr lang="en-US" dirty="0"/>
-              <a:t>Foundational technology for the World Wide Web</a:t>
-            </a:r>
-          </a:p>
-          <a:p>
-            <a:pPr lvl="1"/>
-            <a:r>
-              <a:rPr lang="en-US" dirty="0"/>
-              <a:t>Facilitates data transfer over the internet</a:t>
-            </a:r>
-          </a:p>
-          <a:p>
-            <a:pPr lvl="1"/>
-            <a:r>
-              <a:rPr lang="en-US" dirty="0"/>
-              <a:t>Enables communication between clients (web-browsers) and servers</a:t>
-            </a:r>
-          </a:p>
-          <a:p>
-            <a:pPr lvl="1"/>
-            <a:r>
-              <a:rPr lang="en-US" dirty="0"/>
-              <a:t>Versions</a:t>
-            </a:r>
-          </a:p>
-          <a:p>
-            <a:pPr lvl="2"/>
-            <a:r>
-              <a:rPr lang="en-US" dirty="0"/>
-              <a:t>HTTP / 0.9 – 1991</a:t>
-            </a:r>
-          </a:p>
-          <a:p>
-            <a:pPr lvl="2"/>
-            <a:r>
-              <a:rPr lang="en-US" dirty="0"/>
-              <a:t>HTTP / 1.0 – 1996</a:t>
-            </a:r>
-          </a:p>
-          <a:p>
-            <a:pPr lvl="2"/>
-            <a:r>
-              <a:rPr lang="en-US" dirty="0"/>
-              <a:t>HTTP / 1.1 – 1997</a:t>
-            </a:r>
-          </a:p>
-          <a:p>
-            <a:pPr lvl="2"/>
-            <a:r>
-              <a:rPr lang="en-US" dirty="0"/>
-              <a:t>HTTP / 2.0 – 2015</a:t>
-            </a:r>
-          </a:p>
-          <a:p>
-            <a:pPr lvl="2"/>
-            <a:r>
-              <a:rPr lang="en-US" dirty="0"/>
-              <a:t>HTTP / 3.0 - 2021</a:t>
-            </a:r>
-          </a:p>
-        </p:txBody>
-      </p:sp>
-    </p:spTree>
-    <p:extLst>
-      <p:ext uri="{BB962C8B-B14F-4D97-AF65-F5344CB8AC3E}">
-        <p14:creationId xmlns:p14="http://schemas.microsoft.com/office/powerpoint/2010/main" val="150274491"/>
-      </p:ext>
-    </p:extLst>
-  </p:cSld>
-  <p:clrMapOvr>
-    <a:masterClrMapping/>
-  </p:clrMapOvr>
-</p:sld>
-</file>
-
 <file path=ppt/slides/slide3.xml><?xml version="1.0" encoding="utf-8"?>
 <p:sld xmlns:a="http://schemas.openxmlformats.org/drawingml/2006/main" xmlns:r="http://schemas.openxmlformats.org/officeDocument/2006/relationships" xmlns:p="http://schemas.openxmlformats.org/presentationml/2006/main">
   <p:cSld>
@@ -15566,6 +15670,247 @@
   <p:cSld>
     <p:spTree>
       <p:nvGrpSpPr>
+        <p:cNvPr id="1" name=""/>
+        <p:cNvGrpSpPr/>
+        <p:nvPr/>
+      </p:nvGrpSpPr>
+      <p:grpSpPr>
+        <a:xfrm>
+          <a:off x="0" y="0"/>
+          <a:ext cx="0" cy="0"/>
+          <a:chOff x="0" y="0"/>
+          <a:chExt cx="0" cy="0"/>
+        </a:xfrm>
+      </p:grpSpPr>
+      <p:sp>
+        <p:nvSpPr>
+          <p:cNvPr id="2" name="Title 1">
+            <a:extLst>
+              <a:ext uri="{FF2B5EF4-FFF2-40B4-BE49-F238E27FC236}">
+                <a16:creationId xmlns:a16="http://schemas.microsoft.com/office/drawing/2014/main" id="{58931C3D-83D1-B193-043A-79D0154942AE}"/>
+              </a:ext>
+            </a:extLst>
+          </p:cNvPr>
+          <p:cNvSpPr>
+            <a:spLocks noGrp="1"/>
+          </p:cNvSpPr>
+          <p:nvPr>
+            <p:ph type="title"/>
+          </p:nvPr>
+        </p:nvSpPr>
+        <p:spPr/>
+        <p:txBody>
+          <a:bodyPr/>
+          <a:lstStyle/>
+          <a:p>
+            <a:r>
+              <a:rPr lang="en-US" dirty="0"/>
+              <a:t>Discard Slides below and including this one</a:t>
+            </a:r>
+          </a:p>
+        </p:txBody>
+      </p:sp>
+      <p:sp>
+        <p:nvSpPr>
+          <p:cNvPr id="3" name="Content Placeholder 2">
+            <a:extLst>
+              <a:ext uri="{FF2B5EF4-FFF2-40B4-BE49-F238E27FC236}">
+                <a16:creationId xmlns:a16="http://schemas.microsoft.com/office/drawing/2014/main" id="{D3DD9EA5-7158-2341-0F8D-4935FEEC6E71}"/>
+              </a:ext>
+            </a:extLst>
+          </p:cNvPr>
+          <p:cNvSpPr>
+            <a:spLocks noGrp="1"/>
+          </p:cNvSpPr>
+          <p:nvPr>
+            <p:ph idx="1"/>
+          </p:nvPr>
+        </p:nvSpPr>
+        <p:spPr/>
+        <p:txBody>
+          <a:bodyPr/>
+          <a:lstStyle/>
+          <a:p>
+            <a:endParaRPr lang="en-US"/>
+          </a:p>
+        </p:txBody>
+      </p:sp>
+    </p:spTree>
+    <p:extLst>
+      <p:ext uri="{BB962C8B-B14F-4D97-AF65-F5344CB8AC3E}">
+        <p14:creationId xmlns:p14="http://schemas.microsoft.com/office/powerpoint/2010/main" val="1978438597"/>
+      </p:ext>
+    </p:extLst>
+  </p:cSld>
+  <p:clrMapOvr>
+    <a:masterClrMapping/>
+  </p:clrMapOvr>
+</p:sld>
+</file>
+
+<file path=ppt/slides/slide31.xml><?xml version="1.0" encoding="utf-8"?>
+<p:sld xmlns:a="http://schemas.openxmlformats.org/drawingml/2006/main" xmlns:r="http://schemas.openxmlformats.org/officeDocument/2006/relationships" xmlns:p="http://schemas.openxmlformats.org/presentationml/2006/main">
+  <p:cSld>
+    <p:spTree>
+      <p:nvGrpSpPr>
+        <p:cNvPr id="1" name=""/>
+        <p:cNvGrpSpPr/>
+        <p:nvPr/>
+      </p:nvGrpSpPr>
+      <p:grpSpPr>
+        <a:xfrm>
+          <a:off x="0" y="0"/>
+          <a:ext cx="0" cy="0"/>
+          <a:chOff x="0" y="0"/>
+          <a:chExt cx="0" cy="0"/>
+        </a:xfrm>
+      </p:grpSpPr>
+      <p:sp>
+        <p:nvSpPr>
+          <p:cNvPr id="2" name="Title 1">
+            <a:extLst>
+              <a:ext uri="{FF2B5EF4-FFF2-40B4-BE49-F238E27FC236}">
+                <a16:creationId xmlns:a16="http://schemas.microsoft.com/office/drawing/2014/main" id="{9EAA7BED-2000-DFD1-AB1B-93C2AA60FE03}"/>
+              </a:ext>
+            </a:extLst>
+          </p:cNvPr>
+          <p:cNvSpPr>
+            <a:spLocks noGrp="1"/>
+          </p:cNvSpPr>
+          <p:nvPr>
+            <p:ph type="title"/>
+          </p:nvPr>
+        </p:nvSpPr>
+        <p:spPr/>
+        <p:txBody>
+          <a:bodyPr/>
+          <a:lstStyle/>
+          <a:p>
+            <a:r>
+              <a:rPr lang="en-US" dirty="0"/>
+              <a:t>HTTP Protocol</a:t>
+            </a:r>
+          </a:p>
+        </p:txBody>
+      </p:sp>
+      <p:sp>
+        <p:nvSpPr>
+          <p:cNvPr id="3" name="Content Placeholder 2">
+            <a:extLst>
+              <a:ext uri="{FF2B5EF4-FFF2-40B4-BE49-F238E27FC236}">
+                <a16:creationId xmlns:a16="http://schemas.microsoft.com/office/drawing/2014/main" id="{734626A1-2AD8-24C4-7B02-78E2F63C514D}"/>
+              </a:ext>
+            </a:extLst>
+          </p:cNvPr>
+          <p:cNvSpPr>
+            <a:spLocks noGrp="1"/>
+          </p:cNvSpPr>
+          <p:nvPr>
+            <p:ph idx="1"/>
+          </p:nvPr>
+        </p:nvSpPr>
+        <p:spPr/>
+        <p:txBody>
+          <a:bodyPr>
+            <a:normAutofit lnSpcReduction="10000"/>
+          </a:bodyPr>
+          <a:lstStyle/>
+          <a:p>
+            <a:r>
+              <a:rPr lang="en-US" dirty="0"/>
+              <a:t>HTTP – Hyper-Text Transfer Protocol</a:t>
+            </a:r>
+          </a:p>
+          <a:p>
+            <a:pPr lvl="1"/>
+            <a:r>
+              <a:rPr lang="en-US" dirty="0"/>
+              <a:t>Invented circa 1980 by Tim Berners-Lee while working at CERN</a:t>
+            </a:r>
+          </a:p>
+          <a:p>
+            <a:pPr lvl="1"/>
+            <a:r>
+              <a:rPr lang="en-US" dirty="0"/>
+              <a:t>Foundational technology for the World Wide Web</a:t>
+            </a:r>
+          </a:p>
+          <a:p>
+            <a:pPr lvl="1"/>
+            <a:r>
+              <a:rPr lang="en-US" dirty="0"/>
+              <a:t>Facilitates data transfer over the internet</a:t>
+            </a:r>
+          </a:p>
+          <a:p>
+            <a:pPr lvl="1"/>
+            <a:r>
+              <a:rPr lang="en-US" dirty="0"/>
+              <a:t>Enables communication between clients (web-browsers) and servers</a:t>
+            </a:r>
+          </a:p>
+          <a:p>
+            <a:pPr lvl="1"/>
+            <a:r>
+              <a:rPr lang="en-US" dirty="0"/>
+              <a:t>Versions</a:t>
+            </a:r>
+          </a:p>
+          <a:p>
+            <a:pPr lvl="2"/>
+            <a:r>
+              <a:rPr lang="en-US" dirty="0"/>
+              <a:t>HTTP / 0.9 – 1991</a:t>
+            </a:r>
+          </a:p>
+          <a:p>
+            <a:pPr lvl="2"/>
+            <a:r>
+              <a:rPr lang="en-US" dirty="0"/>
+              <a:t>HTTP / 1.0 – 1996</a:t>
+            </a:r>
+          </a:p>
+          <a:p>
+            <a:pPr lvl="2"/>
+            <a:r>
+              <a:rPr lang="en-US" dirty="0"/>
+              <a:t>HTTP / 1.1 – 1997</a:t>
+            </a:r>
+          </a:p>
+          <a:p>
+            <a:pPr lvl="2"/>
+            <a:r>
+              <a:rPr lang="en-US" dirty="0"/>
+              <a:t>HTTP / 2.0 – 2015</a:t>
+            </a:r>
+          </a:p>
+          <a:p>
+            <a:pPr lvl="2"/>
+            <a:r>
+              <a:rPr lang="en-US" dirty="0"/>
+              <a:t>HTTP / 3.0 - 2021</a:t>
+            </a:r>
+          </a:p>
+        </p:txBody>
+      </p:sp>
+    </p:spTree>
+    <p:extLst>
+      <p:ext uri="{BB962C8B-B14F-4D97-AF65-F5344CB8AC3E}">
+        <p14:creationId xmlns:p14="http://schemas.microsoft.com/office/powerpoint/2010/main" val="150274491"/>
+      </p:ext>
+    </p:extLst>
+  </p:cSld>
+  <p:clrMapOvr>
+    <a:masterClrMapping/>
+  </p:clrMapOvr>
+</p:sld>
+</file>
+
+<file path=ppt/slides/slide32.xml><?xml version="1.0" encoding="utf-8"?>
+<p:sld xmlns:a="http://schemas.openxmlformats.org/drawingml/2006/main" xmlns:r="http://schemas.openxmlformats.org/officeDocument/2006/relationships" xmlns:p="http://schemas.openxmlformats.org/presentationml/2006/main">
+  <p:cSld>
+    <p:spTree>
+      <p:nvGrpSpPr>
         <p:cNvPr id="1" name="">
           <a:extLst>
             <a:ext uri="{FF2B5EF4-FFF2-40B4-BE49-F238E27FC236}">
@@ -15795,7 +16140,7 @@
 </p:sld>
 </file>
 
-<file path=ppt/slides/slide31.xml><?xml version="1.0" encoding="utf-8"?>
+<file path=ppt/slides/slide33.xml><?xml version="1.0" encoding="utf-8"?>
 <p:sld xmlns:a="http://schemas.openxmlformats.org/drawingml/2006/main" xmlns:r="http://schemas.openxmlformats.org/officeDocument/2006/relationships" xmlns:p="http://schemas.openxmlformats.org/presentationml/2006/main">
   <p:cSld>
     <p:spTree>
@@ -15935,7 +16280,7 @@
 </p:sld>
 </file>
 
-<file path=ppt/slides/slide32.xml><?xml version="1.0" encoding="utf-8"?>
+<file path=ppt/slides/slide34.xml><?xml version="1.0" encoding="utf-8"?>
 <p:sld xmlns:a="http://schemas.openxmlformats.org/drawingml/2006/main" xmlns:r="http://schemas.openxmlformats.org/officeDocument/2006/relationships" xmlns:p="http://schemas.openxmlformats.org/presentationml/2006/main">
   <p:cSld>
     <p:spTree>
@@ -16132,7 +16477,7 @@
 </p:sld>
 </file>
 
-<file path=ppt/slides/slide33.xml><?xml version="1.0" encoding="utf-8"?>
+<file path=ppt/slides/slide35.xml><?xml version="1.0" encoding="utf-8"?>
 <p:sld xmlns:a="http://schemas.openxmlformats.org/drawingml/2006/main" xmlns:r="http://schemas.openxmlformats.org/officeDocument/2006/relationships" xmlns:p="http://schemas.openxmlformats.org/presentationml/2006/main">
   <p:cSld>
     <p:spTree>
@@ -16328,7 +16673,7 @@
 </p:sld>
 </file>
 
-<file path=ppt/slides/slide34.xml><?xml version="1.0" encoding="utf-8"?>
+<file path=ppt/slides/slide36.xml><?xml version="1.0" encoding="utf-8"?>
 <p:sld xmlns:a="http://schemas.openxmlformats.org/drawingml/2006/main" xmlns:r="http://schemas.openxmlformats.org/officeDocument/2006/relationships" xmlns:p="http://schemas.openxmlformats.org/presentationml/2006/main">
   <p:cSld>
     <p:spTree>
@@ -16533,7 +16878,7 @@
 </p:sld>
 </file>
 
-<file path=ppt/slides/slide35.xml><?xml version="1.0" encoding="utf-8"?>
+<file path=ppt/slides/slide37.xml><?xml version="1.0" encoding="utf-8"?>
 <p:sld xmlns:a="http://schemas.openxmlformats.org/drawingml/2006/main" xmlns:r="http://schemas.openxmlformats.org/officeDocument/2006/relationships" xmlns:p="http://schemas.openxmlformats.org/presentationml/2006/main">
   <p:cSld>
     <p:spTree>
@@ -17130,7 +17475,7 @@
 </p:sld>
 </file>
 
-<file path=ppt/slides/slide36.xml><?xml version="1.0" encoding="utf-8"?>
+<file path=ppt/slides/slide38.xml><?xml version="1.0" encoding="utf-8"?>
 <p:sld xmlns:a="http://schemas.openxmlformats.org/drawingml/2006/main" xmlns:r="http://schemas.openxmlformats.org/officeDocument/2006/relationships" xmlns:p="http://schemas.openxmlformats.org/presentationml/2006/main">
   <p:cSld>
     <p:spTree>
@@ -17953,7 +18298,7 @@
 </p:sld>
 </file>
 
-<file path=ppt/slides/slide37.xml><?xml version="1.0" encoding="utf-8"?>
+<file path=ppt/slides/slide39.xml><?xml version="1.0" encoding="utf-8"?>
 <p:sld xmlns:a="http://schemas.openxmlformats.org/drawingml/2006/main" xmlns:r="http://schemas.openxmlformats.org/officeDocument/2006/relationships" xmlns:p="http://schemas.openxmlformats.org/presentationml/2006/main">
   <p:cSld>
     <p:spTree>
@@ -18126,7 +18471,198 @@
 </p:sld>
 </file>
 
-<file path=ppt/slides/slide38.xml><?xml version="1.0" encoding="utf-8"?>
+<file path=ppt/slides/slide4.xml><?xml version="1.0" encoding="utf-8"?>
+<p:sld xmlns:a="http://schemas.openxmlformats.org/drawingml/2006/main" xmlns:r="http://schemas.openxmlformats.org/officeDocument/2006/relationships" xmlns:p="http://schemas.openxmlformats.org/presentationml/2006/main">
+  <p:cSld>
+    <p:spTree>
+      <p:nvGrpSpPr>
+        <p:cNvPr id="1" name=""/>
+        <p:cNvGrpSpPr/>
+        <p:nvPr/>
+      </p:nvGrpSpPr>
+      <p:grpSpPr>
+        <a:xfrm>
+          <a:off x="0" y="0"/>
+          <a:ext cx="0" cy="0"/>
+          <a:chOff x="0" y="0"/>
+          <a:chExt cx="0" cy="0"/>
+        </a:xfrm>
+      </p:grpSpPr>
+      <p:sp>
+        <p:nvSpPr>
+          <p:cNvPr id="2" name="Title 1">
+            <a:extLst>
+              <a:ext uri="{FF2B5EF4-FFF2-40B4-BE49-F238E27FC236}">
+                <a16:creationId xmlns:a16="http://schemas.microsoft.com/office/drawing/2014/main" id="{650E3B46-876F-3C57-ECA8-4003DAE02AC8}"/>
+              </a:ext>
+            </a:extLst>
+          </p:cNvPr>
+          <p:cNvSpPr>
+            <a:spLocks noGrp="1"/>
+          </p:cNvSpPr>
+          <p:nvPr>
+            <p:ph type="title"/>
+          </p:nvPr>
+        </p:nvSpPr>
+        <p:spPr/>
+        <p:txBody>
+          <a:bodyPr/>
+          <a:lstStyle/>
+          <a:p>
+            <a:r>
+              <a:rPr lang="en-US" dirty="0"/>
+              <a:t>Pre-Flight Check</a:t>
+            </a:r>
+          </a:p>
+        </p:txBody>
+      </p:sp>
+      <p:sp>
+        <p:nvSpPr>
+          <p:cNvPr id="3" name="Content Placeholder 2">
+            <a:extLst>
+              <a:ext uri="{FF2B5EF4-FFF2-40B4-BE49-F238E27FC236}">
+                <a16:creationId xmlns:a16="http://schemas.microsoft.com/office/drawing/2014/main" id="{56CF61DF-D06B-AD92-3060-2B71136C44B3}"/>
+              </a:ext>
+            </a:extLst>
+          </p:cNvPr>
+          <p:cNvSpPr>
+            <a:spLocks noGrp="1"/>
+          </p:cNvSpPr>
+          <p:nvPr>
+            <p:ph idx="1"/>
+          </p:nvPr>
+        </p:nvSpPr>
+        <p:spPr>
+          <a:xfrm>
+            <a:off x="913795" y="1732449"/>
+            <a:ext cx="5935061" cy="4058751"/>
+          </a:xfrm>
+        </p:spPr>
+        <p:txBody>
+          <a:bodyPr>
+            <a:normAutofit fontScale="92500" lnSpcReduction="10000"/>
+          </a:bodyPr>
+          <a:lstStyle/>
+          <a:p>
+            <a:r>
+              <a:rPr lang="en-US" dirty="0"/>
+              <a:t>You have setup up a work environment</a:t>
+            </a:r>
+          </a:p>
+          <a:p>
+            <a:pPr lvl="1"/>
+            <a:r>
+              <a:rPr lang="en-US" dirty="0"/>
+              <a:t>Clone the </a:t>
+            </a:r>
+            <a:r>
+              <a:rPr lang="en-US" dirty="0" err="1">
+                <a:solidFill>
+                  <a:schemeClr val="accent1"/>
+                </a:solidFill>
+                <a:latin typeface="OCR A Extended" panose="02010509020102010303" pitchFamily="50" charset="0"/>
+              </a:rPr>
+              <a:t>api</a:t>
+            </a:r>
+            <a:r>
+              <a:rPr lang="en-US" dirty="0">
+                <a:solidFill>
+                  <a:schemeClr val="accent1"/>
+                </a:solidFill>
+                <a:latin typeface="OCR A Extended" panose="02010509020102010303" pitchFamily="50" charset="0"/>
+              </a:rPr>
+              <a:t>-workshop</a:t>
+            </a:r>
+            <a:r>
+              <a:rPr lang="en-US" dirty="0"/>
+              <a:t> mono-repo</a:t>
+            </a:r>
+          </a:p>
+          <a:p>
+            <a:pPr lvl="1"/>
+            <a:r>
+              <a:rPr lang="en-US" dirty="0"/>
+              <a:t>You can run the REST API under the directory </a:t>
+            </a:r>
+            <a:r>
+              <a:rPr lang="en-US" dirty="0">
+                <a:solidFill>
+                  <a:schemeClr val="accent1"/>
+                </a:solidFill>
+                <a:latin typeface="OCR A Extended" panose="02010509020102010303" pitchFamily="50" charset="0"/>
+              </a:rPr>
+              <a:t>library-</a:t>
+            </a:r>
+            <a:r>
+              <a:rPr lang="en-US" dirty="0" err="1">
+                <a:solidFill>
+                  <a:schemeClr val="accent1"/>
+                </a:solidFill>
+                <a:latin typeface="OCR A Extended" panose="02010509020102010303" pitchFamily="50" charset="0"/>
+              </a:rPr>
+              <a:t>api</a:t>
+            </a:r>
+            <a:r>
+              <a:rPr lang="en-US" dirty="0">
+                <a:solidFill>
+                  <a:schemeClr val="accent1"/>
+                </a:solidFill>
+                <a:latin typeface="OCR A Extended" panose="02010509020102010303" pitchFamily="50" charset="0"/>
+              </a:rPr>
+              <a:t>-basic</a:t>
+            </a:r>
+          </a:p>
+          <a:p>
+            <a:pPr lvl="1"/>
+            <a:r>
+              <a:rPr lang="en-US" dirty="0"/>
+              <a:t>Look at the README.md document for instructions</a:t>
+            </a:r>
+          </a:p>
+          <a:p>
+            <a:r>
+              <a:rPr lang="en-US" b="1" dirty="0">
+                <a:solidFill>
+                  <a:srgbClr val="FFC000"/>
+                </a:solidFill>
+              </a:rPr>
+              <a:t>Disclaimer:</a:t>
+            </a:r>
+            <a:r>
+              <a:rPr lang="en-US" dirty="0"/>
+              <a:t>  Most of my experience is building REST APIs using </a:t>
+            </a:r>
+            <a:r>
+              <a:rPr lang="en-US" dirty="0" err="1"/>
+              <a:t>c#</a:t>
+            </a:r>
+            <a:r>
+              <a:rPr lang="en-US" dirty="0"/>
+              <a:t> and the dotnet core platform for RESTful APIs.  If you are experienced in Python and could improve upon the code presented here, feel free to submit PRs to the repo so others can benefit too</a:t>
+            </a:r>
+          </a:p>
+          <a:p>
+            <a:r>
+              <a:rPr lang="en-US" dirty="0"/>
+              <a:t>We continue the story from here…</a:t>
+            </a:r>
+          </a:p>
+        </p:txBody>
+      </p:sp>
+    </p:spTree>
+    <p:extLst>
+      <p:ext uri="{BB962C8B-B14F-4D97-AF65-F5344CB8AC3E}">
+        <p14:creationId xmlns:p14="http://schemas.microsoft.com/office/powerpoint/2010/main" val="1814355794"/>
+      </p:ext>
+    </p:extLst>
+  </p:cSld>
+  <p:clrMapOvr>
+    <a:masterClrMapping/>
+  </p:clrMapOvr>
+</p:sld>
+</file>
+
+<file path=ppt/slides/slide40.xml><?xml version="1.0" encoding="utf-8"?>
 <p:sld xmlns:a="http://schemas.openxmlformats.org/drawingml/2006/main" xmlns:r="http://schemas.openxmlformats.org/officeDocument/2006/relationships" xmlns:p="http://schemas.openxmlformats.org/presentationml/2006/main">
   <p:cSld>
     <p:spTree>
@@ -18375,7 +18911,7 @@
 </p:sld>
 </file>
 
-<file path=ppt/slides/slide39.xml><?xml version="1.0" encoding="utf-8"?>
+<file path=ppt/slides/slide41.xml><?xml version="1.0" encoding="utf-8"?>
 <p:sld xmlns:a="http://schemas.openxmlformats.org/drawingml/2006/main" xmlns:r="http://schemas.openxmlformats.org/officeDocument/2006/relationships" xmlns:p="http://schemas.openxmlformats.org/presentationml/2006/main">
   <p:cSld>
     <p:spTree>
@@ -18530,198 +19066,7 @@
 </p:sld>
 </file>
 
-<file path=ppt/slides/slide4.xml><?xml version="1.0" encoding="utf-8"?>
-<p:sld xmlns:a="http://schemas.openxmlformats.org/drawingml/2006/main" xmlns:r="http://schemas.openxmlformats.org/officeDocument/2006/relationships" xmlns:p="http://schemas.openxmlformats.org/presentationml/2006/main">
-  <p:cSld>
-    <p:spTree>
-      <p:nvGrpSpPr>
-        <p:cNvPr id="1" name=""/>
-        <p:cNvGrpSpPr/>
-        <p:nvPr/>
-      </p:nvGrpSpPr>
-      <p:grpSpPr>
-        <a:xfrm>
-          <a:off x="0" y="0"/>
-          <a:ext cx="0" cy="0"/>
-          <a:chOff x="0" y="0"/>
-          <a:chExt cx="0" cy="0"/>
-        </a:xfrm>
-      </p:grpSpPr>
-      <p:sp>
-        <p:nvSpPr>
-          <p:cNvPr id="2" name="Title 1">
-            <a:extLst>
-              <a:ext uri="{FF2B5EF4-FFF2-40B4-BE49-F238E27FC236}">
-                <a16:creationId xmlns:a16="http://schemas.microsoft.com/office/drawing/2014/main" id="{650E3B46-876F-3C57-ECA8-4003DAE02AC8}"/>
-              </a:ext>
-            </a:extLst>
-          </p:cNvPr>
-          <p:cNvSpPr>
-            <a:spLocks noGrp="1"/>
-          </p:cNvSpPr>
-          <p:nvPr>
-            <p:ph type="title"/>
-          </p:nvPr>
-        </p:nvSpPr>
-        <p:spPr/>
-        <p:txBody>
-          <a:bodyPr/>
-          <a:lstStyle/>
-          <a:p>
-            <a:r>
-              <a:rPr lang="en-US" dirty="0"/>
-              <a:t>Pre-Flight Check</a:t>
-            </a:r>
-          </a:p>
-        </p:txBody>
-      </p:sp>
-      <p:sp>
-        <p:nvSpPr>
-          <p:cNvPr id="3" name="Content Placeholder 2">
-            <a:extLst>
-              <a:ext uri="{FF2B5EF4-FFF2-40B4-BE49-F238E27FC236}">
-                <a16:creationId xmlns:a16="http://schemas.microsoft.com/office/drawing/2014/main" id="{56CF61DF-D06B-AD92-3060-2B71136C44B3}"/>
-              </a:ext>
-            </a:extLst>
-          </p:cNvPr>
-          <p:cNvSpPr>
-            <a:spLocks noGrp="1"/>
-          </p:cNvSpPr>
-          <p:nvPr>
-            <p:ph idx="1"/>
-          </p:nvPr>
-        </p:nvSpPr>
-        <p:spPr>
-          <a:xfrm>
-            <a:off x="913795" y="1732449"/>
-            <a:ext cx="5935061" cy="4058751"/>
-          </a:xfrm>
-        </p:spPr>
-        <p:txBody>
-          <a:bodyPr>
-            <a:normAutofit fontScale="92500" lnSpcReduction="10000"/>
-          </a:bodyPr>
-          <a:lstStyle/>
-          <a:p>
-            <a:r>
-              <a:rPr lang="en-US" dirty="0"/>
-              <a:t>You have setup up a work environment</a:t>
-            </a:r>
-          </a:p>
-          <a:p>
-            <a:pPr lvl="1"/>
-            <a:r>
-              <a:rPr lang="en-US" dirty="0"/>
-              <a:t>Clone the </a:t>
-            </a:r>
-            <a:r>
-              <a:rPr lang="en-US" dirty="0" err="1">
-                <a:solidFill>
-                  <a:schemeClr val="accent1"/>
-                </a:solidFill>
-                <a:latin typeface="OCR A Extended" panose="02010509020102010303" pitchFamily="50" charset="0"/>
-              </a:rPr>
-              <a:t>api</a:t>
-            </a:r>
-            <a:r>
-              <a:rPr lang="en-US" dirty="0">
-                <a:solidFill>
-                  <a:schemeClr val="accent1"/>
-                </a:solidFill>
-                <a:latin typeface="OCR A Extended" panose="02010509020102010303" pitchFamily="50" charset="0"/>
-              </a:rPr>
-              <a:t>-workshop</a:t>
-            </a:r>
-            <a:r>
-              <a:rPr lang="en-US" dirty="0"/>
-              <a:t> mono-repo</a:t>
-            </a:r>
-          </a:p>
-          <a:p>
-            <a:pPr lvl="1"/>
-            <a:r>
-              <a:rPr lang="en-US" dirty="0"/>
-              <a:t>You can run the REST API under the directory </a:t>
-            </a:r>
-            <a:r>
-              <a:rPr lang="en-US" dirty="0">
-                <a:solidFill>
-                  <a:schemeClr val="accent1"/>
-                </a:solidFill>
-                <a:latin typeface="OCR A Extended" panose="02010509020102010303" pitchFamily="50" charset="0"/>
-              </a:rPr>
-              <a:t>library-</a:t>
-            </a:r>
-            <a:r>
-              <a:rPr lang="en-US" dirty="0" err="1">
-                <a:solidFill>
-                  <a:schemeClr val="accent1"/>
-                </a:solidFill>
-                <a:latin typeface="OCR A Extended" panose="02010509020102010303" pitchFamily="50" charset="0"/>
-              </a:rPr>
-              <a:t>api</a:t>
-            </a:r>
-            <a:r>
-              <a:rPr lang="en-US" dirty="0">
-                <a:solidFill>
-                  <a:schemeClr val="accent1"/>
-                </a:solidFill>
-                <a:latin typeface="OCR A Extended" panose="02010509020102010303" pitchFamily="50" charset="0"/>
-              </a:rPr>
-              <a:t>-basic</a:t>
-            </a:r>
-          </a:p>
-          <a:p>
-            <a:pPr lvl="1"/>
-            <a:r>
-              <a:rPr lang="en-US" dirty="0"/>
-              <a:t>Look at the README.md document for instructions</a:t>
-            </a:r>
-          </a:p>
-          <a:p>
-            <a:r>
-              <a:rPr lang="en-US" b="1" dirty="0">
-                <a:solidFill>
-                  <a:srgbClr val="FFC000"/>
-                </a:solidFill>
-              </a:rPr>
-              <a:t>Disclaimer:</a:t>
-            </a:r>
-            <a:r>
-              <a:rPr lang="en-US" dirty="0"/>
-              <a:t>  Most of my experience is building REST APIs using </a:t>
-            </a:r>
-            <a:r>
-              <a:rPr lang="en-US" dirty="0" err="1"/>
-              <a:t>c#</a:t>
-            </a:r>
-            <a:r>
-              <a:rPr lang="en-US" dirty="0"/>
-              <a:t> and the dotnet core platform for RESTful APIs.  If you are experienced in Python and could improve upon the code presented here, feel free to submit PRs to the repo so others can benefit too</a:t>
-            </a:r>
-          </a:p>
-          <a:p>
-            <a:r>
-              <a:rPr lang="en-US" dirty="0"/>
-              <a:t>We continue the story from here…</a:t>
-            </a:r>
-          </a:p>
-        </p:txBody>
-      </p:sp>
-    </p:spTree>
-    <p:extLst>
-      <p:ext uri="{BB962C8B-B14F-4D97-AF65-F5344CB8AC3E}">
-        <p14:creationId xmlns:p14="http://schemas.microsoft.com/office/powerpoint/2010/main" val="1814355794"/>
-      </p:ext>
-    </p:extLst>
-  </p:cSld>
-  <p:clrMapOvr>
-    <a:masterClrMapping/>
-  </p:clrMapOvr>
-</p:sld>
-</file>
-
-<file path=ppt/slides/slide40.xml><?xml version="1.0" encoding="utf-8"?>
+<file path=ppt/slides/slide42.xml><?xml version="1.0" encoding="utf-8"?>
 <p:sld xmlns:a="http://schemas.openxmlformats.org/drawingml/2006/main" xmlns:r="http://schemas.openxmlformats.org/officeDocument/2006/relationships" xmlns:p="http://schemas.openxmlformats.org/presentationml/2006/main">
   <p:cSld>
     <p:spTree>
@@ -18894,7 +19239,7 @@
 </p:sld>
 </file>
 
-<file path=ppt/slides/slide41.xml><?xml version="1.0" encoding="utf-8"?>
+<file path=ppt/slides/slide43.xml><?xml version="1.0" encoding="utf-8"?>
 <p:sld xmlns:a="http://schemas.openxmlformats.org/drawingml/2006/main" xmlns:r="http://schemas.openxmlformats.org/officeDocument/2006/relationships" xmlns:p="http://schemas.openxmlformats.org/presentationml/2006/main">
   <p:cSld>
     <p:bg>
@@ -19209,7 +19554,7 @@
 </p:sld>
 </file>
 
-<file path=ppt/slides/slide42.xml><?xml version="1.0" encoding="utf-8"?>
+<file path=ppt/slides/slide44.xml><?xml version="1.0" encoding="utf-8"?>
 <p:sld xmlns:a="http://schemas.openxmlformats.org/drawingml/2006/main" xmlns:r="http://schemas.openxmlformats.org/officeDocument/2006/relationships" xmlns:p="http://schemas.openxmlformats.org/presentationml/2006/main">
   <p:cSld>
     <p:bg>
@@ -19405,7 +19750,7 @@
 </p:sld>
 </file>
 
-<file path=ppt/slides/slide43.xml><?xml version="1.0" encoding="utf-8"?>
+<file path=ppt/slides/slide45.xml><?xml version="1.0" encoding="utf-8"?>
 <p:sld xmlns:a="http://schemas.openxmlformats.org/drawingml/2006/main" xmlns:r="http://schemas.openxmlformats.org/officeDocument/2006/relationships" xmlns:p="http://schemas.openxmlformats.org/presentationml/2006/main">
   <p:cSld>
     <p:bg>
@@ -19728,7 +20073,7 @@
 </p:sld>
 </file>
 
-<file path=ppt/slides/slide44.xml><?xml version="1.0" encoding="utf-8"?>
+<file path=ppt/slides/slide46.xml><?xml version="1.0" encoding="utf-8"?>
 <p:sld xmlns:a="http://schemas.openxmlformats.org/drawingml/2006/main" xmlns:r="http://schemas.openxmlformats.org/officeDocument/2006/relationships" xmlns:p="http://schemas.openxmlformats.org/presentationml/2006/main">
   <p:cSld>
     <p:bg>
@@ -20007,7 +20352,7 @@
 </p:sld>
 </file>
 
-<file path=ppt/slides/slide45.xml><?xml version="1.0" encoding="utf-8"?>
+<file path=ppt/slides/slide47.xml><?xml version="1.0" encoding="utf-8"?>
 <p:sld xmlns:a="http://schemas.openxmlformats.org/drawingml/2006/main" xmlns:r="http://schemas.openxmlformats.org/officeDocument/2006/relationships" xmlns:p="http://schemas.openxmlformats.org/presentationml/2006/main">
   <p:cSld>
     <p:bg>
@@ -20214,7 +20559,7 @@
 </p:sld>
 </file>
 
-<file path=ppt/slides/slide46.xml><?xml version="1.0" encoding="utf-8"?>
+<file path=ppt/slides/slide48.xml><?xml version="1.0" encoding="utf-8"?>
 <p:sld xmlns:a="http://schemas.openxmlformats.org/drawingml/2006/main" xmlns:r="http://schemas.openxmlformats.org/officeDocument/2006/relationships" xmlns:p="http://schemas.openxmlformats.org/presentationml/2006/main">
   <p:cSld>
     <p:bg>
@@ -20930,7 +21275,7 @@
 </p:sld>
 </file>
 
-<file path=ppt/slides/slide47.xml><?xml version="1.0" encoding="utf-8"?>
+<file path=ppt/slides/slide49.xml><?xml version="1.0" encoding="utf-8"?>
 <p:sld xmlns:a="http://schemas.openxmlformats.org/drawingml/2006/main" xmlns:r="http://schemas.openxmlformats.org/officeDocument/2006/relationships" xmlns:p="http://schemas.openxmlformats.org/presentationml/2006/main">
   <p:cSld>
     <p:bg>
@@ -21137,7 +21482,106 @@
 </p:sld>
 </file>
 
-<file path=ppt/slides/slide48.xml><?xml version="1.0" encoding="utf-8"?>
+<file path=ppt/slides/slide5.xml><?xml version="1.0" encoding="utf-8"?>
+<p:sld xmlns:a="http://schemas.openxmlformats.org/drawingml/2006/main" xmlns:r="http://schemas.openxmlformats.org/officeDocument/2006/relationships" xmlns:p="http://schemas.openxmlformats.org/presentationml/2006/main">
+  <p:cSld>
+    <p:spTree>
+      <p:nvGrpSpPr>
+        <p:cNvPr id="1" name="">
+          <a:extLst>
+            <a:ext uri="{FF2B5EF4-FFF2-40B4-BE49-F238E27FC236}">
+              <a16:creationId xmlns:a16="http://schemas.microsoft.com/office/drawing/2014/main" id="{4C4A3CD2-8A57-6303-FDC7-606D56A0E2F0}"/>
+            </a:ext>
+          </a:extLst>
+        </p:cNvPr>
+        <p:cNvGrpSpPr/>
+        <p:nvPr/>
+      </p:nvGrpSpPr>
+      <p:grpSpPr>
+        <a:xfrm>
+          <a:off x="0" y="0"/>
+          <a:ext cx="0" cy="0"/>
+          <a:chOff x="0" y="0"/>
+          <a:chExt cx="0" cy="0"/>
+        </a:xfrm>
+      </p:grpSpPr>
+      <p:sp>
+        <p:nvSpPr>
+          <p:cNvPr id="2" name="Title 1">
+            <a:extLst>
+              <a:ext uri="{FF2B5EF4-FFF2-40B4-BE49-F238E27FC236}">
+                <a16:creationId xmlns:a16="http://schemas.microsoft.com/office/drawing/2014/main" id="{39CC8ECA-FB2E-78D9-24FB-13875BE98455}"/>
+              </a:ext>
+            </a:extLst>
+          </p:cNvPr>
+          <p:cNvSpPr>
+            <a:spLocks noGrp="1"/>
+          </p:cNvSpPr>
+          <p:nvPr>
+            <p:ph type="title"/>
+          </p:nvPr>
+        </p:nvSpPr>
+        <p:spPr>
+          <a:xfrm>
+            <a:off x="913794" y="80211"/>
+            <a:ext cx="10353762" cy="970450"/>
+          </a:xfrm>
+        </p:spPr>
+        <p:txBody>
+          <a:bodyPr/>
+          <a:lstStyle/>
+          <a:p>
+            <a:r>
+              <a:rPr lang="en-US" dirty="0"/>
+              <a:t>Recall | Conceptual Model</a:t>
+            </a:r>
+          </a:p>
+        </p:txBody>
+      </p:sp>
+      <p:pic>
+        <p:nvPicPr>
+          <p:cNvPr id="11" name="Picture 10">
+            <a:extLst>
+              <a:ext uri="{FF2B5EF4-FFF2-40B4-BE49-F238E27FC236}">
+                <a16:creationId xmlns:a16="http://schemas.microsoft.com/office/drawing/2014/main" id="{359D9DA3-A2AA-7C8F-74CF-E56FF3D4BFB6}"/>
+              </a:ext>
+            </a:extLst>
+          </p:cNvPr>
+          <p:cNvPicPr>
+            <a:picLocks noChangeAspect="1"/>
+          </p:cNvPicPr>
+          <p:nvPr/>
+        </p:nvPicPr>
+        <p:blipFill>
+          <a:blip r:embed="rId2"/>
+          <a:stretch>
+            <a:fillRect/>
+          </a:stretch>
+        </p:blipFill>
+        <p:spPr>
+          <a:xfrm>
+            <a:off x="2179788" y="1050661"/>
+            <a:ext cx="7832423" cy="5650788"/>
+          </a:xfrm>
+          <a:prstGeom prst="rect">
+            <a:avLst/>
+          </a:prstGeom>
+        </p:spPr>
+      </p:pic>
+    </p:spTree>
+    <p:extLst>
+      <p:ext uri="{BB962C8B-B14F-4D97-AF65-F5344CB8AC3E}">
+        <p14:creationId xmlns:p14="http://schemas.microsoft.com/office/powerpoint/2010/main" val="2928224815"/>
+      </p:ext>
+    </p:extLst>
+  </p:cSld>
+  <p:clrMapOvr>
+    <a:masterClrMapping/>
+  </p:clrMapOvr>
+</p:sld>
+</file>
+
+<file path=ppt/slides/slide50.xml><?xml version="1.0" encoding="utf-8"?>
 <p:sld xmlns:a="http://schemas.openxmlformats.org/drawingml/2006/main" xmlns:r="http://schemas.openxmlformats.org/officeDocument/2006/relationships" xmlns:p="http://schemas.openxmlformats.org/presentationml/2006/main">
   <p:cSld>
     <p:bg>
@@ -21604,7 +22048,7 @@
 </p:sld>
 </file>
 
-<file path=ppt/slides/slide49.xml><?xml version="1.0" encoding="utf-8"?>
+<file path=ppt/slides/slide51.xml><?xml version="1.0" encoding="utf-8"?>
 <p:sld xmlns:a="http://schemas.openxmlformats.org/drawingml/2006/main" xmlns:r="http://schemas.openxmlformats.org/officeDocument/2006/relationships" xmlns:p="http://schemas.openxmlformats.org/presentationml/2006/main">
   <p:cSld>
     <p:bg>
@@ -22136,106 +22580,7 @@
 </p:sld>
 </file>
 
-<file path=ppt/slides/slide5.xml><?xml version="1.0" encoding="utf-8"?>
-<p:sld xmlns:a="http://schemas.openxmlformats.org/drawingml/2006/main" xmlns:r="http://schemas.openxmlformats.org/officeDocument/2006/relationships" xmlns:p="http://schemas.openxmlformats.org/presentationml/2006/main">
-  <p:cSld>
-    <p:spTree>
-      <p:nvGrpSpPr>
-        <p:cNvPr id="1" name="">
-          <a:extLst>
-            <a:ext uri="{FF2B5EF4-FFF2-40B4-BE49-F238E27FC236}">
-              <a16:creationId xmlns:a16="http://schemas.microsoft.com/office/drawing/2014/main" id="{4C4A3CD2-8A57-6303-FDC7-606D56A0E2F0}"/>
-            </a:ext>
-          </a:extLst>
-        </p:cNvPr>
-        <p:cNvGrpSpPr/>
-        <p:nvPr/>
-      </p:nvGrpSpPr>
-      <p:grpSpPr>
-        <a:xfrm>
-          <a:off x="0" y="0"/>
-          <a:ext cx="0" cy="0"/>
-          <a:chOff x="0" y="0"/>
-          <a:chExt cx="0" cy="0"/>
-        </a:xfrm>
-      </p:grpSpPr>
-      <p:sp>
-        <p:nvSpPr>
-          <p:cNvPr id="2" name="Title 1">
-            <a:extLst>
-              <a:ext uri="{FF2B5EF4-FFF2-40B4-BE49-F238E27FC236}">
-                <a16:creationId xmlns:a16="http://schemas.microsoft.com/office/drawing/2014/main" id="{39CC8ECA-FB2E-78D9-24FB-13875BE98455}"/>
-              </a:ext>
-            </a:extLst>
-          </p:cNvPr>
-          <p:cNvSpPr>
-            <a:spLocks noGrp="1"/>
-          </p:cNvSpPr>
-          <p:nvPr>
-            <p:ph type="title"/>
-          </p:nvPr>
-        </p:nvSpPr>
-        <p:spPr>
-          <a:xfrm>
-            <a:off x="913794" y="80211"/>
-            <a:ext cx="10353762" cy="970450"/>
-          </a:xfrm>
-        </p:spPr>
-        <p:txBody>
-          <a:bodyPr/>
-          <a:lstStyle/>
-          <a:p>
-            <a:r>
-              <a:rPr lang="en-US" dirty="0"/>
-              <a:t>Recall | Conceptual Model</a:t>
-            </a:r>
-          </a:p>
-        </p:txBody>
-      </p:sp>
-      <p:pic>
-        <p:nvPicPr>
-          <p:cNvPr id="11" name="Picture 10">
-            <a:extLst>
-              <a:ext uri="{FF2B5EF4-FFF2-40B4-BE49-F238E27FC236}">
-                <a16:creationId xmlns:a16="http://schemas.microsoft.com/office/drawing/2014/main" id="{359D9DA3-A2AA-7C8F-74CF-E56FF3D4BFB6}"/>
-              </a:ext>
-            </a:extLst>
-          </p:cNvPr>
-          <p:cNvPicPr>
-            <a:picLocks noChangeAspect="1"/>
-          </p:cNvPicPr>
-          <p:nvPr/>
-        </p:nvPicPr>
-        <p:blipFill>
-          <a:blip r:embed="rId2"/>
-          <a:stretch>
-            <a:fillRect/>
-          </a:stretch>
-        </p:blipFill>
-        <p:spPr>
-          <a:xfrm>
-            <a:off x="2179788" y="1050661"/>
-            <a:ext cx="7832423" cy="5650788"/>
-          </a:xfrm>
-          <a:prstGeom prst="rect">
-            <a:avLst/>
-          </a:prstGeom>
-        </p:spPr>
-      </p:pic>
-    </p:spTree>
-    <p:extLst>
-      <p:ext uri="{BB962C8B-B14F-4D97-AF65-F5344CB8AC3E}">
-        <p14:creationId xmlns:p14="http://schemas.microsoft.com/office/powerpoint/2010/main" val="2928224815"/>
-      </p:ext>
-    </p:extLst>
-  </p:cSld>
-  <p:clrMapOvr>
-    <a:masterClrMapping/>
-  </p:clrMapOvr>
-</p:sld>
-</file>
-
-<file path=ppt/slides/slide50.xml><?xml version="1.0" encoding="utf-8"?>
+<file path=ppt/slides/slide52.xml><?xml version="1.0" encoding="utf-8"?>
 <p:sld xmlns:a="http://schemas.openxmlformats.org/drawingml/2006/main" xmlns:r="http://schemas.openxmlformats.org/officeDocument/2006/relationships" xmlns:p="http://schemas.openxmlformats.org/presentationml/2006/main">
   <p:cSld>
     <p:bg>
@@ -22713,7 +23058,7 @@
 </p:sld>
 </file>
 
-<file path=ppt/slides/slide51.xml><?xml version="1.0" encoding="utf-8"?>
+<file path=ppt/slides/slide53.xml><?xml version="1.0" encoding="utf-8"?>
 <p:sld xmlns:a="http://schemas.openxmlformats.org/drawingml/2006/main" xmlns:r="http://schemas.openxmlformats.org/officeDocument/2006/relationships" xmlns:p="http://schemas.openxmlformats.org/presentationml/2006/main">
   <p:cSld>
     <p:bg>
@@ -23183,7 +23528,7 @@
 </p:sld>
 </file>
 
-<file path=ppt/slides/slide52.xml><?xml version="1.0" encoding="utf-8"?>
+<file path=ppt/slides/slide54.xml><?xml version="1.0" encoding="utf-8"?>
 <p:sld xmlns:a="http://schemas.openxmlformats.org/drawingml/2006/main" xmlns:r="http://schemas.openxmlformats.org/officeDocument/2006/relationships" xmlns:p="http://schemas.openxmlformats.org/presentationml/2006/main">
   <p:cSld>
     <p:spTree>
@@ -23323,7 +23668,7 @@
 </p:sld>
 </file>
 
-<file path=ppt/slides/slide53.xml><?xml version="1.0" encoding="utf-8"?>
+<file path=ppt/slides/slide55.xml><?xml version="1.0" encoding="utf-8"?>
 <p:sld xmlns:a="http://schemas.openxmlformats.org/drawingml/2006/main" xmlns:r="http://schemas.openxmlformats.org/officeDocument/2006/relationships" xmlns:p="http://schemas.openxmlformats.org/presentationml/2006/main">
   <p:cSld>
     <p:spTree>
@@ -24085,7 +24430,7 @@
 </p:sld>
 </file>
 
-<file path=ppt/slides/slide54.xml><?xml version="1.0" encoding="utf-8"?>
+<file path=ppt/slides/slide56.xml><?xml version="1.0" encoding="utf-8"?>
 <p:sld xmlns:a="http://schemas.openxmlformats.org/drawingml/2006/main" xmlns:r="http://schemas.openxmlformats.org/officeDocument/2006/relationships" xmlns:p="http://schemas.openxmlformats.org/presentationml/2006/main">
   <p:cSld>
     <p:spTree>
@@ -24791,7 +25136,7 @@
 </p:sld>
 </file>
 
-<file path=ppt/slides/slide55.xml><?xml version="1.0" encoding="utf-8"?>
+<file path=ppt/slides/slide57.xml><?xml version="1.0" encoding="utf-8"?>
 <p:sld xmlns:a="http://schemas.openxmlformats.org/drawingml/2006/main" xmlns:r="http://schemas.openxmlformats.org/officeDocument/2006/relationships" xmlns:p="http://schemas.openxmlformats.org/presentationml/2006/main">
   <p:cSld>
     <p:spTree>
@@ -25524,7 +25869,7 @@
 </p:sld>
 </file>
 
-<file path=ppt/slides/slide56.xml><?xml version="1.0" encoding="utf-8"?>
+<file path=ppt/slides/slide58.xml><?xml version="1.0" encoding="utf-8"?>
 <p:sld xmlns:a="http://schemas.openxmlformats.org/drawingml/2006/main" xmlns:r="http://schemas.openxmlformats.org/officeDocument/2006/relationships" xmlns:p="http://schemas.openxmlformats.org/presentationml/2006/main">
   <p:cSld>
     <p:spTree>
@@ -26161,7 +26506,7 @@
 </p:sld>
 </file>
 
-<file path=ppt/slides/slide57.xml><?xml version="1.0" encoding="utf-8"?>
+<file path=ppt/slides/slide59.xml><?xml version="1.0" encoding="utf-8"?>
 <p:sld xmlns:a="http://schemas.openxmlformats.org/drawingml/2006/main" xmlns:r="http://schemas.openxmlformats.org/officeDocument/2006/relationships" xmlns:p="http://schemas.openxmlformats.org/presentationml/2006/main">
   <p:cSld>
     <p:spTree>
@@ -26814,1494 +27159,6 @@
     <p:extLst>
       <p:ext uri="{BB962C8B-B14F-4D97-AF65-F5344CB8AC3E}">
         <p14:creationId xmlns:p14="http://schemas.microsoft.com/office/powerpoint/2010/main" val="2437220358"/>
-      </p:ext>
-    </p:extLst>
-  </p:cSld>
-  <p:clrMapOvr>
-    <a:masterClrMapping/>
-  </p:clrMapOvr>
-</p:sld>
-</file>
-
-<file path=ppt/slides/slide58.xml><?xml version="1.0" encoding="utf-8"?>
-<p:sld xmlns:a="http://schemas.openxmlformats.org/drawingml/2006/main" xmlns:r="http://schemas.openxmlformats.org/officeDocument/2006/relationships" xmlns:p="http://schemas.openxmlformats.org/presentationml/2006/main">
-  <p:cSld>
-    <p:spTree>
-      <p:nvGrpSpPr>
-        <p:cNvPr id="1" name="">
-          <a:extLst>
-            <a:ext uri="{FF2B5EF4-FFF2-40B4-BE49-F238E27FC236}">
-              <a16:creationId xmlns:a16="http://schemas.microsoft.com/office/drawing/2014/main" id="{744D03D6-5C0F-CA3E-86DD-0A6FA99A1F6C}"/>
-            </a:ext>
-          </a:extLst>
-        </p:cNvPr>
-        <p:cNvGrpSpPr/>
-        <p:nvPr/>
-      </p:nvGrpSpPr>
-      <p:grpSpPr>
-        <a:xfrm>
-          <a:off x="0" y="0"/>
-          <a:ext cx="0" cy="0"/>
-          <a:chOff x="0" y="0"/>
-          <a:chExt cx="0" cy="0"/>
-        </a:xfrm>
-      </p:grpSpPr>
-      <p:sp>
-        <p:nvSpPr>
-          <p:cNvPr id="2" name="Title 1">
-            <a:extLst>
-              <a:ext uri="{FF2B5EF4-FFF2-40B4-BE49-F238E27FC236}">
-                <a16:creationId xmlns:a16="http://schemas.microsoft.com/office/drawing/2014/main" id="{2AACEBFD-EE04-2F40-FE40-9696A5DE0FCD}"/>
-              </a:ext>
-            </a:extLst>
-          </p:cNvPr>
-          <p:cNvSpPr>
-            <a:spLocks noGrp="1"/>
-          </p:cNvSpPr>
-          <p:nvPr>
-            <p:ph type="title"/>
-          </p:nvPr>
-        </p:nvSpPr>
-        <p:spPr/>
-        <p:txBody>
-          <a:bodyPr/>
-          <a:lstStyle/>
-          <a:p>
-            <a:r>
-              <a:rPr lang="en-US" dirty="0">
-                <a:solidFill>
-                  <a:srgbClr val="FFC000"/>
-                </a:solidFill>
-              </a:rPr>
-              <a:t>HTTP</a:t>
-            </a:r>
-            <a:r>
-              <a:rPr lang="en-US" dirty="0"/>
-              <a:t> Verbs | </a:t>
-            </a:r>
-            <a:r>
-              <a:rPr lang="en-US" dirty="0">
-                <a:latin typeface="Courier New" panose="02070309020205020404" pitchFamily="49" charset="0"/>
-                <a:cs typeface="Courier New" panose="02070309020205020404" pitchFamily="49" charset="0"/>
-              </a:rPr>
-              <a:t>DELETE</a:t>
-            </a:r>
-            <a:r>
-              <a:rPr lang="en-US" dirty="0"/>
-              <a:t> Request</a:t>
-            </a:r>
-            <a:endParaRPr lang="en-US" dirty="0">
-              <a:solidFill>
-                <a:srgbClr val="00B050"/>
-              </a:solidFill>
-            </a:endParaRPr>
-          </a:p>
-        </p:txBody>
-      </p:sp>
-      <p:sp>
-        <p:nvSpPr>
-          <p:cNvPr id="3" name="Content Placeholder 2">
-            <a:extLst>
-              <a:ext uri="{FF2B5EF4-FFF2-40B4-BE49-F238E27FC236}">
-                <a16:creationId xmlns:a16="http://schemas.microsoft.com/office/drawing/2014/main" id="{AC7CD8A8-33CB-02AA-5E7B-A58AD3EB3C81}"/>
-              </a:ext>
-            </a:extLst>
-          </p:cNvPr>
-          <p:cNvSpPr>
-            <a:spLocks noGrp="1"/>
-          </p:cNvSpPr>
-          <p:nvPr>
-            <p:ph idx="1"/>
-          </p:nvPr>
-        </p:nvSpPr>
-        <p:spPr>
-          <a:xfrm>
-            <a:off x="913795" y="1732449"/>
-            <a:ext cx="4426301" cy="4058751"/>
-          </a:xfrm>
-        </p:spPr>
-        <p:txBody>
-          <a:bodyPr>
-            <a:normAutofit lnSpcReduction="10000"/>
-          </a:bodyPr>
-          <a:lstStyle/>
-          <a:p>
-            <a:r>
-              <a:rPr lang="en-US" dirty="0"/>
-              <a:t>It requests that the target resource be “created” or “replaced” with the state defined in the representation {JSON}</a:t>
-            </a:r>
-          </a:p>
-          <a:p>
-            <a:r>
-              <a:rPr lang="en-US" dirty="0"/>
-              <a:t>See </a:t>
-            </a:r>
-            <a:r>
-              <a:rPr lang="en-US" dirty="0">
-                <a:solidFill>
-                  <a:srgbClr val="FFC000"/>
-                </a:solidFill>
-              </a:rPr>
-              <a:t>RFC 9110 </a:t>
-            </a:r>
-            <a:r>
-              <a:rPr lang="en-US" dirty="0"/>
-              <a:t>| </a:t>
-            </a:r>
-            <a:r>
-              <a:rPr lang="en-US" dirty="0">
-                <a:solidFill>
-                  <a:srgbClr val="FFC000"/>
-                </a:solidFill>
-              </a:rPr>
-              <a:t>Part 9.3.4 </a:t>
-            </a:r>
-            <a:r>
-              <a:rPr lang="en-US" dirty="0"/>
-              <a:t>for more information</a:t>
-            </a:r>
-          </a:p>
-          <a:p>
-            <a:r>
-              <a:rPr lang="en-US" dirty="0"/>
-              <a:t>It is idempotent assuming you are not tracking </a:t>
-            </a:r>
-            <a:r>
-              <a:rPr lang="en-US" dirty="0" err="1">
-                <a:latin typeface="Courier New" panose="02070309020205020404" pitchFamily="49" charset="0"/>
-                <a:cs typeface="Courier New" panose="02070309020205020404" pitchFamily="49" charset="0"/>
-              </a:rPr>
-              <a:t>LastUpdated</a:t>
-            </a:r>
-            <a:r>
-              <a:rPr lang="en-US" dirty="0"/>
-              <a:t> timestamp</a:t>
-            </a:r>
-          </a:p>
-          <a:p>
-            <a:r>
-              <a:rPr lang="en-US" dirty="0"/>
-              <a:t>Some frameworks interpret this literally ~ watch out ~ Test! Test! Test!</a:t>
-            </a:r>
-          </a:p>
-          <a:p>
-            <a:pPr lvl="2"/>
-            <a:endParaRPr lang="en-US" dirty="0"/>
-          </a:p>
-        </p:txBody>
-      </p:sp>
-      <p:sp>
-        <p:nvSpPr>
-          <p:cNvPr id="4" name="Content Placeholder 2">
-            <a:extLst>
-              <a:ext uri="{FF2B5EF4-FFF2-40B4-BE49-F238E27FC236}">
-                <a16:creationId xmlns:a16="http://schemas.microsoft.com/office/drawing/2014/main" id="{F37415D7-A45F-15C7-D773-2BB4528627DD}"/>
-              </a:ext>
-            </a:extLst>
-          </p:cNvPr>
-          <p:cNvSpPr txBox="1">
-            <a:spLocks/>
-          </p:cNvSpPr>
-          <p:nvPr/>
-        </p:nvSpPr>
-        <p:spPr>
-          <a:xfrm>
-            <a:off x="5464459" y="1732449"/>
-            <a:ext cx="6047837" cy="4058751"/>
-          </a:xfrm>
-          <a:prstGeom prst="rect">
-            <a:avLst/>
-          </a:prstGeom>
-          <a:effectLst>
-            <a:outerShdw blurRad="25400" dir="17880000">
-              <a:srgbClr val="000000">
-                <a:alpha val="46000"/>
-              </a:srgbClr>
-            </a:outerShdw>
-          </a:effectLst>
-        </p:spPr>
-        <p:txBody>
-          <a:bodyPr vert="horz" lIns="91440" tIns="45720" rIns="91440" bIns="45720" rtlCol="0" anchor="t">
-            <a:normAutofit fontScale="92500" lnSpcReduction="20000"/>
-          </a:bodyPr>
-          <a:lstStyle>
-            <a:lvl1pPr marL="342900" indent="-306000" algn="l" defTabSz="457200" rtl="0" eaLnBrk="1" latinLnBrk="0" hangingPunct="1">
-              <a:spcBef>
-                <a:spcPct val="20000"/>
-              </a:spcBef>
-              <a:spcAft>
-                <a:spcPts val="600"/>
-              </a:spcAft>
-              <a:buClr>
-                <a:schemeClr val="tx2"/>
-              </a:buClr>
-              <a:buSzPct val="70000"/>
-              <a:buFont typeface="Wingdings 2" charset="2"/>
-              <a:buChar char=""/>
-              <a:defRPr sz="2000" kern="1200">
-                <a:ln>
-                  <a:solidFill>
-                    <a:schemeClr val="bg1">
-                      <a:lumMod val="75000"/>
-                      <a:lumOff val="25000"/>
-                      <a:alpha val="10000"/>
-                    </a:schemeClr>
-                  </a:solidFill>
-                </a:ln>
-                <a:solidFill>
-                  <a:schemeClr val="tx2"/>
-                </a:solidFill>
-                <a:effectLst>
-                  <a:outerShdw blurRad="9525" dist="25400" dir="14640000" algn="tl" rotWithShape="0">
-                    <a:schemeClr val="bg1">
-                      <a:alpha val="30000"/>
-                    </a:schemeClr>
-                  </a:outerShdw>
-                </a:effectLst>
-                <a:latin typeface="+mn-lt"/>
-                <a:ea typeface="+mn-ea"/>
-                <a:cs typeface="+mn-cs"/>
-              </a:defRPr>
-            </a:lvl1pPr>
-            <a:lvl2pPr marL="720000" indent="-270000" algn="l" defTabSz="457200" rtl="0" eaLnBrk="1" latinLnBrk="0" hangingPunct="1">
-              <a:spcBef>
-                <a:spcPct val="20000"/>
-              </a:spcBef>
-              <a:spcAft>
-                <a:spcPts val="600"/>
-              </a:spcAft>
-              <a:buClr>
-                <a:schemeClr val="tx2"/>
-              </a:buClr>
-              <a:buSzPct val="70000"/>
-              <a:buFont typeface="Wingdings 2" charset="2"/>
-              <a:buChar char=""/>
-              <a:defRPr sz="1800" kern="1200">
-                <a:ln>
-                  <a:solidFill>
-                    <a:schemeClr val="bg1">
-                      <a:lumMod val="75000"/>
-                      <a:lumOff val="25000"/>
-                      <a:alpha val="10000"/>
-                    </a:schemeClr>
-                  </a:solidFill>
-                </a:ln>
-                <a:solidFill>
-                  <a:schemeClr val="tx2"/>
-                </a:solidFill>
-                <a:effectLst>
-                  <a:outerShdw blurRad="9525" dist="25400" dir="14640000" algn="tl" rotWithShape="0">
-                    <a:schemeClr val="bg1">
-                      <a:alpha val="30000"/>
-                    </a:schemeClr>
-                  </a:outerShdw>
-                </a:effectLst>
-                <a:latin typeface="+mn-lt"/>
-                <a:ea typeface="+mn-ea"/>
-                <a:cs typeface="+mn-cs"/>
-              </a:defRPr>
-            </a:lvl2pPr>
-            <a:lvl3pPr marL="1026000" indent="-216000" algn="l" defTabSz="457200" rtl="0" eaLnBrk="1" latinLnBrk="0" hangingPunct="1">
-              <a:spcBef>
-                <a:spcPct val="20000"/>
-              </a:spcBef>
-              <a:spcAft>
-                <a:spcPts val="600"/>
-              </a:spcAft>
-              <a:buClr>
-                <a:schemeClr val="tx2"/>
-              </a:buClr>
-              <a:buSzPct val="70000"/>
-              <a:buFont typeface="Wingdings 2" charset="2"/>
-              <a:buChar char=""/>
-              <a:defRPr sz="1600" kern="1200">
-                <a:ln>
-                  <a:solidFill>
-                    <a:schemeClr val="bg1">
-                      <a:lumMod val="75000"/>
-                      <a:lumOff val="25000"/>
-                      <a:alpha val="10000"/>
-                    </a:schemeClr>
-                  </a:solidFill>
-                </a:ln>
-                <a:solidFill>
-                  <a:schemeClr val="tx2"/>
-                </a:solidFill>
-                <a:effectLst>
-                  <a:outerShdw blurRad="9525" dist="25400" dir="14640000" algn="tl" rotWithShape="0">
-                    <a:schemeClr val="bg1">
-                      <a:alpha val="30000"/>
-                    </a:schemeClr>
-                  </a:outerShdw>
-                </a:effectLst>
-                <a:latin typeface="+mn-lt"/>
-                <a:ea typeface="+mn-ea"/>
-                <a:cs typeface="+mn-cs"/>
-              </a:defRPr>
-            </a:lvl3pPr>
-            <a:lvl4pPr marL="1386000" indent="-216000" algn="l" defTabSz="457200" rtl="0" eaLnBrk="1" latinLnBrk="0" hangingPunct="1">
-              <a:spcBef>
-                <a:spcPct val="20000"/>
-              </a:spcBef>
-              <a:spcAft>
-                <a:spcPts val="600"/>
-              </a:spcAft>
-              <a:buClr>
-                <a:schemeClr val="tx2"/>
-              </a:buClr>
-              <a:buSzPct val="70000"/>
-              <a:buFont typeface="Wingdings 2" charset="2"/>
-              <a:buChar char=""/>
-              <a:defRPr sz="1400" kern="1200">
-                <a:ln>
-                  <a:solidFill>
-                    <a:schemeClr val="bg1">
-                      <a:lumMod val="75000"/>
-                      <a:lumOff val="25000"/>
-                      <a:alpha val="10000"/>
-                    </a:schemeClr>
-                  </a:solidFill>
-                </a:ln>
-                <a:solidFill>
-                  <a:schemeClr val="tx2"/>
-                </a:solidFill>
-                <a:effectLst>
-                  <a:outerShdw blurRad="9525" dist="25400" dir="14640000" algn="tl" rotWithShape="0">
-                    <a:schemeClr val="bg1">
-                      <a:alpha val="30000"/>
-                    </a:schemeClr>
-                  </a:outerShdw>
-                </a:effectLst>
-                <a:latin typeface="+mn-lt"/>
-                <a:ea typeface="+mn-ea"/>
-                <a:cs typeface="+mn-cs"/>
-              </a:defRPr>
-            </a:lvl4pPr>
-            <a:lvl5pPr marL="1674000" indent="-216000" algn="l" defTabSz="457200" rtl="0" eaLnBrk="1" latinLnBrk="0" hangingPunct="1">
-              <a:spcBef>
-                <a:spcPct val="20000"/>
-              </a:spcBef>
-              <a:spcAft>
-                <a:spcPts val="600"/>
-              </a:spcAft>
-              <a:buClr>
-                <a:schemeClr val="tx2"/>
-              </a:buClr>
-              <a:buSzPct val="70000"/>
-              <a:buFont typeface="Wingdings 2" charset="2"/>
-              <a:buChar char=""/>
-              <a:defRPr sz="1400" kern="1200">
-                <a:ln>
-                  <a:solidFill>
-                    <a:schemeClr val="bg1">
-                      <a:lumMod val="75000"/>
-                      <a:lumOff val="25000"/>
-                      <a:alpha val="10000"/>
-                    </a:schemeClr>
-                  </a:solidFill>
-                </a:ln>
-                <a:solidFill>
-                  <a:schemeClr val="tx2"/>
-                </a:solidFill>
-                <a:effectLst>
-                  <a:outerShdw blurRad="9525" dist="25400" dir="14640000" algn="tl" rotWithShape="0">
-                    <a:schemeClr val="bg1">
-                      <a:alpha val="30000"/>
-                    </a:schemeClr>
-                  </a:outerShdw>
-                </a:effectLst>
-                <a:latin typeface="+mn-lt"/>
-                <a:ea typeface="+mn-ea"/>
-                <a:cs typeface="+mn-cs"/>
-              </a:defRPr>
-            </a:lvl5pPr>
-            <a:lvl6pPr marL="2014600" indent="-228600" algn="l" defTabSz="457200" rtl="0" eaLnBrk="1" latinLnBrk="0" hangingPunct="1">
-              <a:spcBef>
-                <a:spcPct val="20000"/>
-              </a:spcBef>
-              <a:spcAft>
-                <a:spcPts val="600"/>
-              </a:spcAft>
-              <a:buClr>
-                <a:schemeClr val="tx2"/>
-              </a:buClr>
-              <a:buSzPct val="70000"/>
-              <a:buFont typeface="Wingdings 2" charset="2"/>
-              <a:buChar char=""/>
-              <a:defRPr sz="1400" kern="1200">
-                <a:ln>
-                  <a:solidFill>
-                    <a:schemeClr val="bg1">
-                      <a:lumMod val="75000"/>
-                      <a:lumOff val="25000"/>
-                      <a:alpha val="10000"/>
-                    </a:schemeClr>
-                  </a:solidFill>
-                </a:ln>
-                <a:solidFill>
-                  <a:schemeClr val="tx2"/>
-                </a:solidFill>
-                <a:effectLst>
-                  <a:outerShdw blurRad="9525" dist="25400" dir="14640000" algn="tl" rotWithShape="0">
-                    <a:schemeClr val="bg1">
-                      <a:alpha val="30000"/>
-                    </a:schemeClr>
-                  </a:outerShdw>
-                </a:effectLst>
-                <a:latin typeface="+mn-lt"/>
-                <a:ea typeface="+mn-ea"/>
-                <a:cs typeface="+mn-cs"/>
-              </a:defRPr>
-            </a:lvl6pPr>
-            <a:lvl7pPr marL="2401800" indent="-228600" algn="l" defTabSz="457200" rtl="0" eaLnBrk="1" latinLnBrk="0" hangingPunct="1">
-              <a:spcBef>
-                <a:spcPct val="20000"/>
-              </a:spcBef>
-              <a:spcAft>
-                <a:spcPts val="600"/>
-              </a:spcAft>
-              <a:buClr>
-                <a:schemeClr val="tx2"/>
-              </a:buClr>
-              <a:buSzPct val="70000"/>
-              <a:buFont typeface="Wingdings 2" charset="2"/>
-              <a:buChar char=""/>
-              <a:defRPr sz="1400" kern="1200">
-                <a:ln>
-                  <a:solidFill>
-                    <a:schemeClr val="bg1">
-                      <a:lumMod val="75000"/>
-                      <a:lumOff val="25000"/>
-                      <a:alpha val="10000"/>
-                    </a:schemeClr>
-                  </a:solidFill>
-                </a:ln>
-                <a:solidFill>
-                  <a:schemeClr val="tx2"/>
-                </a:solidFill>
-                <a:effectLst>
-                  <a:outerShdw blurRad="9525" dist="25400" dir="14640000" algn="tl" rotWithShape="0">
-                    <a:schemeClr val="bg1">
-                      <a:alpha val="30000"/>
-                    </a:schemeClr>
-                  </a:outerShdw>
-                </a:effectLst>
-                <a:latin typeface="+mn-lt"/>
-                <a:ea typeface="+mn-ea"/>
-                <a:cs typeface="+mn-cs"/>
-              </a:defRPr>
-            </a:lvl7pPr>
-            <a:lvl8pPr marL="2789000" indent="-228600" algn="l" defTabSz="457200" rtl="0" eaLnBrk="1" latinLnBrk="0" hangingPunct="1">
-              <a:spcBef>
-                <a:spcPct val="20000"/>
-              </a:spcBef>
-              <a:spcAft>
-                <a:spcPts val="600"/>
-              </a:spcAft>
-              <a:buClr>
-                <a:schemeClr val="tx2"/>
-              </a:buClr>
-              <a:buSzPct val="70000"/>
-              <a:buFont typeface="Wingdings 2" charset="2"/>
-              <a:buChar char=""/>
-              <a:defRPr sz="1400" kern="1200">
-                <a:ln>
-                  <a:solidFill>
-                    <a:schemeClr val="bg1">
-                      <a:lumMod val="75000"/>
-                      <a:lumOff val="25000"/>
-                      <a:alpha val="10000"/>
-                    </a:schemeClr>
-                  </a:solidFill>
-                </a:ln>
-                <a:solidFill>
-                  <a:schemeClr val="tx2"/>
-                </a:solidFill>
-                <a:effectLst>
-                  <a:outerShdw blurRad="9525" dist="25400" dir="14640000" algn="tl" rotWithShape="0">
-                    <a:schemeClr val="bg1">
-                      <a:alpha val="30000"/>
-                    </a:schemeClr>
-                  </a:outerShdw>
-                </a:effectLst>
-                <a:latin typeface="+mn-lt"/>
-                <a:ea typeface="+mn-ea"/>
-                <a:cs typeface="+mn-cs"/>
-              </a:defRPr>
-            </a:lvl8pPr>
-            <a:lvl9pPr marL="3106200" indent="-228600" algn="l" defTabSz="457200" rtl="0" eaLnBrk="1" latinLnBrk="0" hangingPunct="1">
-              <a:spcBef>
-                <a:spcPct val="20000"/>
-              </a:spcBef>
-              <a:spcAft>
-                <a:spcPts val="600"/>
-              </a:spcAft>
-              <a:buClr>
-                <a:schemeClr val="tx2"/>
-              </a:buClr>
-              <a:buSzPct val="70000"/>
-              <a:buFont typeface="Wingdings 2" charset="2"/>
-              <a:buChar char=""/>
-              <a:defRPr sz="1400" kern="1200">
-                <a:ln>
-                  <a:solidFill>
-                    <a:schemeClr val="bg1">
-                      <a:lumMod val="75000"/>
-                      <a:lumOff val="25000"/>
-                      <a:alpha val="10000"/>
-                    </a:schemeClr>
-                  </a:solidFill>
-                </a:ln>
-                <a:solidFill>
-                  <a:schemeClr val="tx2"/>
-                </a:solidFill>
-                <a:effectLst>
-                  <a:outerShdw blurRad="9525" dist="25400" dir="14640000" algn="tl" rotWithShape="0">
-                    <a:schemeClr val="bg1">
-                      <a:alpha val="30000"/>
-                    </a:schemeClr>
-                  </a:outerShdw>
-                </a:effectLst>
-                <a:latin typeface="+mn-lt"/>
-                <a:ea typeface="+mn-ea"/>
-                <a:cs typeface="+mn-cs"/>
-              </a:defRPr>
-            </a:lvl9pPr>
-          </a:lstStyle>
-          <a:p>
-            <a:r>
-              <a:rPr lang="en-US" dirty="0"/>
-              <a:t>Example</a:t>
-            </a:r>
-          </a:p>
-          <a:p>
-            <a:pPr lvl="1"/>
-            <a:r>
-              <a:rPr lang="en-US" dirty="0">
-                <a:solidFill>
-                  <a:srgbClr val="C00000"/>
-                </a:solidFill>
-              </a:rPr>
-              <a:t>DELETE</a:t>
-            </a:r>
-            <a:r>
-              <a:rPr lang="en-US" dirty="0"/>
-              <a:t> </a:t>
-            </a:r>
-          </a:p>
-          <a:p>
-            <a:pPr lvl="2"/>
-            <a:r>
-              <a:rPr lang="en-US" sz="1400" dirty="0">
-                <a:latin typeface="Courier New" panose="02070309020205020404" pitchFamily="49" charset="0"/>
-                <a:cs typeface="Courier New" panose="02070309020205020404" pitchFamily="49" charset="0"/>
-              </a:rPr>
-              <a:t>../</a:t>
-            </a:r>
-            <a:r>
-              <a:rPr lang="en-US" sz="1400" dirty="0" err="1">
-                <a:latin typeface="Courier New" panose="02070309020205020404" pitchFamily="49" charset="0"/>
-                <a:cs typeface="Courier New" panose="02070309020205020404" pitchFamily="49" charset="0"/>
-              </a:rPr>
-              <a:t>api</a:t>
-            </a:r>
-            <a:r>
-              <a:rPr lang="en-US" sz="1400" dirty="0">
-                <a:latin typeface="Courier New" panose="02070309020205020404" pitchFamily="49" charset="0"/>
-                <a:cs typeface="Courier New" panose="02070309020205020404" pitchFamily="49" charset="0"/>
-              </a:rPr>
-              <a:t>/v1/books/{id}</a:t>
-            </a:r>
-            <a:endParaRPr lang="en-US" dirty="0"/>
-          </a:p>
-          <a:p>
-            <a:pPr lvl="1"/>
-            <a:r>
-              <a:rPr lang="en-US" sz="1600" dirty="0"/>
-              <a:t>Server responds with</a:t>
-            </a:r>
-          </a:p>
-          <a:p>
-            <a:pPr lvl="2"/>
-            <a:r>
-              <a:rPr lang="en-US" sz="1400" dirty="0">
-                <a:latin typeface="Courier New" panose="02070309020205020404" pitchFamily="49" charset="0"/>
-                <a:cs typeface="Courier New" panose="02070309020205020404" pitchFamily="49" charset="0"/>
-              </a:rPr>
-              <a:t>HTTP 200 – OK</a:t>
-            </a:r>
-          </a:p>
-          <a:p>
-            <a:pPr lvl="2"/>
-            <a:r>
-              <a:rPr lang="en-US" sz="1400" dirty="0">
-                <a:latin typeface="Courier New" panose="02070309020205020404" pitchFamily="49" charset="0"/>
-                <a:cs typeface="Courier New" panose="02070309020205020404" pitchFamily="49" charset="0"/>
-              </a:rPr>
-              <a:t>HTTP 204 – No Content</a:t>
-            </a:r>
-            <a:r>
-              <a:rPr lang="en-US" sz="1400" dirty="0"/>
-              <a:t> </a:t>
-            </a:r>
-          </a:p>
-          <a:p>
-            <a:pPr lvl="1"/>
-            <a:r>
-              <a:rPr lang="en-US" dirty="0">
-                <a:solidFill>
-                  <a:srgbClr val="C00000"/>
-                </a:solidFill>
-              </a:rPr>
-              <a:t>DELETE</a:t>
-            </a:r>
-            <a:r>
-              <a:rPr lang="en-US" dirty="0"/>
-              <a:t> </a:t>
-            </a:r>
-            <a:r>
-              <a:rPr lang="en-US" dirty="0">
-                <a:latin typeface="Courier New" panose="02070309020205020404" pitchFamily="49" charset="0"/>
-                <a:cs typeface="Courier New" panose="02070309020205020404" pitchFamily="49" charset="0"/>
-              </a:rPr>
-              <a:t>../</a:t>
-            </a:r>
-            <a:r>
-              <a:rPr lang="en-US" dirty="0" err="1">
-                <a:latin typeface="Courier New" panose="02070309020205020404" pitchFamily="49" charset="0"/>
-                <a:cs typeface="Courier New" panose="02070309020205020404" pitchFamily="49" charset="0"/>
-              </a:rPr>
-              <a:t>api</a:t>
-            </a:r>
-            <a:r>
-              <a:rPr lang="en-US" dirty="0">
-                <a:latin typeface="Courier New" panose="02070309020205020404" pitchFamily="49" charset="0"/>
-                <a:cs typeface="Courier New" panose="02070309020205020404" pitchFamily="49" charset="0"/>
-              </a:rPr>
-              <a:t>/v1/bulk/books</a:t>
-            </a:r>
-            <a:endParaRPr lang="en-US" sz="1600" dirty="0">
-              <a:latin typeface="Courier New" panose="02070309020205020404" pitchFamily="49" charset="0"/>
-              <a:cs typeface="Courier New" panose="02070309020205020404" pitchFamily="49" charset="0"/>
-            </a:endParaRPr>
-          </a:p>
-          <a:p>
-            <a:pPr lvl="2"/>
-            <a:r>
-              <a:rPr lang="en-US" sz="1400" dirty="0">
-                <a:latin typeface="Courier New" panose="02070309020205020404" pitchFamily="49" charset="0"/>
-                <a:cs typeface="Courier New" panose="02070309020205020404" pitchFamily="49" charset="0"/>
-              </a:rPr>
-              <a:t>Body: [{JSON book1}, {JSON book2}, etc.]</a:t>
-            </a:r>
-          </a:p>
-          <a:p>
-            <a:pPr lvl="2"/>
-            <a:r>
-              <a:rPr lang="en-US" sz="1400" dirty="0"/>
-              <a:t>Server responds with</a:t>
-            </a:r>
-          </a:p>
-          <a:p>
-            <a:pPr lvl="3"/>
-            <a:r>
-              <a:rPr lang="en-US" sz="1200" dirty="0">
-                <a:latin typeface="Courier New" panose="02070309020205020404" pitchFamily="49" charset="0"/>
-                <a:cs typeface="Courier New" panose="02070309020205020404" pitchFamily="49" charset="0"/>
-              </a:rPr>
-              <a:t>HTTP 200 – OK</a:t>
-            </a:r>
-            <a:r>
-              <a:rPr lang="en-US" sz="1200" dirty="0"/>
-              <a:t>  (if it can finish it in reasonable amount of time)</a:t>
-            </a:r>
-          </a:p>
-          <a:p>
-            <a:pPr lvl="3"/>
-            <a:r>
-              <a:rPr lang="en-US" sz="1200" dirty="0">
-                <a:latin typeface="Courier New" panose="02070309020205020404" pitchFamily="49" charset="0"/>
-                <a:cs typeface="Courier New" panose="02070309020205020404" pitchFamily="49" charset="0"/>
-              </a:rPr>
-              <a:t>HTTP 202 – Accepted</a:t>
-            </a:r>
-            <a:r>
-              <a:rPr lang="en-US" sz="1200" dirty="0"/>
-              <a:t> (if client needs to call back to get the results async)</a:t>
-            </a:r>
-          </a:p>
-          <a:p>
-            <a:pPr lvl="1"/>
-            <a:endParaRPr lang="en-US" sz="1400" dirty="0"/>
-          </a:p>
-          <a:p>
-            <a:pPr lvl="2"/>
-            <a:r>
-              <a:rPr lang="en-US" dirty="0"/>
-              <a:t>[{book-id-1}, {book-id-2}, …]</a:t>
-            </a:r>
-          </a:p>
-        </p:txBody>
-      </p:sp>
-    </p:spTree>
-    <p:extLst>
-      <p:ext uri="{BB962C8B-B14F-4D97-AF65-F5344CB8AC3E}">
-        <p14:creationId xmlns:p14="http://schemas.microsoft.com/office/powerpoint/2010/main" val="3537769129"/>
-      </p:ext>
-    </p:extLst>
-  </p:cSld>
-  <p:clrMapOvr>
-    <a:masterClrMapping/>
-  </p:clrMapOvr>
-</p:sld>
-</file>
-
-<file path=ppt/slides/slide59.xml><?xml version="1.0" encoding="utf-8"?>
-<p:sld xmlns:a="http://schemas.openxmlformats.org/drawingml/2006/main" xmlns:r="http://schemas.openxmlformats.org/officeDocument/2006/relationships" xmlns:p="http://schemas.openxmlformats.org/presentationml/2006/main">
-  <p:cSld>
-    <p:spTree>
-      <p:nvGrpSpPr>
-        <p:cNvPr id="1" name="">
-          <a:extLst>
-            <a:ext uri="{FF2B5EF4-FFF2-40B4-BE49-F238E27FC236}">
-              <a16:creationId xmlns:a16="http://schemas.microsoft.com/office/drawing/2014/main" id="{75A5F37A-C20A-04B5-FD50-DAA1C2374788}"/>
-            </a:ext>
-          </a:extLst>
-        </p:cNvPr>
-        <p:cNvGrpSpPr/>
-        <p:nvPr/>
-      </p:nvGrpSpPr>
-      <p:grpSpPr>
-        <a:xfrm>
-          <a:off x="0" y="0"/>
-          <a:ext cx="0" cy="0"/>
-          <a:chOff x="0" y="0"/>
-          <a:chExt cx="0" cy="0"/>
-        </a:xfrm>
-      </p:grpSpPr>
-      <p:sp>
-        <p:nvSpPr>
-          <p:cNvPr id="2" name="Title 1">
-            <a:extLst>
-              <a:ext uri="{FF2B5EF4-FFF2-40B4-BE49-F238E27FC236}">
-                <a16:creationId xmlns:a16="http://schemas.microsoft.com/office/drawing/2014/main" id="{11E8E1E4-718D-52FE-0FBF-162BC449DAB0}"/>
-              </a:ext>
-            </a:extLst>
-          </p:cNvPr>
-          <p:cNvSpPr>
-            <a:spLocks noGrp="1"/>
-          </p:cNvSpPr>
-          <p:nvPr>
-            <p:ph type="title"/>
-          </p:nvPr>
-        </p:nvSpPr>
-        <p:spPr/>
-        <p:txBody>
-          <a:bodyPr/>
-          <a:lstStyle/>
-          <a:p>
-            <a:r>
-              <a:rPr lang="en-US" dirty="0"/>
-              <a:t>REST API Design | HTTP Codes</a:t>
-            </a:r>
-          </a:p>
-        </p:txBody>
-      </p:sp>
-      <p:sp>
-        <p:nvSpPr>
-          <p:cNvPr id="3" name="Content Placeholder 2">
-            <a:extLst>
-              <a:ext uri="{FF2B5EF4-FFF2-40B4-BE49-F238E27FC236}">
-                <a16:creationId xmlns:a16="http://schemas.microsoft.com/office/drawing/2014/main" id="{0C109AD2-F26E-E5EC-3F58-926DB1ED7051}"/>
-              </a:ext>
-            </a:extLst>
-          </p:cNvPr>
-          <p:cNvSpPr>
-            <a:spLocks noGrp="1"/>
-          </p:cNvSpPr>
-          <p:nvPr>
-            <p:ph idx="1"/>
-          </p:nvPr>
-        </p:nvSpPr>
-        <p:spPr>
-          <a:xfrm>
-            <a:off x="385887" y="1580049"/>
-            <a:ext cx="5459573" cy="5031061"/>
-          </a:xfrm>
-        </p:spPr>
-        <p:txBody>
-          <a:bodyPr>
-            <a:normAutofit fontScale="62500" lnSpcReduction="20000"/>
-          </a:bodyPr>
-          <a:lstStyle/>
-          <a:p>
-            <a:r>
-              <a:rPr lang="en-US" dirty="0"/>
-              <a:t>Map requests/responses from </a:t>
-            </a:r>
-            <a:r>
-              <a:rPr lang="en-US" dirty="0">
-                <a:solidFill>
-                  <a:srgbClr val="FFC000"/>
-                </a:solidFill>
-              </a:rPr>
-              <a:t>HTTP</a:t>
-            </a:r>
-            <a:r>
-              <a:rPr lang="en-US" dirty="0"/>
-              <a:t> Verbs to </a:t>
-            </a:r>
-            <a:r>
-              <a:rPr lang="en-US" dirty="0">
-                <a:solidFill>
-                  <a:srgbClr val="FFC000"/>
-                </a:solidFill>
-              </a:rPr>
-              <a:t>HTTP</a:t>
-            </a:r>
-            <a:r>
-              <a:rPr lang="en-US" dirty="0"/>
-              <a:t> Status Codes</a:t>
-            </a:r>
-          </a:p>
-          <a:p>
-            <a:r>
-              <a:rPr lang="en-US" dirty="0">
-                <a:solidFill>
-                  <a:srgbClr val="00B050"/>
-                </a:solidFill>
-              </a:rPr>
-              <a:t>GET</a:t>
-            </a:r>
-            <a:r>
-              <a:rPr lang="en-US" dirty="0"/>
-              <a:t> – Retrieve a resource</a:t>
-            </a:r>
-          </a:p>
-          <a:p>
-            <a:pPr lvl="1"/>
-            <a:r>
-              <a:rPr lang="en-US" dirty="0"/>
-              <a:t>200 Ok; 304 Not Modified; 404 Not Found</a:t>
-            </a:r>
-          </a:p>
-          <a:p>
-            <a:r>
-              <a:rPr lang="en-US" dirty="0">
-                <a:solidFill>
-                  <a:srgbClr val="00B0F0"/>
-                </a:solidFill>
-              </a:rPr>
-              <a:t>POST</a:t>
-            </a:r>
-            <a:r>
-              <a:rPr lang="en-US" dirty="0"/>
-              <a:t> – Create a resource</a:t>
-            </a:r>
-          </a:p>
-          <a:p>
-            <a:pPr lvl="1"/>
-            <a:r>
-              <a:rPr lang="en-US" dirty="0"/>
-              <a:t>201 Created; 200 OK + JSON; 202 Accepted (callback is needed to ensure creation was OK); 204 No Content is acceptable for “action” style POST operations (e.g., command type of endpoint)</a:t>
-            </a:r>
-          </a:p>
-          <a:p>
-            <a:r>
-              <a:rPr lang="en-US" dirty="0">
-                <a:solidFill>
-                  <a:srgbClr val="FFC000"/>
-                </a:solidFill>
-              </a:rPr>
-              <a:t>PUT</a:t>
-            </a:r>
-            <a:r>
-              <a:rPr lang="en-US" dirty="0"/>
-              <a:t> – Replace a whole resource</a:t>
-            </a:r>
-          </a:p>
-          <a:p>
-            <a:pPr lvl="1"/>
-            <a:r>
-              <a:rPr lang="en-US" dirty="0"/>
-              <a:t>204 No Content; 200 OK + JSON</a:t>
-            </a:r>
-          </a:p>
-          <a:p>
-            <a:r>
-              <a:rPr lang="en-US" dirty="0">
-                <a:solidFill>
-                  <a:srgbClr val="FFC000"/>
-                </a:solidFill>
-              </a:rPr>
-              <a:t>PATCH</a:t>
-            </a:r>
-            <a:r>
-              <a:rPr lang="en-US" dirty="0"/>
-              <a:t> – Partially update a resource</a:t>
-            </a:r>
-          </a:p>
-          <a:p>
-            <a:pPr lvl="1"/>
-            <a:r>
-              <a:rPr lang="en-US" dirty="0"/>
-              <a:t>200 OK; 204 No Content; 404 Not Found; 409 Conflict / 412 Precondition Failed common when using e-Tags</a:t>
-            </a:r>
-          </a:p>
-          <a:p>
-            <a:r>
-              <a:rPr lang="en-US" dirty="0">
-                <a:solidFill>
-                  <a:srgbClr val="FF0000"/>
-                </a:solidFill>
-              </a:rPr>
-              <a:t>DELETE</a:t>
-            </a:r>
-            <a:r>
-              <a:rPr lang="en-US" dirty="0"/>
-              <a:t> – Remove a resource</a:t>
-            </a:r>
-          </a:p>
-          <a:p>
-            <a:pPr lvl="1"/>
-            <a:r>
-              <a:rPr lang="en-US" dirty="0"/>
-              <a:t>204 No Content; 200 OK + JSON; 404 Not Found; 202 Accepted (for asynchronous deletes)</a:t>
-            </a:r>
-          </a:p>
-          <a:p>
-            <a:r>
-              <a:rPr lang="en-US" dirty="0">
-                <a:solidFill>
-                  <a:schemeClr val="accent3"/>
-                </a:solidFill>
-              </a:rPr>
-              <a:t>HEAD</a:t>
-            </a:r>
-            <a:r>
-              <a:rPr lang="en-US" dirty="0"/>
-              <a:t> – Retrieves headers only</a:t>
-            </a:r>
-          </a:p>
-          <a:p>
-            <a:pPr lvl="1"/>
-            <a:r>
-              <a:rPr lang="en-US" dirty="0"/>
-              <a:t>200 OK; </a:t>
-            </a:r>
-          </a:p>
-          <a:p>
-            <a:r>
-              <a:rPr lang="en-US" dirty="0">
-                <a:solidFill>
-                  <a:schemeClr val="accent3"/>
-                </a:solidFill>
-              </a:rPr>
-              <a:t>OPTIONS</a:t>
-            </a:r>
-            <a:r>
-              <a:rPr lang="en-US" dirty="0"/>
-              <a:t> – Discovery methods/metadata</a:t>
-            </a:r>
-          </a:p>
-          <a:p>
-            <a:pPr lvl="1"/>
-            <a:r>
-              <a:rPr lang="en-US" dirty="0"/>
-              <a:t>204 No Content or 200 OK with “Allow” and “CORS” headers; 404 Not Found if “target” option is required</a:t>
-            </a:r>
-          </a:p>
-          <a:p>
-            <a:pPr lvl="2"/>
-            <a:endParaRPr lang="en-US" dirty="0"/>
-          </a:p>
-        </p:txBody>
-      </p:sp>
-      <p:sp>
-        <p:nvSpPr>
-          <p:cNvPr id="5" name="Content Placeholder 2">
-            <a:extLst>
-              <a:ext uri="{FF2B5EF4-FFF2-40B4-BE49-F238E27FC236}">
-                <a16:creationId xmlns:a16="http://schemas.microsoft.com/office/drawing/2014/main" id="{430963A6-B3B4-058B-8767-9F094B77099A}"/>
-              </a:ext>
-            </a:extLst>
-          </p:cNvPr>
-          <p:cNvSpPr txBox="1">
-            <a:spLocks/>
-          </p:cNvSpPr>
-          <p:nvPr/>
-        </p:nvSpPr>
-        <p:spPr>
-          <a:xfrm>
-            <a:off x="6373368" y="1580051"/>
-            <a:ext cx="5532120" cy="2662765"/>
-          </a:xfrm>
-          <a:prstGeom prst="rect">
-            <a:avLst/>
-          </a:prstGeom>
-          <a:effectLst>
-            <a:outerShdw blurRad="25400" dir="17880000">
-              <a:srgbClr val="000000">
-                <a:alpha val="46000"/>
-              </a:srgbClr>
-            </a:outerShdw>
-          </a:effectLst>
-        </p:spPr>
-        <p:txBody>
-          <a:bodyPr vert="horz" lIns="91440" tIns="45720" rIns="91440" bIns="45720" rtlCol="0" anchor="t">
-            <a:normAutofit fontScale="62500" lnSpcReduction="20000"/>
-          </a:bodyPr>
-          <a:lstStyle>
-            <a:lvl1pPr marL="342900" indent="-306000" algn="l" defTabSz="457200" rtl="0" eaLnBrk="1" latinLnBrk="0" hangingPunct="1">
-              <a:spcBef>
-                <a:spcPct val="20000"/>
-              </a:spcBef>
-              <a:spcAft>
-                <a:spcPts val="600"/>
-              </a:spcAft>
-              <a:buClr>
-                <a:schemeClr val="tx2"/>
-              </a:buClr>
-              <a:buSzPct val="70000"/>
-              <a:buFont typeface="Wingdings 2" charset="2"/>
-              <a:buChar char=""/>
-              <a:defRPr sz="2000" kern="1200">
-                <a:ln>
-                  <a:solidFill>
-                    <a:schemeClr val="bg1">
-                      <a:lumMod val="75000"/>
-                      <a:lumOff val="25000"/>
-                      <a:alpha val="10000"/>
-                    </a:schemeClr>
-                  </a:solidFill>
-                </a:ln>
-                <a:solidFill>
-                  <a:schemeClr val="tx2"/>
-                </a:solidFill>
-                <a:effectLst>
-                  <a:outerShdw blurRad="9525" dist="25400" dir="14640000" algn="tl" rotWithShape="0">
-                    <a:schemeClr val="bg1">
-                      <a:alpha val="30000"/>
-                    </a:schemeClr>
-                  </a:outerShdw>
-                </a:effectLst>
-                <a:latin typeface="+mn-lt"/>
-                <a:ea typeface="+mn-ea"/>
-                <a:cs typeface="+mn-cs"/>
-              </a:defRPr>
-            </a:lvl1pPr>
-            <a:lvl2pPr marL="720000" indent="-270000" algn="l" defTabSz="457200" rtl="0" eaLnBrk="1" latinLnBrk="0" hangingPunct="1">
-              <a:spcBef>
-                <a:spcPct val="20000"/>
-              </a:spcBef>
-              <a:spcAft>
-                <a:spcPts val="600"/>
-              </a:spcAft>
-              <a:buClr>
-                <a:schemeClr val="tx2"/>
-              </a:buClr>
-              <a:buSzPct val="70000"/>
-              <a:buFont typeface="Wingdings 2" charset="2"/>
-              <a:buChar char=""/>
-              <a:defRPr sz="1800" kern="1200">
-                <a:ln>
-                  <a:solidFill>
-                    <a:schemeClr val="bg1">
-                      <a:lumMod val="75000"/>
-                      <a:lumOff val="25000"/>
-                      <a:alpha val="10000"/>
-                    </a:schemeClr>
-                  </a:solidFill>
-                </a:ln>
-                <a:solidFill>
-                  <a:schemeClr val="tx2"/>
-                </a:solidFill>
-                <a:effectLst>
-                  <a:outerShdw blurRad="9525" dist="25400" dir="14640000" algn="tl" rotWithShape="0">
-                    <a:schemeClr val="bg1">
-                      <a:alpha val="30000"/>
-                    </a:schemeClr>
-                  </a:outerShdw>
-                </a:effectLst>
-                <a:latin typeface="+mn-lt"/>
-                <a:ea typeface="+mn-ea"/>
-                <a:cs typeface="+mn-cs"/>
-              </a:defRPr>
-            </a:lvl2pPr>
-            <a:lvl3pPr marL="1026000" indent="-216000" algn="l" defTabSz="457200" rtl="0" eaLnBrk="1" latinLnBrk="0" hangingPunct="1">
-              <a:spcBef>
-                <a:spcPct val="20000"/>
-              </a:spcBef>
-              <a:spcAft>
-                <a:spcPts val="600"/>
-              </a:spcAft>
-              <a:buClr>
-                <a:schemeClr val="tx2"/>
-              </a:buClr>
-              <a:buSzPct val="70000"/>
-              <a:buFont typeface="Wingdings 2" charset="2"/>
-              <a:buChar char=""/>
-              <a:defRPr sz="1600" kern="1200">
-                <a:ln>
-                  <a:solidFill>
-                    <a:schemeClr val="bg1">
-                      <a:lumMod val="75000"/>
-                      <a:lumOff val="25000"/>
-                      <a:alpha val="10000"/>
-                    </a:schemeClr>
-                  </a:solidFill>
-                </a:ln>
-                <a:solidFill>
-                  <a:schemeClr val="tx2"/>
-                </a:solidFill>
-                <a:effectLst>
-                  <a:outerShdw blurRad="9525" dist="25400" dir="14640000" algn="tl" rotWithShape="0">
-                    <a:schemeClr val="bg1">
-                      <a:alpha val="30000"/>
-                    </a:schemeClr>
-                  </a:outerShdw>
-                </a:effectLst>
-                <a:latin typeface="+mn-lt"/>
-                <a:ea typeface="+mn-ea"/>
-                <a:cs typeface="+mn-cs"/>
-              </a:defRPr>
-            </a:lvl3pPr>
-            <a:lvl4pPr marL="1386000" indent="-216000" algn="l" defTabSz="457200" rtl="0" eaLnBrk="1" latinLnBrk="0" hangingPunct="1">
-              <a:spcBef>
-                <a:spcPct val="20000"/>
-              </a:spcBef>
-              <a:spcAft>
-                <a:spcPts val="600"/>
-              </a:spcAft>
-              <a:buClr>
-                <a:schemeClr val="tx2"/>
-              </a:buClr>
-              <a:buSzPct val="70000"/>
-              <a:buFont typeface="Wingdings 2" charset="2"/>
-              <a:buChar char=""/>
-              <a:defRPr sz="1400" kern="1200">
-                <a:ln>
-                  <a:solidFill>
-                    <a:schemeClr val="bg1">
-                      <a:lumMod val="75000"/>
-                      <a:lumOff val="25000"/>
-                      <a:alpha val="10000"/>
-                    </a:schemeClr>
-                  </a:solidFill>
-                </a:ln>
-                <a:solidFill>
-                  <a:schemeClr val="tx2"/>
-                </a:solidFill>
-                <a:effectLst>
-                  <a:outerShdw blurRad="9525" dist="25400" dir="14640000" algn="tl" rotWithShape="0">
-                    <a:schemeClr val="bg1">
-                      <a:alpha val="30000"/>
-                    </a:schemeClr>
-                  </a:outerShdw>
-                </a:effectLst>
-                <a:latin typeface="+mn-lt"/>
-                <a:ea typeface="+mn-ea"/>
-                <a:cs typeface="+mn-cs"/>
-              </a:defRPr>
-            </a:lvl4pPr>
-            <a:lvl5pPr marL="1674000" indent="-216000" algn="l" defTabSz="457200" rtl="0" eaLnBrk="1" latinLnBrk="0" hangingPunct="1">
-              <a:spcBef>
-                <a:spcPct val="20000"/>
-              </a:spcBef>
-              <a:spcAft>
-                <a:spcPts val="600"/>
-              </a:spcAft>
-              <a:buClr>
-                <a:schemeClr val="tx2"/>
-              </a:buClr>
-              <a:buSzPct val="70000"/>
-              <a:buFont typeface="Wingdings 2" charset="2"/>
-              <a:buChar char=""/>
-              <a:defRPr sz="1400" kern="1200">
-                <a:ln>
-                  <a:solidFill>
-                    <a:schemeClr val="bg1">
-                      <a:lumMod val="75000"/>
-                      <a:lumOff val="25000"/>
-                      <a:alpha val="10000"/>
-                    </a:schemeClr>
-                  </a:solidFill>
-                </a:ln>
-                <a:solidFill>
-                  <a:schemeClr val="tx2"/>
-                </a:solidFill>
-                <a:effectLst>
-                  <a:outerShdw blurRad="9525" dist="25400" dir="14640000" algn="tl" rotWithShape="0">
-                    <a:schemeClr val="bg1">
-                      <a:alpha val="30000"/>
-                    </a:schemeClr>
-                  </a:outerShdw>
-                </a:effectLst>
-                <a:latin typeface="+mn-lt"/>
-                <a:ea typeface="+mn-ea"/>
-                <a:cs typeface="+mn-cs"/>
-              </a:defRPr>
-            </a:lvl5pPr>
-            <a:lvl6pPr marL="2014600" indent="-228600" algn="l" defTabSz="457200" rtl="0" eaLnBrk="1" latinLnBrk="0" hangingPunct="1">
-              <a:spcBef>
-                <a:spcPct val="20000"/>
-              </a:spcBef>
-              <a:spcAft>
-                <a:spcPts val="600"/>
-              </a:spcAft>
-              <a:buClr>
-                <a:schemeClr val="tx2"/>
-              </a:buClr>
-              <a:buSzPct val="70000"/>
-              <a:buFont typeface="Wingdings 2" charset="2"/>
-              <a:buChar char=""/>
-              <a:defRPr sz="1400" kern="1200">
-                <a:ln>
-                  <a:solidFill>
-                    <a:schemeClr val="bg1">
-                      <a:lumMod val="75000"/>
-                      <a:lumOff val="25000"/>
-                      <a:alpha val="10000"/>
-                    </a:schemeClr>
-                  </a:solidFill>
-                </a:ln>
-                <a:solidFill>
-                  <a:schemeClr val="tx2"/>
-                </a:solidFill>
-                <a:effectLst>
-                  <a:outerShdw blurRad="9525" dist="25400" dir="14640000" algn="tl" rotWithShape="0">
-                    <a:schemeClr val="bg1">
-                      <a:alpha val="30000"/>
-                    </a:schemeClr>
-                  </a:outerShdw>
-                </a:effectLst>
-                <a:latin typeface="+mn-lt"/>
-                <a:ea typeface="+mn-ea"/>
-                <a:cs typeface="+mn-cs"/>
-              </a:defRPr>
-            </a:lvl6pPr>
-            <a:lvl7pPr marL="2401800" indent="-228600" algn="l" defTabSz="457200" rtl="0" eaLnBrk="1" latinLnBrk="0" hangingPunct="1">
-              <a:spcBef>
-                <a:spcPct val="20000"/>
-              </a:spcBef>
-              <a:spcAft>
-                <a:spcPts val="600"/>
-              </a:spcAft>
-              <a:buClr>
-                <a:schemeClr val="tx2"/>
-              </a:buClr>
-              <a:buSzPct val="70000"/>
-              <a:buFont typeface="Wingdings 2" charset="2"/>
-              <a:buChar char=""/>
-              <a:defRPr sz="1400" kern="1200">
-                <a:ln>
-                  <a:solidFill>
-                    <a:schemeClr val="bg1">
-                      <a:lumMod val="75000"/>
-                      <a:lumOff val="25000"/>
-                      <a:alpha val="10000"/>
-                    </a:schemeClr>
-                  </a:solidFill>
-                </a:ln>
-                <a:solidFill>
-                  <a:schemeClr val="tx2"/>
-                </a:solidFill>
-                <a:effectLst>
-                  <a:outerShdw blurRad="9525" dist="25400" dir="14640000" algn="tl" rotWithShape="0">
-                    <a:schemeClr val="bg1">
-                      <a:alpha val="30000"/>
-                    </a:schemeClr>
-                  </a:outerShdw>
-                </a:effectLst>
-                <a:latin typeface="+mn-lt"/>
-                <a:ea typeface="+mn-ea"/>
-                <a:cs typeface="+mn-cs"/>
-              </a:defRPr>
-            </a:lvl7pPr>
-            <a:lvl8pPr marL="2789000" indent="-228600" algn="l" defTabSz="457200" rtl="0" eaLnBrk="1" latinLnBrk="0" hangingPunct="1">
-              <a:spcBef>
-                <a:spcPct val="20000"/>
-              </a:spcBef>
-              <a:spcAft>
-                <a:spcPts val="600"/>
-              </a:spcAft>
-              <a:buClr>
-                <a:schemeClr val="tx2"/>
-              </a:buClr>
-              <a:buSzPct val="70000"/>
-              <a:buFont typeface="Wingdings 2" charset="2"/>
-              <a:buChar char=""/>
-              <a:defRPr sz="1400" kern="1200">
-                <a:ln>
-                  <a:solidFill>
-                    <a:schemeClr val="bg1">
-                      <a:lumMod val="75000"/>
-                      <a:lumOff val="25000"/>
-                      <a:alpha val="10000"/>
-                    </a:schemeClr>
-                  </a:solidFill>
-                </a:ln>
-                <a:solidFill>
-                  <a:schemeClr val="tx2"/>
-                </a:solidFill>
-                <a:effectLst>
-                  <a:outerShdw blurRad="9525" dist="25400" dir="14640000" algn="tl" rotWithShape="0">
-                    <a:schemeClr val="bg1">
-                      <a:alpha val="30000"/>
-                    </a:schemeClr>
-                  </a:outerShdw>
-                </a:effectLst>
-                <a:latin typeface="+mn-lt"/>
-                <a:ea typeface="+mn-ea"/>
-                <a:cs typeface="+mn-cs"/>
-              </a:defRPr>
-            </a:lvl8pPr>
-            <a:lvl9pPr marL="3106200" indent="-228600" algn="l" defTabSz="457200" rtl="0" eaLnBrk="1" latinLnBrk="0" hangingPunct="1">
-              <a:spcBef>
-                <a:spcPct val="20000"/>
-              </a:spcBef>
-              <a:spcAft>
-                <a:spcPts val="600"/>
-              </a:spcAft>
-              <a:buClr>
-                <a:schemeClr val="tx2"/>
-              </a:buClr>
-              <a:buSzPct val="70000"/>
-              <a:buFont typeface="Wingdings 2" charset="2"/>
-              <a:buChar char=""/>
-              <a:defRPr sz="1400" kern="1200">
-                <a:ln>
-                  <a:solidFill>
-                    <a:schemeClr val="bg1">
-                      <a:lumMod val="75000"/>
-                      <a:lumOff val="25000"/>
-                      <a:alpha val="10000"/>
-                    </a:schemeClr>
-                  </a:solidFill>
-                </a:ln>
-                <a:solidFill>
-                  <a:schemeClr val="tx2"/>
-                </a:solidFill>
-                <a:effectLst>
-                  <a:outerShdw blurRad="9525" dist="25400" dir="14640000" algn="tl" rotWithShape="0">
-                    <a:schemeClr val="bg1">
-                      <a:alpha val="30000"/>
-                    </a:schemeClr>
-                  </a:outerShdw>
-                </a:effectLst>
-                <a:latin typeface="+mn-lt"/>
-                <a:ea typeface="+mn-ea"/>
-                <a:cs typeface="+mn-cs"/>
-              </a:defRPr>
-            </a:lvl9pPr>
-          </a:lstStyle>
-          <a:p>
-            <a:r>
-              <a:rPr lang="en-US" dirty="0"/>
-              <a:t>Cross-cutting HTTP Status Codes for any HTTP Verb</a:t>
-            </a:r>
-          </a:p>
-          <a:p>
-            <a:pPr lvl="1"/>
-            <a:r>
-              <a:rPr lang="en-US" dirty="0"/>
-              <a:t>400 Bad Request</a:t>
-            </a:r>
-          </a:p>
-          <a:p>
-            <a:pPr lvl="1"/>
-            <a:r>
-              <a:rPr lang="en-US" dirty="0"/>
-              <a:t>401 Unauthorized</a:t>
-            </a:r>
-          </a:p>
-          <a:p>
-            <a:pPr lvl="1"/>
-            <a:r>
-              <a:rPr lang="en-US" dirty="0"/>
-              <a:t>403 Forbidden</a:t>
-            </a:r>
-          </a:p>
-          <a:p>
-            <a:pPr lvl="1"/>
-            <a:r>
-              <a:rPr lang="en-US" dirty="0"/>
-              <a:t>405 Method not Allowed</a:t>
-            </a:r>
-          </a:p>
-          <a:p>
-            <a:pPr lvl="1"/>
-            <a:r>
-              <a:rPr lang="en-US" dirty="0"/>
-              <a:t>415 Unsupported Media Type</a:t>
-            </a:r>
-          </a:p>
-          <a:p>
-            <a:pPr lvl="1"/>
-            <a:r>
-              <a:rPr lang="en-US" dirty="0"/>
-              <a:t>429 Too many requests (specially for quotas)</a:t>
-            </a:r>
-          </a:p>
-          <a:p>
-            <a:pPr lvl="1"/>
-            <a:r>
-              <a:rPr lang="en-US" dirty="0"/>
-              <a:t>500 Internal Server Error</a:t>
-            </a:r>
-          </a:p>
-          <a:p>
-            <a:pPr lvl="1"/>
-            <a:r>
-              <a:rPr lang="en-US" dirty="0"/>
-              <a:t>503 Service Unavailable</a:t>
-            </a:r>
-          </a:p>
-          <a:p>
-            <a:r>
-              <a:rPr lang="en-US" dirty="0"/>
-              <a:t>More Info – Check out RFC 9110</a:t>
-            </a:r>
-          </a:p>
-          <a:p>
-            <a:endParaRPr lang="en-US" dirty="0"/>
-          </a:p>
-        </p:txBody>
-      </p:sp>
-      <p:pic>
-        <p:nvPicPr>
-          <p:cNvPr id="7" name="Picture 6">
-            <a:extLst>
-              <a:ext uri="{FF2B5EF4-FFF2-40B4-BE49-F238E27FC236}">
-                <a16:creationId xmlns:a16="http://schemas.microsoft.com/office/drawing/2014/main" id="{70CE2634-3AF9-C359-5236-E1C014BB1F38}"/>
-              </a:ext>
-            </a:extLst>
-          </p:cNvPr>
-          <p:cNvPicPr>
-            <a:picLocks noChangeAspect="1"/>
-          </p:cNvPicPr>
-          <p:nvPr/>
-        </p:nvPicPr>
-        <p:blipFill>
-          <a:blip r:embed="rId2"/>
-          <a:stretch>
-            <a:fillRect/>
-          </a:stretch>
-        </p:blipFill>
-        <p:spPr>
-          <a:xfrm>
-            <a:off x="6467104" y="4242816"/>
-            <a:ext cx="5191496" cy="2324255"/>
-          </a:xfrm>
-          <a:prstGeom prst="rect">
-            <a:avLst/>
-          </a:prstGeom>
-        </p:spPr>
-      </p:pic>
-    </p:spTree>
-    <p:extLst>
-      <p:ext uri="{BB962C8B-B14F-4D97-AF65-F5344CB8AC3E}">
-        <p14:creationId xmlns:p14="http://schemas.microsoft.com/office/powerpoint/2010/main" val="1093412864"/>
       </p:ext>
     </p:extLst>
   </p:cSld>
@@ -28418,6 +27275,1494 @@
         <p:cNvPr id="1" name="">
           <a:extLst>
             <a:ext uri="{FF2B5EF4-FFF2-40B4-BE49-F238E27FC236}">
+              <a16:creationId xmlns:a16="http://schemas.microsoft.com/office/drawing/2014/main" id="{744D03D6-5C0F-CA3E-86DD-0A6FA99A1F6C}"/>
+            </a:ext>
+          </a:extLst>
+        </p:cNvPr>
+        <p:cNvGrpSpPr/>
+        <p:nvPr/>
+      </p:nvGrpSpPr>
+      <p:grpSpPr>
+        <a:xfrm>
+          <a:off x="0" y="0"/>
+          <a:ext cx="0" cy="0"/>
+          <a:chOff x="0" y="0"/>
+          <a:chExt cx="0" cy="0"/>
+        </a:xfrm>
+      </p:grpSpPr>
+      <p:sp>
+        <p:nvSpPr>
+          <p:cNvPr id="2" name="Title 1">
+            <a:extLst>
+              <a:ext uri="{FF2B5EF4-FFF2-40B4-BE49-F238E27FC236}">
+                <a16:creationId xmlns:a16="http://schemas.microsoft.com/office/drawing/2014/main" id="{2AACEBFD-EE04-2F40-FE40-9696A5DE0FCD}"/>
+              </a:ext>
+            </a:extLst>
+          </p:cNvPr>
+          <p:cNvSpPr>
+            <a:spLocks noGrp="1"/>
+          </p:cNvSpPr>
+          <p:nvPr>
+            <p:ph type="title"/>
+          </p:nvPr>
+        </p:nvSpPr>
+        <p:spPr/>
+        <p:txBody>
+          <a:bodyPr/>
+          <a:lstStyle/>
+          <a:p>
+            <a:r>
+              <a:rPr lang="en-US" dirty="0">
+                <a:solidFill>
+                  <a:srgbClr val="FFC000"/>
+                </a:solidFill>
+              </a:rPr>
+              <a:t>HTTP</a:t>
+            </a:r>
+            <a:r>
+              <a:rPr lang="en-US" dirty="0"/>
+              <a:t> Verbs | </a:t>
+            </a:r>
+            <a:r>
+              <a:rPr lang="en-US" dirty="0">
+                <a:latin typeface="Courier New" panose="02070309020205020404" pitchFamily="49" charset="0"/>
+                <a:cs typeface="Courier New" panose="02070309020205020404" pitchFamily="49" charset="0"/>
+              </a:rPr>
+              <a:t>DELETE</a:t>
+            </a:r>
+            <a:r>
+              <a:rPr lang="en-US" dirty="0"/>
+              <a:t> Request</a:t>
+            </a:r>
+            <a:endParaRPr lang="en-US" dirty="0">
+              <a:solidFill>
+                <a:srgbClr val="00B050"/>
+              </a:solidFill>
+            </a:endParaRPr>
+          </a:p>
+        </p:txBody>
+      </p:sp>
+      <p:sp>
+        <p:nvSpPr>
+          <p:cNvPr id="3" name="Content Placeholder 2">
+            <a:extLst>
+              <a:ext uri="{FF2B5EF4-FFF2-40B4-BE49-F238E27FC236}">
+                <a16:creationId xmlns:a16="http://schemas.microsoft.com/office/drawing/2014/main" id="{AC7CD8A8-33CB-02AA-5E7B-A58AD3EB3C81}"/>
+              </a:ext>
+            </a:extLst>
+          </p:cNvPr>
+          <p:cNvSpPr>
+            <a:spLocks noGrp="1"/>
+          </p:cNvSpPr>
+          <p:nvPr>
+            <p:ph idx="1"/>
+          </p:nvPr>
+        </p:nvSpPr>
+        <p:spPr>
+          <a:xfrm>
+            <a:off x="913795" y="1732449"/>
+            <a:ext cx="4426301" cy="4058751"/>
+          </a:xfrm>
+        </p:spPr>
+        <p:txBody>
+          <a:bodyPr>
+            <a:normAutofit lnSpcReduction="10000"/>
+          </a:bodyPr>
+          <a:lstStyle/>
+          <a:p>
+            <a:r>
+              <a:rPr lang="en-US" dirty="0"/>
+              <a:t>It requests that the target resource be “created” or “replaced” with the state defined in the representation {JSON}</a:t>
+            </a:r>
+          </a:p>
+          <a:p>
+            <a:r>
+              <a:rPr lang="en-US" dirty="0"/>
+              <a:t>See </a:t>
+            </a:r>
+            <a:r>
+              <a:rPr lang="en-US" dirty="0">
+                <a:solidFill>
+                  <a:srgbClr val="FFC000"/>
+                </a:solidFill>
+              </a:rPr>
+              <a:t>RFC 9110 </a:t>
+            </a:r>
+            <a:r>
+              <a:rPr lang="en-US" dirty="0"/>
+              <a:t>| </a:t>
+            </a:r>
+            <a:r>
+              <a:rPr lang="en-US" dirty="0">
+                <a:solidFill>
+                  <a:srgbClr val="FFC000"/>
+                </a:solidFill>
+              </a:rPr>
+              <a:t>Part 9.3.4 </a:t>
+            </a:r>
+            <a:r>
+              <a:rPr lang="en-US" dirty="0"/>
+              <a:t>for more information</a:t>
+            </a:r>
+          </a:p>
+          <a:p>
+            <a:r>
+              <a:rPr lang="en-US" dirty="0"/>
+              <a:t>It is idempotent assuming you are not tracking </a:t>
+            </a:r>
+            <a:r>
+              <a:rPr lang="en-US" dirty="0" err="1">
+                <a:latin typeface="Courier New" panose="02070309020205020404" pitchFamily="49" charset="0"/>
+                <a:cs typeface="Courier New" panose="02070309020205020404" pitchFamily="49" charset="0"/>
+              </a:rPr>
+              <a:t>LastUpdated</a:t>
+            </a:r>
+            <a:r>
+              <a:rPr lang="en-US" dirty="0"/>
+              <a:t> timestamp</a:t>
+            </a:r>
+          </a:p>
+          <a:p>
+            <a:r>
+              <a:rPr lang="en-US" dirty="0"/>
+              <a:t>Some frameworks interpret this literally ~ watch out ~ Test! Test! Test!</a:t>
+            </a:r>
+          </a:p>
+          <a:p>
+            <a:pPr lvl="2"/>
+            <a:endParaRPr lang="en-US" dirty="0"/>
+          </a:p>
+        </p:txBody>
+      </p:sp>
+      <p:sp>
+        <p:nvSpPr>
+          <p:cNvPr id="4" name="Content Placeholder 2">
+            <a:extLst>
+              <a:ext uri="{FF2B5EF4-FFF2-40B4-BE49-F238E27FC236}">
+                <a16:creationId xmlns:a16="http://schemas.microsoft.com/office/drawing/2014/main" id="{F37415D7-A45F-15C7-D773-2BB4528627DD}"/>
+              </a:ext>
+            </a:extLst>
+          </p:cNvPr>
+          <p:cNvSpPr txBox="1">
+            <a:spLocks/>
+          </p:cNvSpPr>
+          <p:nvPr/>
+        </p:nvSpPr>
+        <p:spPr>
+          <a:xfrm>
+            <a:off x="5464459" y="1732449"/>
+            <a:ext cx="6047837" cy="4058751"/>
+          </a:xfrm>
+          <a:prstGeom prst="rect">
+            <a:avLst/>
+          </a:prstGeom>
+          <a:effectLst>
+            <a:outerShdw blurRad="25400" dir="17880000">
+              <a:srgbClr val="000000">
+                <a:alpha val="46000"/>
+              </a:srgbClr>
+            </a:outerShdw>
+          </a:effectLst>
+        </p:spPr>
+        <p:txBody>
+          <a:bodyPr vert="horz" lIns="91440" tIns="45720" rIns="91440" bIns="45720" rtlCol="0" anchor="t">
+            <a:normAutofit fontScale="92500" lnSpcReduction="20000"/>
+          </a:bodyPr>
+          <a:lstStyle>
+            <a:lvl1pPr marL="342900" indent="-306000" algn="l" defTabSz="457200" rtl="0" eaLnBrk="1" latinLnBrk="0" hangingPunct="1">
+              <a:spcBef>
+                <a:spcPct val="20000"/>
+              </a:spcBef>
+              <a:spcAft>
+                <a:spcPts val="600"/>
+              </a:spcAft>
+              <a:buClr>
+                <a:schemeClr val="tx2"/>
+              </a:buClr>
+              <a:buSzPct val="70000"/>
+              <a:buFont typeface="Wingdings 2" charset="2"/>
+              <a:buChar char=""/>
+              <a:defRPr sz="2000" kern="1200">
+                <a:ln>
+                  <a:solidFill>
+                    <a:schemeClr val="bg1">
+                      <a:lumMod val="75000"/>
+                      <a:lumOff val="25000"/>
+                      <a:alpha val="10000"/>
+                    </a:schemeClr>
+                  </a:solidFill>
+                </a:ln>
+                <a:solidFill>
+                  <a:schemeClr val="tx2"/>
+                </a:solidFill>
+                <a:effectLst>
+                  <a:outerShdw blurRad="9525" dist="25400" dir="14640000" algn="tl" rotWithShape="0">
+                    <a:schemeClr val="bg1">
+                      <a:alpha val="30000"/>
+                    </a:schemeClr>
+                  </a:outerShdw>
+                </a:effectLst>
+                <a:latin typeface="+mn-lt"/>
+                <a:ea typeface="+mn-ea"/>
+                <a:cs typeface="+mn-cs"/>
+              </a:defRPr>
+            </a:lvl1pPr>
+            <a:lvl2pPr marL="720000" indent="-270000" algn="l" defTabSz="457200" rtl="0" eaLnBrk="1" latinLnBrk="0" hangingPunct="1">
+              <a:spcBef>
+                <a:spcPct val="20000"/>
+              </a:spcBef>
+              <a:spcAft>
+                <a:spcPts val="600"/>
+              </a:spcAft>
+              <a:buClr>
+                <a:schemeClr val="tx2"/>
+              </a:buClr>
+              <a:buSzPct val="70000"/>
+              <a:buFont typeface="Wingdings 2" charset="2"/>
+              <a:buChar char=""/>
+              <a:defRPr sz="1800" kern="1200">
+                <a:ln>
+                  <a:solidFill>
+                    <a:schemeClr val="bg1">
+                      <a:lumMod val="75000"/>
+                      <a:lumOff val="25000"/>
+                      <a:alpha val="10000"/>
+                    </a:schemeClr>
+                  </a:solidFill>
+                </a:ln>
+                <a:solidFill>
+                  <a:schemeClr val="tx2"/>
+                </a:solidFill>
+                <a:effectLst>
+                  <a:outerShdw blurRad="9525" dist="25400" dir="14640000" algn="tl" rotWithShape="0">
+                    <a:schemeClr val="bg1">
+                      <a:alpha val="30000"/>
+                    </a:schemeClr>
+                  </a:outerShdw>
+                </a:effectLst>
+                <a:latin typeface="+mn-lt"/>
+                <a:ea typeface="+mn-ea"/>
+                <a:cs typeface="+mn-cs"/>
+              </a:defRPr>
+            </a:lvl2pPr>
+            <a:lvl3pPr marL="1026000" indent="-216000" algn="l" defTabSz="457200" rtl="0" eaLnBrk="1" latinLnBrk="0" hangingPunct="1">
+              <a:spcBef>
+                <a:spcPct val="20000"/>
+              </a:spcBef>
+              <a:spcAft>
+                <a:spcPts val="600"/>
+              </a:spcAft>
+              <a:buClr>
+                <a:schemeClr val="tx2"/>
+              </a:buClr>
+              <a:buSzPct val="70000"/>
+              <a:buFont typeface="Wingdings 2" charset="2"/>
+              <a:buChar char=""/>
+              <a:defRPr sz="1600" kern="1200">
+                <a:ln>
+                  <a:solidFill>
+                    <a:schemeClr val="bg1">
+                      <a:lumMod val="75000"/>
+                      <a:lumOff val="25000"/>
+                      <a:alpha val="10000"/>
+                    </a:schemeClr>
+                  </a:solidFill>
+                </a:ln>
+                <a:solidFill>
+                  <a:schemeClr val="tx2"/>
+                </a:solidFill>
+                <a:effectLst>
+                  <a:outerShdw blurRad="9525" dist="25400" dir="14640000" algn="tl" rotWithShape="0">
+                    <a:schemeClr val="bg1">
+                      <a:alpha val="30000"/>
+                    </a:schemeClr>
+                  </a:outerShdw>
+                </a:effectLst>
+                <a:latin typeface="+mn-lt"/>
+                <a:ea typeface="+mn-ea"/>
+                <a:cs typeface="+mn-cs"/>
+              </a:defRPr>
+            </a:lvl3pPr>
+            <a:lvl4pPr marL="1386000" indent="-216000" algn="l" defTabSz="457200" rtl="0" eaLnBrk="1" latinLnBrk="0" hangingPunct="1">
+              <a:spcBef>
+                <a:spcPct val="20000"/>
+              </a:spcBef>
+              <a:spcAft>
+                <a:spcPts val="600"/>
+              </a:spcAft>
+              <a:buClr>
+                <a:schemeClr val="tx2"/>
+              </a:buClr>
+              <a:buSzPct val="70000"/>
+              <a:buFont typeface="Wingdings 2" charset="2"/>
+              <a:buChar char=""/>
+              <a:defRPr sz="1400" kern="1200">
+                <a:ln>
+                  <a:solidFill>
+                    <a:schemeClr val="bg1">
+                      <a:lumMod val="75000"/>
+                      <a:lumOff val="25000"/>
+                      <a:alpha val="10000"/>
+                    </a:schemeClr>
+                  </a:solidFill>
+                </a:ln>
+                <a:solidFill>
+                  <a:schemeClr val="tx2"/>
+                </a:solidFill>
+                <a:effectLst>
+                  <a:outerShdw blurRad="9525" dist="25400" dir="14640000" algn="tl" rotWithShape="0">
+                    <a:schemeClr val="bg1">
+                      <a:alpha val="30000"/>
+                    </a:schemeClr>
+                  </a:outerShdw>
+                </a:effectLst>
+                <a:latin typeface="+mn-lt"/>
+                <a:ea typeface="+mn-ea"/>
+                <a:cs typeface="+mn-cs"/>
+              </a:defRPr>
+            </a:lvl4pPr>
+            <a:lvl5pPr marL="1674000" indent="-216000" algn="l" defTabSz="457200" rtl="0" eaLnBrk="1" latinLnBrk="0" hangingPunct="1">
+              <a:spcBef>
+                <a:spcPct val="20000"/>
+              </a:spcBef>
+              <a:spcAft>
+                <a:spcPts val="600"/>
+              </a:spcAft>
+              <a:buClr>
+                <a:schemeClr val="tx2"/>
+              </a:buClr>
+              <a:buSzPct val="70000"/>
+              <a:buFont typeface="Wingdings 2" charset="2"/>
+              <a:buChar char=""/>
+              <a:defRPr sz="1400" kern="1200">
+                <a:ln>
+                  <a:solidFill>
+                    <a:schemeClr val="bg1">
+                      <a:lumMod val="75000"/>
+                      <a:lumOff val="25000"/>
+                      <a:alpha val="10000"/>
+                    </a:schemeClr>
+                  </a:solidFill>
+                </a:ln>
+                <a:solidFill>
+                  <a:schemeClr val="tx2"/>
+                </a:solidFill>
+                <a:effectLst>
+                  <a:outerShdw blurRad="9525" dist="25400" dir="14640000" algn="tl" rotWithShape="0">
+                    <a:schemeClr val="bg1">
+                      <a:alpha val="30000"/>
+                    </a:schemeClr>
+                  </a:outerShdw>
+                </a:effectLst>
+                <a:latin typeface="+mn-lt"/>
+                <a:ea typeface="+mn-ea"/>
+                <a:cs typeface="+mn-cs"/>
+              </a:defRPr>
+            </a:lvl5pPr>
+            <a:lvl6pPr marL="2014600" indent="-228600" algn="l" defTabSz="457200" rtl="0" eaLnBrk="1" latinLnBrk="0" hangingPunct="1">
+              <a:spcBef>
+                <a:spcPct val="20000"/>
+              </a:spcBef>
+              <a:spcAft>
+                <a:spcPts val="600"/>
+              </a:spcAft>
+              <a:buClr>
+                <a:schemeClr val="tx2"/>
+              </a:buClr>
+              <a:buSzPct val="70000"/>
+              <a:buFont typeface="Wingdings 2" charset="2"/>
+              <a:buChar char=""/>
+              <a:defRPr sz="1400" kern="1200">
+                <a:ln>
+                  <a:solidFill>
+                    <a:schemeClr val="bg1">
+                      <a:lumMod val="75000"/>
+                      <a:lumOff val="25000"/>
+                      <a:alpha val="10000"/>
+                    </a:schemeClr>
+                  </a:solidFill>
+                </a:ln>
+                <a:solidFill>
+                  <a:schemeClr val="tx2"/>
+                </a:solidFill>
+                <a:effectLst>
+                  <a:outerShdw blurRad="9525" dist="25400" dir="14640000" algn="tl" rotWithShape="0">
+                    <a:schemeClr val="bg1">
+                      <a:alpha val="30000"/>
+                    </a:schemeClr>
+                  </a:outerShdw>
+                </a:effectLst>
+                <a:latin typeface="+mn-lt"/>
+                <a:ea typeface="+mn-ea"/>
+                <a:cs typeface="+mn-cs"/>
+              </a:defRPr>
+            </a:lvl6pPr>
+            <a:lvl7pPr marL="2401800" indent="-228600" algn="l" defTabSz="457200" rtl="0" eaLnBrk="1" latinLnBrk="0" hangingPunct="1">
+              <a:spcBef>
+                <a:spcPct val="20000"/>
+              </a:spcBef>
+              <a:spcAft>
+                <a:spcPts val="600"/>
+              </a:spcAft>
+              <a:buClr>
+                <a:schemeClr val="tx2"/>
+              </a:buClr>
+              <a:buSzPct val="70000"/>
+              <a:buFont typeface="Wingdings 2" charset="2"/>
+              <a:buChar char=""/>
+              <a:defRPr sz="1400" kern="1200">
+                <a:ln>
+                  <a:solidFill>
+                    <a:schemeClr val="bg1">
+                      <a:lumMod val="75000"/>
+                      <a:lumOff val="25000"/>
+                      <a:alpha val="10000"/>
+                    </a:schemeClr>
+                  </a:solidFill>
+                </a:ln>
+                <a:solidFill>
+                  <a:schemeClr val="tx2"/>
+                </a:solidFill>
+                <a:effectLst>
+                  <a:outerShdw blurRad="9525" dist="25400" dir="14640000" algn="tl" rotWithShape="0">
+                    <a:schemeClr val="bg1">
+                      <a:alpha val="30000"/>
+                    </a:schemeClr>
+                  </a:outerShdw>
+                </a:effectLst>
+                <a:latin typeface="+mn-lt"/>
+                <a:ea typeface="+mn-ea"/>
+                <a:cs typeface="+mn-cs"/>
+              </a:defRPr>
+            </a:lvl7pPr>
+            <a:lvl8pPr marL="2789000" indent="-228600" algn="l" defTabSz="457200" rtl="0" eaLnBrk="1" latinLnBrk="0" hangingPunct="1">
+              <a:spcBef>
+                <a:spcPct val="20000"/>
+              </a:spcBef>
+              <a:spcAft>
+                <a:spcPts val="600"/>
+              </a:spcAft>
+              <a:buClr>
+                <a:schemeClr val="tx2"/>
+              </a:buClr>
+              <a:buSzPct val="70000"/>
+              <a:buFont typeface="Wingdings 2" charset="2"/>
+              <a:buChar char=""/>
+              <a:defRPr sz="1400" kern="1200">
+                <a:ln>
+                  <a:solidFill>
+                    <a:schemeClr val="bg1">
+                      <a:lumMod val="75000"/>
+                      <a:lumOff val="25000"/>
+                      <a:alpha val="10000"/>
+                    </a:schemeClr>
+                  </a:solidFill>
+                </a:ln>
+                <a:solidFill>
+                  <a:schemeClr val="tx2"/>
+                </a:solidFill>
+                <a:effectLst>
+                  <a:outerShdw blurRad="9525" dist="25400" dir="14640000" algn="tl" rotWithShape="0">
+                    <a:schemeClr val="bg1">
+                      <a:alpha val="30000"/>
+                    </a:schemeClr>
+                  </a:outerShdw>
+                </a:effectLst>
+                <a:latin typeface="+mn-lt"/>
+                <a:ea typeface="+mn-ea"/>
+                <a:cs typeface="+mn-cs"/>
+              </a:defRPr>
+            </a:lvl8pPr>
+            <a:lvl9pPr marL="3106200" indent="-228600" algn="l" defTabSz="457200" rtl="0" eaLnBrk="1" latinLnBrk="0" hangingPunct="1">
+              <a:spcBef>
+                <a:spcPct val="20000"/>
+              </a:spcBef>
+              <a:spcAft>
+                <a:spcPts val="600"/>
+              </a:spcAft>
+              <a:buClr>
+                <a:schemeClr val="tx2"/>
+              </a:buClr>
+              <a:buSzPct val="70000"/>
+              <a:buFont typeface="Wingdings 2" charset="2"/>
+              <a:buChar char=""/>
+              <a:defRPr sz="1400" kern="1200">
+                <a:ln>
+                  <a:solidFill>
+                    <a:schemeClr val="bg1">
+                      <a:lumMod val="75000"/>
+                      <a:lumOff val="25000"/>
+                      <a:alpha val="10000"/>
+                    </a:schemeClr>
+                  </a:solidFill>
+                </a:ln>
+                <a:solidFill>
+                  <a:schemeClr val="tx2"/>
+                </a:solidFill>
+                <a:effectLst>
+                  <a:outerShdw blurRad="9525" dist="25400" dir="14640000" algn="tl" rotWithShape="0">
+                    <a:schemeClr val="bg1">
+                      <a:alpha val="30000"/>
+                    </a:schemeClr>
+                  </a:outerShdw>
+                </a:effectLst>
+                <a:latin typeface="+mn-lt"/>
+                <a:ea typeface="+mn-ea"/>
+                <a:cs typeface="+mn-cs"/>
+              </a:defRPr>
+            </a:lvl9pPr>
+          </a:lstStyle>
+          <a:p>
+            <a:r>
+              <a:rPr lang="en-US" dirty="0"/>
+              <a:t>Example</a:t>
+            </a:r>
+          </a:p>
+          <a:p>
+            <a:pPr lvl="1"/>
+            <a:r>
+              <a:rPr lang="en-US" dirty="0">
+                <a:solidFill>
+                  <a:srgbClr val="C00000"/>
+                </a:solidFill>
+              </a:rPr>
+              <a:t>DELETE</a:t>
+            </a:r>
+            <a:r>
+              <a:rPr lang="en-US" dirty="0"/>
+              <a:t> </a:t>
+            </a:r>
+          </a:p>
+          <a:p>
+            <a:pPr lvl="2"/>
+            <a:r>
+              <a:rPr lang="en-US" sz="1400" dirty="0">
+                <a:latin typeface="Courier New" panose="02070309020205020404" pitchFamily="49" charset="0"/>
+                <a:cs typeface="Courier New" panose="02070309020205020404" pitchFamily="49" charset="0"/>
+              </a:rPr>
+              <a:t>../</a:t>
+            </a:r>
+            <a:r>
+              <a:rPr lang="en-US" sz="1400" dirty="0" err="1">
+                <a:latin typeface="Courier New" panose="02070309020205020404" pitchFamily="49" charset="0"/>
+                <a:cs typeface="Courier New" panose="02070309020205020404" pitchFamily="49" charset="0"/>
+              </a:rPr>
+              <a:t>api</a:t>
+            </a:r>
+            <a:r>
+              <a:rPr lang="en-US" sz="1400" dirty="0">
+                <a:latin typeface="Courier New" panose="02070309020205020404" pitchFamily="49" charset="0"/>
+                <a:cs typeface="Courier New" panose="02070309020205020404" pitchFamily="49" charset="0"/>
+              </a:rPr>
+              <a:t>/v1/books/{id}</a:t>
+            </a:r>
+            <a:endParaRPr lang="en-US" dirty="0"/>
+          </a:p>
+          <a:p>
+            <a:pPr lvl="1"/>
+            <a:r>
+              <a:rPr lang="en-US" sz="1600" dirty="0"/>
+              <a:t>Server responds with</a:t>
+            </a:r>
+          </a:p>
+          <a:p>
+            <a:pPr lvl="2"/>
+            <a:r>
+              <a:rPr lang="en-US" sz="1400" dirty="0">
+                <a:latin typeface="Courier New" panose="02070309020205020404" pitchFamily="49" charset="0"/>
+                <a:cs typeface="Courier New" panose="02070309020205020404" pitchFamily="49" charset="0"/>
+              </a:rPr>
+              <a:t>HTTP 200 – OK</a:t>
+            </a:r>
+          </a:p>
+          <a:p>
+            <a:pPr lvl="2"/>
+            <a:r>
+              <a:rPr lang="en-US" sz="1400" dirty="0">
+                <a:latin typeface="Courier New" panose="02070309020205020404" pitchFamily="49" charset="0"/>
+                <a:cs typeface="Courier New" panose="02070309020205020404" pitchFamily="49" charset="0"/>
+              </a:rPr>
+              <a:t>HTTP 204 – No Content</a:t>
+            </a:r>
+            <a:r>
+              <a:rPr lang="en-US" sz="1400" dirty="0"/>
+              <a:t> </a:t>
+            </a:r>
+          </a:p>
+          <a:p>
+            <a:pPr lvl="1"/>
+            <a:r>
+              <a:rPr lang="en-US" dirty="0">
+                <a:solidFill>
+                  <a:srgbClr val="C00000"/>
+                </a:solidFill>
+              </a:rPr>
+              <a:t>DELETE</a:t>
+            </a:r>
+            <a:r>
+              <a:rPr lang="en-US" dirty="0"/>
+              <a:t> </a:t>
+            </a:r>
+            <a:r>
+              <a:rPr lang="en-US" dirty="0">
+                <a:latin typeface="Courier New" panose="02070309020205020404" pitchFamily="49" charset="0"/>
+                <a:cs typeface="Courier New" panose="02070309020205020404" pitchFamily="49" charset="0"/>
+              </a:rPr>
+              <a:t>../</a:t>
+            </a:r>
+            <a:r>
+              <a:rPr lang="en-US" dirty="0" err="1">
+                <a:latin typeface="Courier New" panose="02070309020205020404" pitchFamily="49" charset="0"/>
+                <a:cs typeface="Courier New" panose="02070309020205020404" pitchFamily="49" charset="0"/>
+              </a:rPr>
+              <a:t>api</a:t>
+            </a:r>
+            <a:r>
+              <a:rPr lang="en-US" dirty="0">
+                <a:latin typeface="Courier New" panose="02070309020205020404" pitchFamily="49" charset="0"/>
+                <a:cs typeface="Courier New" panose="02070309020205020404" pitchFamily="49" charset="0"/>
+              </a:rPr>
+              <a:t>/v1/bulk/books</a:t>
+            </a:r>
+            <a:endParaRPr lang="en-US" sz="1600" dirty="0">
+              <a:latin typeface="Courier New" panose="02070309020205020404" pitchFamily="49" charset="0"/>
+              <a:cs typeface="Courier New" panose="02070309020205020404" pitchFamily="49" charset="0"/>
+            </a:endParaRPr>
+          </a:p>
+          <a:p>
+            <a:pPr lvl="2"/>
+            <a:r>
+              <a:rPr lang="en-US" sz="1400" dirty="0">
+                <a:latin typeface="Courier New" panose="02070309020205020404" pitchFamily="49" charset="0"/>
+                <a:cs typeface="Courier New" panose="02070309020205020404" pitchFamily="49" charset="0"/>
+              </a:rPr>
+              <a:t>Body: [{JSON book1}, {JSON book2}, etc.]</a:t>
+            </a:r>
+          </a:p>
+          <a:p>
+            <a:pPr lvl="2"/>
+            <a:r>
+              <a:rPr lang="en-US" sz="1400" dirty="0"/>
+              <a:t>Server responds with</a:t>
+            </a:r>
+          </a:p>
+          <a:p>
+            <a:pPr lvl="3"/>
+            <a:r>
+              <a:rPr lang="en-US" sz="1200" dirty="0">
+                <a:latin typeface="Courier New" panose="02070309020205020404" pitchFamily="49" charset="0"/>
+                <a:cs typeface="Courier New" panose="02070309020205020404" pitchFamily="49" charset="0"/>
+              </a:rPr>
+              <a:t>HTTP 200 – OK</a:t>
+            </a:r>
+            <a:r>
+              <a:rPr lang="en-US" sz="1200" dirty="0"/>
+              <a:t>  (if it can finish it in reasonable amount of time)</a:t>
+            </a:r>
+          </a:p>
+          <a:p>
+            <a:pPr lvl="3"/>
+            <a:r>
+              <a:rPr lang="en-US" sz="1200" dirty="0">
+                <a:latin typeface="Courier New" panose="02070309020205020404" pitchFamily="49" charset="0"/>
+                <a:cs typeface="Courier New" panose="02070309020205020404" pitchFamily="49" charset="0"/>
+              </a:rPr>
+              <a:t>HTTP 202 – Accepted</a:t>
+            </a:r>
+            <a:r>
+              <a:rPr lang="en-US" sz="1200" dirty="0"/>
+              <a:t> (if client needs to call back to get the results async)</a:t>
+            </a:r>
+          </a:p>
+          <a:p>
+            <a:pPr lvl="1"/>
+            <a:endParaRPr lang="en-US" sz="1400" dirty="0"/>
+          </a:p>
+          <a:p>
+            <a:pPr lvl="2"/>
+            <a:r>
+              <a:rPr lang="en-US" dirty="0"/>
+              <a:t>[{book-id-1}, {book-id-2}, …]</a:t>
+            </a:r>
+          </a:p>
+        </p:txBody>
+      </p:sp>
+    </p:spTree>
+    <p:extLst>
+      <p:ext uri="{BB962C8B-B14F-4D97-AF65-F5344CB8AC3E}">
+        <p14:creationId xmlns:p14="http://schemas.microsoft.com/office/powerpoint/2010/main" val="3537769129"/>
+      </p:ext>
+    </p:extLst>
+  </p:cSld>
+  <p:clrMapOvr>
+    <a:masterClrMapping/>
+  </p:clrMapOvr>
+</p:sld>
+</file>
+
+<file path=ppt/slides/slide61.xml><?xml version="1.0" encoding="utf-8"?>
+<p:sld xmlns:a="http://schemas.openxmlformats.org/drawingml/2006/main" xmlns:r="http://schemas.openxmlformats.org/officeDocument/2006/relationships" xmlns:p="http://schemas.openxmlformats.org/presentationml/2006/main">
+  <p:cSld>
+    <p:spTree>
+      <p:nvGrpSpPr>
+        <p:cNvPr id="1" name="">
+          <a:extLst>
+            <a:ext uri="{FF2B5EF4-FFF2-40B4-BE49-F238E27FC236}">
+              <a16:creationId xmlns:a16="http://schemas.microsoft.com/office/drawing/2014/main" id="{75A5F37A-C20A-04B5-FD50-DAA1C2374788}"/>
+            </a:ext>
+          </a:extLst>
+        </p:cNvPr>
+        <p:cNvGrpSpPr/>
+        <p:nvPr/>
+      </p:nvGrpSpPr>
+      <p:grpSpPr>
+        <a:xfrm>
+          <a:off x="0" y="0"/>
+          <a:ext cx="0" cy="0"/>
+          <a:chOff x="0" y="0"/>
+          <a:chExt cx="0" cy="0"/>
+        </a:xfrm>
+      </p:grpSpPr>
+      <p:sp>
+        <p:nvSpPr>
+          <p:cNvPr id="2" name="Title 1">
+            <a:extLst>
+              <a:ext uri="{FF2B5EF4-FFF2-40B4-BE49-F238E27FC236}">
+                <a16:creationId xmlns:a16="http://schemas.microsoft.com/office/drawing/2014/main" id="{11E8E1E4-718D-52FE-0FBF-162BC449DAB0}"/>
+              </a:ext>
+            </a:extLst>
+          </p:cNvPr>
+          <p:cNvSpPr>
+            <a:spLocks noGrp="1"/>
+          </p:cNvSpPr>
+          <p:nvPr>
+            <p:ph type="title"/>
+          </p:nvPr>
+        </p:nvSpPr>
+        <p:spPr/>
+        <p:txBody>
+          <a:bodyPr/>
+          <a:lstStyle/>
+          <a:p>
+            <a:r>
+              <a:rPr lang="en-US" dirty="0"/>
+              <a:t>REST API Design | HTTP Codes</a:t>
+            </a:r>
+          </a:p>
+        </p:txBody>
+      </p:sp>
+      <p:sp>
+        <p:nvSpPr>
+          <p:cNvPr id="3" name="Content Placeholder 2">
+            <a:extLst>
+              <a:ext uri="{FF2B5EF4-FFF2-40B4-BE49-F238E27FC236}">
+                <a16:creationId xmlns:a16="http://schemas.microsoft.com/office/drawing/2014/main" id="{0C109AD2-F26E-E5EC-3F58-926DB1ED7051}"/>
+              </a:ext>
+            </a:extLst>
+          </p:cNvPr>
+          <p:cNvSpPr>
+            <a:spLocks noGrp="1"/>
+          </p:cNvSpPr>
+          <p:nvPr>
+            <p:ph idx="1"/>
+          </p:nvPr>
+        </p:nvSpPr>
+        <p:spPr>
+          <a:xfrm>
+            <a:off x="385887" y="1580049"/>
+            <a:ext cx="5459573" cy="5031061"/>
+          </a:xfrm>
+        </p:spPr>
+        <p:txBody>
+          <a:bodyPr>
+            <a:normAutofit fontScale="62500" lnSpcReduction="20000"/>
+          </a:bodyPr>
+          <a:lstStyle/>
+          <a:p>
+            <a:r>
+              <a:rPr lang="en-US" dirty="0"/>
+              <a:t>Map requests/responses from </a:t>
+            </a:r>
+            <a:r>
+              <a:rPr lang="en-US" dirty="0">
+                <a:solidFill>
+                  <a:srgbClr val="FFC000"/>
+                </a:solidFill>
+              </a:rPr>
+              <a:t>HTTP</a:t>
+            </a:r>
+            <a:r>
+              <a:rPr lang="en-US" dirty="0"/>
+              <a:t> Verbs to </a:t>
+            </a:r>
+            <a:r>
+              <a:rPr lang="en-US" dirty="0">
+                <a:solidFill>
+                  <a:srgbClr val="FFC000"/>
+                </a:solidFill>
+              </a:rPr>
+              <a:t>HTTP</a:t>
+            </a:r>
+            <a:r>
+              <a:rPr lang="en-US" dirty="0"/>
+              <a:t> Status Codes</a:t>
+            </a:r>
+          </a:p>
+          <a:p>
+            <a:r>
+              <a:rPr lang="en-US" dirty="0">
+                <a:solidFill>
+                  <a:srgbClr val="00B050"/>
+                </a:solidFill>
+              </a:rPr>
+              <a:t>GET</a:t>
+            </a:r>
+            <a:r>
+              <a:rPr lang="en-US" dirty="0"/>
+              <a:t> – Retrieve a resource</a:t>
+            </a:r>
+          </a:p>
+          <a:p>
+            <a:pPr lvl="1"/>
+            <a:r>
+              <a:rPr lang="en-US" dirty="0"/>
+              <a:t>200 Ok; 304 Not Modified; 404 Not Found</a:t>
+            </a:r>
+          </a:p>
+          <a:p>
+            <a:r>
+              <a:rPr lang="en-US" dirty="0">
+                <a:solidFill>
+                  <a:srgbClr val="00B0F0"/>
+                </a:solidFill>
+              </a:rPr>
+              <a:t>POST</a:t>
+            </a:r>
+            <a:r>
+              <a:rPr lang="en-US" dirty="0"/>
+              <a:t> – Create a resource</a:t>
+            </a:r>
+          </a:p>
+          <a:p>
+            <a:pPr lvl="1"/>
+            <a:r>
+              <a:rPr lang="en-US" dirty="0"/>
+              <a:t>201 Created; 200 OK + JSON; 202 Accepted (callback is needed to ensure creation was OK); 204 No Content is acceptable for “action” style POST operations (e.g., command type of endpoint)</a:t>
+            </a:r>
+          </a:p>
+          <a:p>
+            <a:r>
+              <a:rPr lang="en-US" dirty="0">
+                <a:solidFill>
+                  <a:srgbClr val="FFC000"/>
+                </a:solidFill>
+              </a:rPr>
+              <a:t>PUT</a:t>
+            </a:r>
+            <a:r>
+              <a:rPr lang="en-US" dirty="0"/>
+              <a:t> – Replace a whole resource</a:t>
+            </a:r>
+          </a:p>
+          <a:p>
+            <a:pPr lvl="1"/>
+            <a:r>
+              <a:rPr lang="en-US" dirty="0"/>
+              <a:t>204 No Content; 200 OK + JSON</a:t>
+            </a:r>
+          </a:p>
+          <a:p>
+            <a:r>
+              <a:rPr lang="en-US" dirty="0">
+                <a:solidFill>
+                  <a:srgbClr val="FFC000"/>
+                </a:solidFill>
+              </a:rPr>
+              <a:t>PATCH</a:t>
+            </a:r>
+            <a:r>
+              <a:rPr lang="en-US" dirty="0"/>
+              <a:t> – Partially update a resource</a:t>
+            </a:r>
+          </a:p>
+          <a:p>
+            <a:pPr lvl="1"/>
+            <a:r>
+              <a:rPr lang="en-US" dirty="0"/>
+              <a:t>200 OK; 204 No Content; 404 Not Found; 409 Conflict / 412 Precondition Failed common when using e-Tags</a:t>
+            </a:r>
+          </a:p>
+          <a:p>
+            <a:r>
+              <a:rPr lang="en-US" dirty="0">
+                <a:solidFill>
+                  <a:srgbClr val="FF0000"/>
+                </a:solidFill>
+              </a:rPr>
+              <a:t>DELETE</a:t>
+            </a:r>
+            <a:r>
+              <a:rPr lang="en-US" dirty="0"/>
+              <a:t> – Remove a resource</a:t>
+            </a:r>
+          </a:p>
+          <a:p>
+            <a:pPr lvl="1"/>
+            <a:r>
+              <a:rPr lang="en-US" dirty="0"/>
+              <a:t>204 No Content; 200 OK + JSON; 404 Not Found; 202 Accepted (for asynchronous deletes)</a:t>
+            </a:r>
+          </a:p>
+          <a:p>
+            <a:r>
+              <a:rPr lang="en-US" dirty="0">
+                <a:solidFill>
+                  <a:schemeClr val="accent3"/>
+                </a:solidFill>
+              </a:rPr>
+              <a:t>HEAD</a:t>
+            </a:r>
+            <a:r>
+              <a:rPr lang="en-US" dirty="0"/>
+              <a:t> – Retrieves headers only</a:t>
+            </a:r>
+          </a:p>
+          <a:p>
+            <a:pPr lvl="1"/>
+            <a:r>
+              <a:rPr lang="en-US" dirty="0"/>
+              <a:t>200 OK; </a:t>
+            </a:r>
+          </a:p>
+          <a:p>
+            <a:r>
+              <a:rPr lang="en-US" dirty="0">
+                <a:solidFill>
+                  <a:schemeClr val="accent3"/>
+                </a:solidFill>
+              </a:rPr>
+              <a:t>OPTIONS</a:t>
+            </a:r>
+            <a:r>
+              <a:rPr lang="en-US" dirty="0"/>
+              <a:t> – Discovery methods/metadata</a:t>
+            </a:r>
+          </a:p>
+          <a:p>
+            <a:pPr lvl="1"/>
+            <a:r>
+              <a:rPr lang="en-US" dirty="0"/>
+              <a:t>204 No Content or 200 OK with “Allow” and “CORS” headers; 404 Not Found if “target” option is required</a:t>
+            </a:r>
+          </a:p>
+          <a:p>
+            <a:pPr lvl="2"/>
+            <a:endParaRPr lang="en-US" dirty="0"/>
+          </a:p>
+        </p:txBody>
+      </p:sp>
+      <p:sp>
+        <p:nvSpPr>
+          <p:cNvPr id="5" name="Content Placeholder 2">
+            <a:extLst>
+              <a:ext uri="{FF2B5EF4-FFF2-40B4-BE49-F238E27FC236}">
+                <a16:creationId xmlns:a16="http://schemas.microsoft.com/office/drawing/2014/main" id="{430963A6-B3B4-058B-8767-9F094B77099A}"/>
+              </a:ext>
+            </a:extLst>
+          </p:cNvPr>
+          <p:cNvSpPr txBox="1">
+            <a:spLocks/>
+          </p:cNvSpPr>
+          <p:nvPr/>
+        </p:nvSpPr>
+        <p:spPr>
+          <a:xfrm>
+            <a:off x="6373368" y="1580051"/>
+            <a:ext cx="5532120" cy="2662765"/>
+          </a:xfrm>
+          <a:prstGeom prst="rect">
+            <a:avLst/>
+          </a:prstGeom>
+          <a:effectLst>
+            <a:outerShdw blurRad="25400" dir="17880000">
+              <a:srgbClr val="000000">
+                <a:alpha val="46000"/>
+              </a:srgbClr>
+            </a:outerShdw>
+          </a:effectLst>
+        </p:spPr>
+        <p:txBody>
+          <a:bodyPr vert="horz" lIns="91440" tIns="45720" rIns="91440" bIns="45720" rtlCol="0" anchor="t">
+            <a:normAutofit fontScale="62500" lnSpcReduction="20000"/>
+          </a:bodyPr>
+          <a:lstStyle>
+            <a:lvl1pPr marL="342900" indent="-306000" algn="l" defTabSz="457200" rtl="0" eaLnBrk="1" latinLnBrk="0" hangingPunct="1">
+              <a:spcBef>
+                <a:spcPct val="20000"/>
+              </a:spcBef>
+              <a:spcAft>
+                <a:spcPts val="600"/>
+              </a:spcAft>
+              <a:buClr>
+                <a:schemeClr val="tx2"/>
+              </a:buClr>
+              <a:buSzPct val="70000"/>
+              <a:buFont typeface="Wingdings 2" charset="2"/>
+              <a:buChar char=""/>
+              <a:defRPr sz="2000" kern="1200">
+                <a:ln>
+                  <a:solidFill>
+                    <a:schemeClr val="bg1">
+                      <a:lumMod val="75000"/>
+                      <a:lumOff val="25000"/>
+                      <a:alpha val="10000"/>
+                    </a:schemeClr>
+                  </a:solidFill>
+                </a:ln>
+                <a:solidFill>
+                  <a:schemeClr val="tx2"/>
+                </a:solidFill>
+                <a:effectLst>
+                  <a:outerShdw blurRad="9525" dist="25400" dir="14640000" algn="tl" rotWithShape="0">
+                    <a:schemeClr val="bg1">
+                      <a:alpha val="30000"/>
+                    </a:schemeClr>
+                  </a:outerShdw>
+                </a:effectLst>
+                <a:latin typeface="+mn-lt"/>
+                <a:ea typeface="+mn-ea"/>
+                <a:cs typeface="+mn-cs"/>
+              </a:defRPr>
+            </a:lvl1pPr>
+            <a:lvl2pPr marL="720000" indent="-270000" algn="l" defTabSz="457200" rtl="0" eaLnBrk="1" latinLnBrk="0" hangingPunct="1">
+              <a:spcBef>
+                <a:spcPct val="20000"/>
+              </a:spcBef>
+              <a:spcAft>
+                <a:spcPts val="600"/>
+              </a:spcAft>
+              <a:buClr>
+                <a:schemeClr val="tx2"/>
+              </a:buClr>
+              <a:buSzPct val="70000"/>
+              <a:buFont typeface="Wingdings 2" charset="2"/>
+              <a:buChar char=""/>
+              <a:defRPr sz="1800" kern="1200">
+                <a:ln>
+                  <a:solidFill>
+                    <a:schemeClr val="bg1">
+                      <a:lumMod val="75000"/>
+                      <a:lumOff val="25000"/>
+                      <a:alpha val="10000"/>
+                    </a:schemeClr>
+                  </a:solidFill>
+                </a:ln>
+                <a:solidFill>
+                  <a:schemeClr val="tx2"/>
+                </a:solidFill>
+                <a:effectLst>
+                  <a:outerShdw blurRad="9525" dist="25400" dir="14640000" algn="tl" rotWithShape="0">
+                    <a:schemeClr val="bg1">
+                      <a:alpha val="30000"/>
+                    </a:schemeClr>
+                  </a:outerShdw>
+                </a:effectLst>
+                <a:latin typeface="+mn-lt"/>
+                <a:ea typeface="+mn-ea"/>
+                <a:cs typeface="+mn-cs"/>
+              </a:defRPr>
+            </a:lvl2pPr>
+            <a:lvl3pPr marL="1026000" indent="-216000" algn="l" defTabSz="457200" rtl="0" eaLnBrk="1" latinLnBrk="0" hangingPunct="1">
+              <a:spcBef>
+                <a:spcPct val="20000"/>
+              </a:spcBef>
+              <a:spcAft>
+                <a:spcPts val="600"/>
+              </a:spcAft>
+              <a:buClr>
+                <a:schemeClr val="tx2"/>
+              </a:buClr>
+              <a:buSzPct val="70000"/>
+              <a:buFont typeface="Wingdings 2" charset="2"/>
+              <a:buChar char=""/>
+              <a:defRPr sz="1600" kern="1200">
+                <a:ln>
+                  <a:solidFill>
+                    <a:schemeClr val="bg1">
+                      <a:lumMod val="75000"/>
+                      <a:lumOff val="25000"/>
+                      <a:alpha val="10000"/>
+                    </a:schemeClr>
+                  </a:solidFill>
+                </a:ln>
+                <a:solidFill>
+                  <a:schemeClr val="tx2"/>
+                </a:solidFill>
+                <a:effectLst>
+                  <a:outerShdw blurRad="9525" dist="25400" dir="14640000" algn="tl" rotWithShape="0">
+                    <a:schemeClr val="bg1">
+                      <a:alpha val="30000"/>
+                    </a:schemeClr>
+                  </a:outerShdw>
+                </a:effectLst>
+                <a:latin typeface="+mn-lt"/>
+                <a:ea typeface="+mn-ea"/>
+                <a:cs typeface="+mn-cs"/>
+              </a:defRPr>
+            </a:lvl3pPr>
+            <a:lvl4pPr marL="1386000" indent="-216000" algn="l" defTabSz="457200" rtl="0" eaLnBrk="1" latinLnBrk="0" hangingPunct="1">
+              <a:spcBef>
+                <a:spcPct val="20000"/>
+              </a:spcBef>
+              <a:spcAft>
+                <a:spcPts val="600"/>
+              </a:spcAft>
+              <a:buClr>
+                <a:schemeClr val="tx2"/>
+              </a:buClr>
+              <a:buSzPct val="70000"/>
+              <a:buFont typeface="Wingdings 2" charset="2"/>
+              <a:buChar char=""/>
+              <a:defRPr sz="1400" kern="1200">
+                <a:ln>
+                  <a:solidFill>
+                    <a:schemeClr val="bg1">
+                      <a:lumMod val="75000"/>
+                      <a:lumOff val="25000"/>
+                      <a:alpha val="10000"/>
+                    </a:schemeClr>
+                  </a:solidFill>
+                </a:ln>
+                <a:solidFill>
+                  <a:schemeClr val="tx2"/>
+                </a:solidFill>
+                <a:effectLst>
+                  <a:outerShdw blurRad="9525" dist="25400" dir="14640000" algn="tl" rotWithShape="0">
+                    <a:schemeClr val="bg1">
+                      <a:alpha val="30000"/>
+                    </a:schemeClr>
+                  </a:outerShdw>
+                </a:effectLst>
+                <a:latin typeface="+mn-lt"/>
+                <a:ea typeface="+mn-ea"/>
+                <a:cs typeface="+mn-cs"/>
+              </a:defRPr>
+            </a:lvl4pPr>
+            <a:lvl5pPr marL="1674000" indent="-216000" algn="l" defTabSz="457200" rtl="0" eaLnBrk="1" latinLnBrk="0" hangingPunct="1">
+              <a:spcBef>
+                <a:spcPct val="20000"/>
+              </a:spcBef>
+              <a:spcAft>
+                <a:spcPts val="600"/>
+              </a:spcAft>
+              <a:buClr>
+                <a:schemeClr val="tx2"/>
+              </a:buClr>
+              <a:buSzPct val="70000"/>
+              <a:buFont typeface="Wingdings 2" charset="2"/>
+              <a:buChar char=""/>
+              <a:defRPr sz="1400" kern="1200">
+                <a:ln>
+                  <a:solidFill>
+                    <a:schemeClr val="bg1">
+                      <a:lumMod val="75000"/>
+                      <a:lumOff val="25000"/>
+                      <a:alpha val="10000"/>
+                    </a:schemeClr>
+                  </a:solidFill>
+                </a:ln>
+                <a:solidFill>
+                  <a:schemeClr val="tx2"/>
+                </a:solidFill>
+                <a:effectLst>
+                  <a:outerShdw blurRad="9525" dist="25400" dir="14640000" algn="tl" rotWithShape="0">
+                    <a:schemeClr val="bg1">
+                      <a:alpha val="30000"/>
+                    </a:schemeClr>
+                  </a:outerShdw>
+                </a:effectLst>
+                <a:latin typeface="+mn-lt"/>
+                <a:ea typeface="+mn-ea"/>
+                <a:cs typeface="+mn-cs"/>
+              </a:defRPr>
+            </a:lvl5pPr>
+            <a:lvl6pPr marL="2014600" indent="-228600" algn="l" defTabSz="457200" rtl="0" eaLnBrk="1" latinLnBrk="0" hangingPunct="1">
+              <a:spcBef>
+                <a:spcPct val="20000"/>
+              </a:spcBef>
+              <a:spcAft>
+                <a:spcPts val="600"/>
+              </a:spcAft>
+              <a:buClr>
+                <a:schemeClr val="tx2"/>
+              </a:buClr>
+              <a:buSzPct val="70000"/>
+              <a:buFont typeface="Wingdings 2" charset="2"/>
+              <a:buChar char=""/>
+              <a:defRPr sz="1400" kern="1200">
+                <a:ln>
+                  <a:solidFill>
+                    <a:schemeClr val="bg1">
+                      <a:lumMod val="75000"/>
+                      <a:lumOff val="25000"/>
+                      <a:alpha val="10000"/>
+                    </a:schemeClr>
+                  </a:solidFill>
+                </a:ln>
+                <a:solidFill>
+                  <a:schemeClr val="tx2"/>
+                </a:solidFill>
+                <a:effectLst>
+                  <a:outerShdw blurRad="9525" dist="25400" dir="14640000" algn="tl" rotWithShape="0">
+                    <a:schemeClr val="bg1">
+                      <a:alpha val="30000"/>
+                    </a:schemeClr>
+                  </a:outerShdw>
+                </a:effectLst>
+                <a:latin typeface="+mn-lt"/>
+                <a:ea typeface="+mn-ea"/>
+                <a:cs typeface="+mn-cs"/>
+              </a:defRPr>
+            </a:lvl6pPr>
+            <a:lvl7pPr marL="2401800" indent="-228600" algn="l" defTabSz="457200" rtl="0" eaLnBrk="1" latinLnBrk="0" hangingPunct="1">
+              <a:spcBef>
+                <a:spcPct val="20000"/>
+              </a:spcBef>
+              <a:spcAft>
+                <a:spcPts val="600"/>
+              </a:spcAft>
+              <a:buClr>
+                <a:schemeClr val="tx2"/>
+              </a:buClr>
+              <a:buSzPct val="70000"/>
+              <a:buFont typeface="Wingdings 2" charset="2"/>
+              <a:buChar char=""/>
+              <a:defRPr sz="1400" kern="1200">
+                <a:ln>
+                  <a:solidFill>
+                    <a:schemeClr val="bg1">
+                      <a:lumMod val="75000"/>
+                      <a:lumOff val="25000"/>
+                      <a:alpha val="10000"/>
+                    </a:schemeClr>
+                  </a:solidFill>
+                </a:ln>
+                <a:solidFill>
+                  <a:schemeClr val="tx2"/>
+                </a:solidFill>
+                <a:effectLst>
+                  <a:outerShdw blurRad="9525" dist="25400" dir="14640000" algn="tl" rotWithShape="0">
+                    <a:schemeClr val="bg1">
+                      <a:alpha val="30000"/>
+                    </a:schemeClr>
+                  </a:outerShdw>
+                </a:effectLst>
+                <a:latin typeface="+mn-lt"/>
+                <a:ea typeface="+mn-ea"/>
+                <a:cs typeface="+mn-cs"/>
+              </a:defRPr>
+            </a:lvl7pPr>
+            <a:lvl8pPr marL="2789000" indent="-228600" algn="l" defTabSz="457200" rtl="0" eaLnBrk="1" latinLnBrk="0" hangingPunct="1">
+              <a:spcBef>
+                <a:spcPct val="20000"/>
+              </a:spcBef>
+              <a:spcAft>
+                <a:spcPts val="600"/>
+              </a:spcAft>
+              <a:buClr>
+                <a:schemeClr val="tx2"/>
+              </a:buClr>
+              <a:buSzPct val="70000"/>
+              <a:buFont typeface="Wingdings 2" charset="2"/>
+              <a:buChar char=""/>
+              <a:defRPr sz="1400" kern="1200">
+                <a:ln>
+                  <a:solidFill>
+                    <a:schemeClr val="bg1">
+                      <a:lumMod val="75000"/>
+                      <a:lumOff val="25000"/>
+                      <a:alpha val="10000"/>
+                    </a:schemeClr>
+                  </a:solidFill>
+                </a:ln>
+                <a:solidFill>
+                  <a:schemeClr val="tx2"/>
+                </a:solidFill>
+                <a:effectLst>
+                  <a:outerShdw blurRad="9525" dist="25400" dir="14640000" algn="tl" rotWithShape="0">
+                    <a:schemeClr val="bg1">
+                      <a:alpha val="30000"/>
+                    </a:schemeClr>
+                  </a:outerShdw>
+                </a:effectLst>
+                <a:latin typeface="+mn-lt"/>
+                <a:ea typeface="+mn-ea"/>
+                <a:cs typeface="+mn-cs"/>
+              </a:defRPr>
+            </a:lvl8pPr>
+            <a:lvl9pPr marL="3106200" indent="-228600" algn="l" defTabSz="457200" rtl="0" eaLnBrk="1" latinLnBrk="0" hangingPunct="1">
+              <a:spcBef>
+                <a:spcPct val="20000"/>
+              </a:spcBef>
+              <a:spcAft>
+                <a:spcPts val="600"/>
+              </a:spcAft>
+              <a:buClr>
+                <a:schemeClr val="tx2"/>
+              </a:buClr>
+              <a:buSzPct val="70000"/>
+              <a:buFont typeface="Wingdings 2" charset="2"/>
+              <a:buChar char=""/>
+              <a:defRPr sz="1400" kern="1200">
+                <a:ln>
+                  <a:solidFill>
+                    <a:schemeClr val="bg1">
+                      <a:lumMod val="75000"/>
+                      <a:lumOff val="25000"/>
+                      <a:alpha val="10000"/>
+                    </a:schemeClr>
+                  </a:solidFill>
+                </a:ln>
+                <a:solidFill>
+                  <a:schemeClr val="tx2"/>
+                </a:solidFill>
+                <a:effectLst>
+                  <a:outerShdw blurRad="9525" dist="25400" dir="14640000" algn="tl" rotWithShape="0">
+                    <a:schemeClr val="bg1">
+                      <a:alpha val="30000"/>
+                    </a:schemeClr>
+                  </a:outerShdw>
+                </a:effectLst>
+                <a:latin typeface="+mn-lt"/>
+                <a:ea typeface="+mn-ea"/>
+                <a:cs typeface="+mn-cs"/>
+              </a:defRPr>
+            </a:lvl9pPr>
+          </a:lstStyle>
+          <a:p>
+            <a:r>
+              <a:rPr lang="en-US" dirty="0"/>
+              <a:t>Cross-cutting HTTP Status Codes for any HTTP Verb</a:t>
+            </a:r>
+          </a:p>
+          <a:p>
+            <a:pPr lvl="1"/>
+            <a:r>
+              <a:rPr lang="en-US" dirty="0"/>
+              <a:t>400 Bad Request</a:t>
+            </a:r>
+          </a:p>
+          <a:p>
+            <a:pPr lvl="1"/>
+            <a:r>
+              <a:rPr lang="en-US" dirty="0"/>
+              <a:t>401 Unauthorized</a:t>
+            </a:r>
+          </a:p>
+          <a:p>
+            <a:pPr lvl="1"/>
+            <a:r>
+              <a:rPr lang="en-US" dirty="0"/>
+              <a:t>403 Forbidden</a:t>
+            </a:r>
+          </a:p>
+          <a:p>
+            <a:pPr lvl="1"/>
+            <a:r>
+              <a:rPr lang="en-US" dirty="0"/>
+              <a:t>405 Method not Allowed</a:t>
+            </a:r>
+          </a:p>
+          <a:p>
+            <a:pPr lvl="1"/>
+            <a:r>
+              <a:rPr lang="en-US" dirty="0"/>
+              <a:t>415 Unsupported Media Type</a:t>
+            </a:r>
+          </a:p>
+          <a:p>
+            <a:pPr lvl="1"/>
+            <a:r>
+              <a:rPr lang="en-US" dirty="0"/>
+              <a:t>429 Too many requests (specially for quotas)</a:t>
+            </a:r>
+          </a:p>
+          <a:p>
+            <a:pPr lvl="1"/>
+            <a:r>
+              <a:rPr lang="en-US" dirty="0"/>
+              <a:t>500 Internal Server Error</a:t>
+            </a:r>
+          </a:p>
+          <a:p>
+            <a:pPr lvl="1"/>
+            <a:r>
+              <a:rPr lang="en-US" dirty="0"/>
+              <a:t>503 Service Unavailable</a:t>
+            </a:r>
+          </a:p>
+          <a:p>
+            <a:r>
+              <a:rPr lang="en-US" dirty="0"/>
+              <a:t>More Info – Check out RFC 9110</a:t>
+            </a:r>
+          </a:p>
+          <a:p>
+            <a:endParaRPr lang="en-US" dirty="0"/>
+          </a:p>
+        </p:txBody>
+      </p:sp>
+      <p:pic>
+        <p:nvPicPr>
+          <p:cNvPr id="7" name="Picture 6">
+            <a:extLst>
+              <a:ext uri="{FF2B5EF4-FFF2-40B4-BE49-F238E27FC236}">
+                <a16:creationId xmlns:a16="http://schemas.microsoft.com/office/drawing/2014/main" id="{70CE2634-3AF9-C359-5236-E1C014BB1F38}"/>
+              </a:ext>
+            </a:extLst>
+          </p:cNvPr>
+          <p:cNvPicPr>
+            <a:picLocks noChangeAspect="1"/>
+          </p:cNvPicPr>
+          <p:nvPr/>
+        </p:nvPicPr>
+        <p:blipFill>
+          <a:blip r:embed="rId2"/>
+          <a:stretch>
+            <a:fillRect/>
+          </a:stretch>
+        </p:blipFill>
+        <p:spPr>
+          <a:xfrm>
+            <a:off x="6467104" y="4242816"/>
+            <a:ext cx="5191496" cy="2324255"/>
+          </a:xfrm>
+          <a:prstGeom prst="rect">
+            <a:avLst/>
+          </a:prstGeom>
+        </p:spPr>
+      </p:pic>
+    </p:spTree>
+    <p:extLst>
+      <p:ext uri="{BB962C8B-B14F-4D97-AF65-F5344CB8AC3E}">
+        <p14:creationId xmlns:p14="http://schemas.microsoft.com/office/powerpoint/2010/main" val="1093412864"/>
+      </p:ext>
+    </p:extLst>
+  </p:cSld>
+  <p:clrMapOvr>
+    <a:masterClrMapping/>
+  </p:clrMapOvr>
+</p:sld>
+</file>
+
+<file path=ppt/slides/slide62.xml><?xml version="1.0" encoding="utf-8"?>
+<p:sld xmlns:a="http://schemas.openxmlformats.org/drawingml/2006/main" xmlns:r="http://schemas.openxmlformats.org/officeDocument/2006/relationships" xmlns:p="http://schemas.openxmlformats.org/presentationml/2006/main">
+  <p:cSld>
+    <p:spTree>
+      <p:nvGrpSpPr>
+        <p:cNvPr id="1" name="">
+          <a:extLst>
+            <a:ext uri="{FF2B5EF4-FFF2-40B4-BE49-F238E27FC236}">
               <a16:creationId xmlns:a16="http://schemas.microsoft.com/office/drawing/2014/main" id="{0BAEAA12-0E4F-DD04-0FB7-68254602F9DC}"/>
             </a:ext>
           </a:extLst>
@@ -28544,7 +28889,7 @@
 </p:sld>
 </file>
 
-<file path=ppt/slides/slide61.xml><?xml version="1.0" encoding="utf-8"?>
+<file path=ppt/slides/slide63.xml><?xml version="1.0" encoding="utf-8"?>
 <p:sld xmlns:a="http://schemas.openxmlformats.org/drawingml/2006/main" xmlns:r="http://schemas.openxmlformats.org/officeDocument/2006/relationships" xmlns:p="http://schemas.openxmlformats.org/presentationml/2006/main">
   <p:cSld>
     <p:spTree>
@@ -29116,7 +29461,7 @@
 </p:sld>
 </file>
 
-<file path=ppt/slides/slide62.xml><?xml version="1.0" encoding="utf-8"?>
+<file path=ppt/slides/slide64.xml><?xml version="1.0" encoding="utf-8"?>
 <p:sld xmlns:a="http://schemas.openxmlformats.org/drawingml/2006/main" xmlns:r="http://schemas.openxmlformats.org/officeDocument/2006/relationships" xmlns:p="http://schemas.openxmlformats.org/presentationml/2006/main">
   <p:cSld>
     <p:spTree>

</xml_diff>